<commit_message>
Minor updates to the PPT to reorganize for this talk. Updated code to match the demos in the PPT
</commit_message>
<xml_diff>
--- a/UnitTestingTSQL.pptx
+++ b/UnitTestingTSQL.pptx
@@ -5,35 +5,39 @@
     <p:sldMasterId id="2147483648" r:id="rId1"/>
   </p:sldMasterIdLst>
   <p:notesMasterIdLst>
-    <p:notesMasterId r:id="rId28"/>
+    <p:notesMasterId r:id="rId32"/>
   </p:notesMasterIdLst>
   <p:sldIdLst>
     <p:sldId id="256" r:id="rId2"/>
     <p:sldId id="282" r:id="rId3"/>
     <p:sldId id="283" r:id="rId4"/>
-    <p:sldId id="257" r:id="rId5"/>
-    <p:sldId id="261" r:id="rId6"/>
-    <p:sldId id="281" r:id="rId7"/>
-    <p:sldId id="287" r:id="rId8"/>
-    <p:sldId id="279" r:id="rId9"/>
-    <p:sldId id="280" r:id="rId10"/>
-    <p:sldId id="288" r:id="rId11"/>
-    <p:sldId id="260" r:id="rId12"/>
-    <p:sldId id="262" r:id="rId13"/>
-    <p:sldId id="264" r:id="rId14"/>
-    <p:sldId id="284" r:id="rId15"/>
-    <p:sldId id="273" r:id="rId16"/>
-    <p:sldId id="269" r:id="rId17"/>
-    <p:sldId id="285" r:id="rId18"/>
-    <p:sldId id="274" r:id="rId19"/>
-    <p:sldId id="286" r:id="rId20"/>
-    <p:sldId id="276" r:id="rId21"/>
-    <p:sldId id="278" r:id="rId22"/>
-    <p:sldId id="277" r:id="rId23"/>
-    <p:sldId id="270" r:id="rId24"/>
-    <p:sldId id="271" r:id="rId25"/>
-    <p:sldId id="265" r:id="rId26"/>
-    <p:sldId id="267" r:id="rId27"/>
+    <p:sldId id="289" r:id="rId5"/>
+    <p:sldId id="290" r:id="rId6"/>
+    <p:sldId id="291" r:id="rId7"/>
+    <p:sldId id="292" r:id="rId8"/>
+    <p:sldId id="257" r:id="rId9"/>
+    <p:sldId id="279" r:id="rId10"/>
+    <p:sldId id="280" r:id="rId11"/>
+    <p:sldId id="293" r:id="rId12"/>
+    <p:sldId id="294" r:id="rId13"/>
+    <p:sldId id="261" r:id="rId14"/>
+    <p:sldId id="281" r:id="rId15"/>
+    <p:sldId id="287" r:id="rId16"/>
+    <p:sldId id="262" r:id="rId17"/>
+    <p:sldId id="264" r:id="rId18"/>
+    <p:sldId id="284" r:id="rId19"/>
+    <p:sldId id="273" r:id="rId20"/>
+    <p:sldId id="269" r:id="rId21"/>
+    <p:sldId id="285" r:id="rId22"/>
+    <p:sldId id="274" r:id="rId23"/>
+    <p:sldId id="286" r:id="rId24"/>
+    <p:sldId id="276" r:id="rId25"/>
+    <p:sldId id="278" r:id="rId26"/>
+    <p:sldId id="277" r:id="rId27"/>
+    <p:sldId id="270" r:id="rId28"/>
+    <p:sldId id="271" r:id="rId29"/>
+    <p:sldId id="265" r:id="rId30"/>
+    <p:sldId id="267" r:id="rId31"/>
   </p:sldIdLst>
   <p:sldSz cx="9144000" cy="6858000" type="screen4x3"/>
   <p:notesSz cx="6858000" cy="9144000"/>
@@ -3481,11 +3485,11 @@
           <a:p>
             <a:r>
               <a:rPr lang="en-US" dirty="0"/>
-              <a:t>Get Testing with </a:t>
-            </a:r>
-            <a:r>
-              <a:rPr lang="en-US" dirty="0" err="1"/>
-              <a:t>tSQLt</a:t>
+              <a:t>Unit Testing with TSQL</a:t>
+            </a:r>
+            <a:r>
+              <a:rPr lang="en-US" baseline="0" dirty="0"/>
+              <a:t> Code</a:t>
             </a:r>
             <a:endParaRPr lang="en-US" dirty="0"/>
           </a:p>
@@ -3573,33 +3577,24 @@
           <a:p>
             <a:r>
               <a:rPr lang="en-US" dirty="0"/>
-              <a:t>Second</a:t>
-            </a:r>
-            <a:r>
-              <a:rPr lang="en-US" baseline="0" dirty="0"/>
-              <a:t> requirement – simple </a:t>
-            </a:r>
-            <a:r>
-              <a:rPr lang="en-US" baseline="0" dirty="0" err="1"/>
-              <a:t>procs</a:t>
-            </a:r>
-            <a:r>
-              <a:rPr lang="en-US" baseline="0" dirty="0"/>
-              <a:t>.</a:t>
-            </a:r>
-          </a:p>
-          <a:p>
-            <a:endParaRPr lang="en-US" baseline="0" dirty="0"/>
-          </a:p>
-          <a:p>
-            <a:r>
-              <a:rPr lang="en-US" baseline="0" dirty="0"/>
-              <a:t>Create </a:t>
-            </a:r>
-            <a:r>
-              <a:rPr lang="en-US" baseline="0" dirty="0" err="1"/>
-              <a:t>sp_insertArticleImage</a:t>
-            </a:r>
+              <a:t>Demo that shows how we build a table that doesn’t follow good practices. Use </a:t>
+            </a:r>
+            <a:r>
+              <a:rPr lang="en-US" dirty="0" err="1"/>
+              <a:t>tblStagingImages</a:t>
+            </a:r>
+            <a:r>
+              <a:rPr lang="en-US" dirty="0"/>
+              <a:t> as a table name</a:t>
+            </a:r>
+          </a:p>
+          <a:p>
+            <a:r>
+              <a:rPr lang="en-US" dirty="0"/>
+              <a:t>SQL Cop catches an error. Actually catches two, name and no PK.</a:t>
+            </a:r>
+          </a:p>
+          <a:p>
             <a:endParaRPr lang="en-US" dirty="0"/>
           </a:p>
         </p:txBody>
@@ -3630,7 +3625,7 @@
     </p:spTree>
     <p:extLst>
       <p:ext uri="{BB962C8B-B14F-4D97-AF65-F5344CB8AC3E}">
-        <p14:creationId xmlns:p14="http://schemas.microsoft.com/office/powerpoint/2010/main" val="4284040156"/>
+        <p14:creationId xmlns:p14="http://schemas.microsoft.com/office/powerpoint/2010/main" val="2852829571"/>
       </p:ext>
     </p:extLst>
   </p:cSld>
@@ -3686,22 +3681,33 @@
           <a:p>
             <a:r>
               <a:rPr lang="en-US" dirty="0"/>
-              <a:t>Alter the procedure  to meet the new logic</a:t>
-            </a:r>
-          </a:p>
-          <a:p>
-            <a:r>
-              <a:rPr lang="en-US" dirty="0"/>
-              <a:t>Write test for the proc</a:t>
-            </a:r>
-          </a:p>
-          <a:p>
-            <a:r>
-              <a:rPr lang="en-US" dirty="0"/>
-              <a:t>Run tests, have new test work, some other, older test that now fails.</a:t>
-            </a:r>
-          </a:p>
-          <a:p>
+              <a:t>Second</a:t>
+            </a:r>
+            <a:r>
+              <a:rPr lang="en-US" baseline="0" dirty="0"/>
+              <a:t> requirement – simple </a:t>
+            </a:r>
+            <a:r>
+              <a:rPr lang="en-US" baseline="0" dirty="0" err="1"/>
+              <a:t>procs</a:t>
+            </a:r>
+            <a:r>
+              <a:rPr lang="en-US" baseline="0" dirty="0"/>
+              <a:t>.</a:t>
+            </a:r>
+          </a:p>
+          <a:p>
+            <a:endParaRPr lang="en-US" baseline="0" dirty="0"/>
+          </a:p>
+          <a:p>
+            <a:r>
+              <a:rPr lang="en-US" baseline="0" dirty="0"/>
+              <a:t>Create </a:t>
+            </a:r>
+            <a:r>
+              <a:rPr lang="en-US" baseline="0" dirty="0" err="1"/>
+              <a:t>sp_insertArticleImage</a:t>
+            </a:r>
             <a:endParaRPr lang="en-US" dirty="0"/>
           </a:p>
         </p:txBody>
@@ -3723,7 +3729,7 @@
           <a:p>
             <a:fld id="{737EB954-88EE-45B2-878D-41C5C083E9B9}" type="slidenum">
               <a:rPr lang="en-US" smtClean="0"/>
-              <a:t>19</a:t>
+              <a:t>20</a:t>
             </a:fld>
             <a:endParaRPr lang="en-US"/>
           </a:p>
@@ -3732,7 +3738,7 @@
     </p:spTree>
     <p:extLst>
       <p:ext uri="{BB962C8B-B14F-4D97-AF65-F5344CB8AC3E}">
-        <p14:creationId xmlns:p14="http://schemas.microsoft.com/office/powerpoint/2010/main" val="815878000"/>
+        <p14:creationId xmlns:p14="http://schemas.microsoft.com/office/powerpoint/2010/main" val="4284040156"/>
       </p:ext>
     </p:extLst>
   </p:cSld>
@@ -3788,12 +3794,34 @@
           <a:p>
             <a:r>
               <a:rPr lang="en-US" dirty="0"/>
-              <a:t>This</a:t>
-            </a:r>
-            <a:r>
-              <a:rPr lang="en-US" baseline="0" dirty="0"/>
-              <a:t> is part of a software development philosophy that seeks to build software faster, with a higher level of quality.</a:t>
-            </a:r>
+              <a:t>Write proc for insert and select of images</a:t>
+            </a:r>
+          </a:p>
+          <a:p>
+            <a:r>
+              <a:rPr lang="en-US" dirty="0"/>
+              <a:t>Create new test for insert, don’t fill stub</a:t>
+            </a:r>
+          </a:p>
+          <a:p>
+            <a:r>
+              <a:rPr lang="en-US" dirty="0"/>
+              <a:t>Create new test for select and edit</a:t>
+            </a:r>
+          </a:p>
+          <a:p>
+            <a:r>
+              <a:rPr lang="en-US" dirty="0"/>
+              <a:t>Run tests, get caught naming issues, as well as one procedure works, one fails. We get the failure in the test we didn’t edit.</a:t>
+            </a:r>
+          </a:p>
+          <a:p>
+            <a:r>
+              <a:rPr lang="en-US" dirty="0"/>
+              <a:t>Correct issues in both procedures</a:t>
+            </a:r>
+          </a:p>
+          <a:p>
             <a:endParaRPr lang="en-US" dirty="0"/>
           </a:p>
         </p:txBody>
@@ -3815,7 +3843,7 @@
           <a:p>
             <a:fld id="{737EB954-88EE-45B2-878D-41C5C083E9B9}" type="slidenum">
               <a:rPr lang="en-US" smtClean="0"/>
-              <a:t>22</a:t>
+              <a:t>21</a:t>
             </a:fld>
             <a:endParaRPr lang="en-US"/>
           </a:p>
@@ -3824,7 +3852,7 @@
     </p:spTree>
     <p:extLst>
       <p:ext uri="{BB962C8B-B14F-4D97-AF65-F5344CB8AC3E}">
-        <p14:creationId xmlns:p14="http://schemas.microsoft.com/office/powerpoint/2010/main" val="2915440239"/>
+        <p14:creationId xmlns:p14="http://schemas.microsoft.com/office/powerpoint/2010/main" val="582914193"/>
       </p:ext>
     </p:extLst>
   </p:cSld>
@@ -3880,6 +3908,313 @@
           <a:p>
             <a:r>
               <a:rPr lang="en-US" dirty="0"/>
+              <a:t>Second</a:t>
+            </a:r>
+            <a:r>
+              <a:rPr lang="en-US" baseline="0" dirty="0"/>
+              <a:t> requirement – simple </a:t>
+            </a:r>
+            <a:r>
+              <a:rPr lang="en-US" baseline="0" dirty="0" err="1"/>
+              <a:t>procs</a:t>
+            </a:r>
+            <a:r>
+              <a:rPr lang="en-US" baseline="0" dirty="0"/>
+              <a:t>.</a:t>
+            </a:r>
+          </a:p>
+          <a:p>
+            <a:endParaRPr lang="en-US" baseline="0" dirty="0"/>
+          </a:p>
+          <a:p>
+            <a:r>
+              <a:rPr lang="en-US" baseline="0" dirty="0"/>
+              <a:t>Create </a:t>
+            </a:r>
+            <a:r>
+              <a:rPr lang="en-US" baseline="0" dirty="0" err="1"/>
+              <a:t>sp_insertArticleImage</a:t>
+            </a:r>
+            <a:endParaRPr lang="en-US" dirty="0"/>
+          </a:p>
+        </p:txBody>
+      </p:sp>
+      <p:sp>
+        <p:nvSpPr>
+          <p:cNvPr id="4" name="Slide Number Placeholder 3"/>
+          <p:cNvSpPr>
+            <a:spLocks noGrp="1"/>
+          </p:cNvSpPr>
+          <p:nvPr>
+            <p:ph type="sldNum" sz="quarter" idx="10"/>
+          </p:nvPr>
+        </p:nvSpPr>
+        <p:spPr/>
+        <p:txBody>
+          <a:bodyPr/>
+          <a:lstStyle/>
+          <a:p>
+            <a:fld id="{737EB954-88EE-45B2-878D-41C5C083E9B9}" type="slidenum">
+              <a:rPr lang="en-US" smtClean="0"/>
+              <a:t>22</a:t>
+            </a:fld>
+            <a:endParaRPr lang="en-US"/>
+          </a:p>
+        </p:txBody>
+      </p:sp>
+    </p:spTree>
+    <p:extLst>
+      <p:ext uri="{BB962C8B-B14F-4D97-AF65-F5344CB8AC3E}">
+        <p14:creationId xmlns:p14="http://schemas.microsoft.com/office/powerpoint/2010/main" val="4284040156"/>
+      </p:ext>
+    </p:extLst>
+  </p:cSld>
+  <p:clrMapOvr>
+    <a:masterClrMapping/>
+  </p:clrMapOvr>
+</p:notes>
+</file>
+
+<file path=ppt/notesSlides/notesSlide14.xml><?xml version="1.0" encoding="utf-8"?>
+<p:notes xmlns:a="http://schemas.openxmlformats.org/drawingml/2006/main" xmlns:r="http://schemas.openxmlformats.org/officeDocument/2006/relationships" xmlns:p="http://schemas.openxmlformats.org/presentationml/2006/main">
+  <p:cSld>
+    <p:spTree>
+      <p:nvGrpSpPr>
+        <p:cNvPr id="1" name=""/>
+        <p:cNvGrpSpPr/>
+        <p:nvPr/>
+      </p:nvGrpSpPr>
+      <p:grpSpPr>
+        <a:xfrm>
+          <a:off x="0" y="0"/>
+          <a:ext cx="0" cy="0"/>
+          <a:chOff x="0" y="0"/>
+          <a:chExt cx="0" cy="0"/>
+        </a:xfrm>
+      </p:grpSpPr>
+      <p:sp>
+        <p:nvSpPr>
+          <p:cNvPr id="2" name="Slide Image Placeholder 1"/>
+          <p:cNvSpPr>
+            <a:spLocks noGrp="1" noRot="1" noChangeAspect="1"/>
+          </p:cNvSpPr>
+          <p:nvPr>
+            <p:ph type="sldImg"/>
+          </p:nvPr>
+        </p:nvSpPr>
+        <p:spPr/>
+      </p:sp>
+      <p:sp>
+        <p:nvSpPr>
+          <p:cNvPr id="3" name="Notes Placeholder 2"/>
+          <p:cNvSpPr>
+            <a:spLocks noGrp="1"/>
+          </p:cNvSpPr>
+          <p:nvPr>
+            <p:ph type="body" idx="1"/>
+          </p:nvPr>
+        </p:nvSpPr>
+        <p:spPr/>
+        <p:txBody>
+          <a:bodyPr/>
+          <a:lstStyle/>
+          <a:p>
+            <a:r>
+              <a:rPr lang="en-US" dirty="0"/>
+              <a:t>Alter the procedure  to meet the new logic</a:t>
+            </a:r>
+          </a:p>
+          <a:p>
+            <a:r>
+              <a:rPr lang="en-US" dirty="0"/>
+              <a:t>Write test for the proc</a:t>
+            </a:r>
+          </a:p>
+          <a:p>
+            <a:r>
+              <a:rPr lang="en-US" dirty="0"/>
+              <a:t>Run tests, have new test work, some other, older test that now fails.</a:t>
+            </a:r>
+          </a:p>
+          <a:p>
+            <a:endParaRPr lang="en-US" dirty="0"/>
+          </a:p>
+        </p:txBody>
+      </p:sp>
+      <p:sp>
+        <p:nvSpPr>
+          <p:cNvPr id="4" name="Slide Number Placeholder 3"/>
+          <p:cNvSpPr>
+            <a:spLocks noGrp="1"/>
+          </p:cNvSpPr>
+          <p:nvPr>
+            <p:ph type="sldNum" sz="quarter" idx="10"/>
+          </p:nvPr>
+        </p:nvSpPr>
+        <p:spPr/>
+        <p:txBody>
+          <a:bodyPr/>
+          <a:lstStyle/>
+          <a:p>
+            <a:fld id="{737EB954-88EE-45B2-878D-41C5C083E9B9}" type="slidenum">
+              <a:rPr lang="en-US" smtClean="0"/>
+              <a:t>23</a:t>
+            </a:fld>
+            <a:endParaRPr lang="en-US"/>
+          </a:p>
+        </p:txBody>
+      </p:sp>
+    </p:spTree>
+    <p:extLst>
+      <p:ext uri="{BB962C8B-B14F-4D97-AF65-F5344CB8AC3E}">
+        <p14:creationId xmlns:p14="http://schemas.microsoft.com/office/powerpoint/2010/main" val="815878000"/>
+      </p:ext>
+    </p:extLst>
+  </p:cSld>
+  <p:clrMapOvr>
+    <a:masterClrMapping/>
+  </p:clrMapOvr>
+</p:notes>
+</file>
+
+<file path=ppt/notesSlides/notesSlide15.xml><?xml version="1.0" encoding="utf-8"?>
+<p:notes xmlns:a="http://schemas.openxmlformats.org/drawingml/2006/main" xmlns:r="http://schemas.openxmlformats.org/officeDocument/2006/relationships" xmlns:p="http://schemas.openxmlformats.org/presentationml/2006/main">
+  <p:cSld>
+    <p:spTree>
+      <p:nvGrpSpPr>
+        <p:cNvPr id="1" name=""/>
+        <p:cNvGrpSpPr/>
+        <p:nvPr/>
+      </p:nvGrpSpPr>
+      <p:grpSpPr>
+        <a:xfrm>
+          <a:off x="0" y="0"/>
+          <a:ext cx="0" cy="0"/>
+          <a:chOff x="0" y="0"/>
+          <a:chExt cx="0" cy="0"/>
+        </a:xfrm>
+      </p:grpSpPr>
+      <p:sp>
+        <p:nvSpPr>
+          <p:cNvPr id="2" name="Slide Image Placeholder 1"/>
+          <p:cNvSpPr>
+            <a:spLocks noGrp="1" noRot="1" noChangeAspect="1"/>
+          </p:cNvSpPr>
+          <p:nvPr>
+            <p:ph type="sldImg"/>
+          </p:nvPr>
+        </p:nvSpPr>
+        <p:spPr/>
+      </p:sp>
+      <p:sp>
+        <p:nvSpPr>
+          <p:cNvPr id="3" name="Notes Placeholder 2"/>
+          <p:cNvSpPr>
+            <a:spLocks noGrp="1"/>
+          </p:cNvSpPr>
+          <p:nvPr>
+            <p:ph type="body" idx="1"/>
+          </p:nvPr>
+        </p:nvSpPr>
+        <p:spPr/>
+        <p:txBody>
+          <a:bodyPr/>
+          <a:lstStyle/>
+          <a:p>
+            <a:r>
+              <a:rPr lang="en-US" dirty="0"/>
+              <a:t>This</a:t>
+            </a:r>
+            <a:r>
+              <a:rPr lang="en-US" baseline="0" dirty="0"/>
+              <a:t> is part of a software development philosophy that seeks to build software faster, with a higher level of quality.</a:t>
+            </a:r>
+            <a:endParaRPr lang="en-US" dirty="0"/>
+          </a:p>
+        </p:txBody>
+      </p:sp>
+      <p:sp>
+        <p:nvSpPr>
+          <p:cNvPr id="4" name="Slide Number Placeholder 3"/>
+          <p:cNvSpPr>
+            <a:spLocks noGrp="1"/>
+          </p:cNvSpPr>
+          <p:nvPr>
+            <p:ph type="sldNum" sz="quarter" idx="10"/>
+          </p:nvPr>
+        </p:nvSpPr>
+        <p:spPr/>
+        <p:txBody>
+          <a:bodyPr/>
+          <a:lstStyle/>
+          <a:p>
+            <a:fld id="{737EB954-88EE-45B2-878D-41C5C083E9B9}" type="slidenum">
+              <a:rPr lang="en-US" smtClean="0"/>
+              <a:t>26</a:t>
+            </a:fld>
+            <a:endParaRPr lang="en-US"/>
+          </a:p>
+        </p:txBody>
+      </p:sp>
+    </p:spTree>
+    <p:extLst>
+      <p:ext uri="{BB962C8B-B14F-4D97-AF65-F5344CB8AC3E}">
+        <p14:creationId xmlns:p14="http://schemas.microsoft.com/office/powerpoint/2010/main" val="2915440239"/>
+      </p:ext>
+    </p:extLst>
+  </p:cSld>
+  <p:clrMapOvr>
+    <a:masterClrMapping/>
+  </p:clrMapOvr>
+</p:notes>
+</file>
+
+<file path=ppt/notesSlides/notesSlide16.xml><?xml version="1.0" encoding="utf-8"?>
+<p:notes xmlns:a="http://schemas.openxmlformats.org/drawingml/2006/main" xmlns:r="http://schemas.openxmlformats.org/officeDocument/2006/relationships" xmlns:p="http://schemas.openxmlformats.org/presentationml/2006/main">
+  <p:cSld>
+    <p:spTree>
+      <p:nvGrpSpPr>
+        <p:cNvPr id="1" name=""/>
+        <p:cNvGrpSpPr/>
+        <p:nvPr/>
+      </p:nvGrpSpPr>
+      <p:grpSpPr>
+        <a:xfrm>
+          <a:off x="0" y="0"/>
+          <a:ext cx="0" cy="0"/>
+          <a:chOff x="0" y="0"/>
+          <a:chExt cx="0" cy="0"/>
+        </a:xfrm>
+      </p:grpSpPr>
+      <p:sp>
+        <p:nvSpPr>
+          <p:cNvPr id="2" name="Slide Image Placeholder 1"/>
+          <p:cNvSpPr>
+            <a:spLocks noGrp="1" noRot="1" noChangeAspect="1"/>
+          </p:cNvSpPr>
+          <p:nvPr>
+            <p:ph type="sldImg"/>
+          </p:nvPr>
+        </p:nvSpPr>
+        <p:spPr/>
+      </p:sp>
+      <p:sp>
+        <p:nvSpPr>
+          <p:cNvPr id="3" name="Notes Placeholder 2"/>
+          <p:cNvSpPr>
+            <a:spLocks noGrp="1"/>
+          </p:cNvSpPr>
+          <p:nvPr>
+            <p:ph type="body" idx="1"/>
+          </p:nvPr>
+        </p:nvSpPr>
+        <p:spPr/>
+        <p:txBody>
+          <a:bodyPr/>
+          <a:lstStyle/>
+          <a:p>
+            <a:r>
+              <a:rPr lang="en-US" dirty="0"/>
               <a:t>CD pipeline</a:t>
             </a:r>
             <a:r>
@@ -3935,7 +4270,7 @@
           <a:p>
             <a:fld id="{737EB954-88EE-45B2-878D-41C5C083E9B9}" type="slidenum">
               <a:rPr lang="en-US" smtClean="0"/>
-              <a:t>25</a:t>
+              <a:t>29</a:t>
             </a:fld>
             <a:endParaRPr lang="en-US"/>
           </a:p>
@@ -4079,7 +4414,12 @@
             <p:ph type="sldImg"/>
           </p:nvPr>
         </p:nvSpPr>
-        <p:spPr/>
+        <p:spPr>
+          <a:xfrm>
+            <a:off x="1371600" y="1143000"/>
+            <a:ext cx="4114800" cy="3086100"/>
+          </a:xfrm>
+        </p:spPr>
       </p:sp>
       <p:sp>
         <p:nvSpPr>
@@ -4096,15 +4436,7 @@
           <a:bodyPr/>
           <a:lstStyle/>
           <a:p>
-            <a:r>
-              <a:rPr lang="en-US" dirty="0"/>
-              <a:t>Note</a:t>
-            </a:r>
-            <a:r>
-              <a:rPr lang="en-US" baseline="0" dirty="0"/>
-              <a:t> that the cost of bugs rises. We know this. The earlier we find issues, the better. We can see from this survey that the cost of bugs rises dramatically as we get closer to the client.</a:t>
-            </a:r>
-            <a:endParaRPr lang="en-US" dirty="0"/>
+            <a:endParaRPr lang="en-GB" dirty="0"/>
           </a:p>
         </p:txBody>
       </p:sp>
@@ -4123,9 +4455,9 @@
           <a:bodyPr/>
           <a:lstStyle/>
           <a:p>
-            <a:fld id="{737EB954-88EE-45B2-878D-41C5C083E9B9}" type="slidenum">
+            <a:fld id="{23D30045-AEBE-4117-8D8F-8499E1D0AF2B}" type="slidenum">
               <a:rPr lang="en-US" smtClean="0"/>
-              <a:t>4</a:t>
+              <a:t>5</a:t>
             </a:fld>
             <a:endParaRPr lang="en-US"/>
           </a:p>
@@ -4134,7 +4466,7 @@
     </p:spTree>
     <p:extLst>
       <p:ext uri="{BB962C8B-B14F-4D97-AF65-F5344CB8AC3E}">
-        <p14:creationId xmlns:p14="http://schemas.microsoft.com/office/powerpoint/2010/main" val="1178868894"/>
+        <p14:creationId xmlns:p14="http://schemas.microsoft.com/office/powerpoint/2010/main" val="373289035"/>
       </p:ext>
     </p:extLst>
   </p:cSld>
@@ -4171,7 +4503,12 @@
             <p:ph type="sldImg"/>
           </p:nvPr>
         </p:nvSpPr>
-        <p:spPr/>
+        <p:spPr>
+          <a:xfrm>
+            <a:off x="1371600" y="1143000"/>
+            <a:ext cx="4114800" cy="3086100"/>
+          </a:xfrm>
+        </p:spPr>
       </p:sp>
       <p:sp>
         <p:nvSpPr>
@@ -4188,15 +4525,7 @@
           <a:bodyPr/>
           <a:lstStyle/>
           <a:p>
-            <a:r>
-              <a:rPr lang="en-US" dirty="0"/>
-              <a:t>Introduce the framework. Give URL, support,</a:t>
-            </a:r>
-            <a:r>
-              <a:rPr lang="en-US" baseline="0" dirty="0"/>
-              <a:t> this is free.</a:t>
-            </a:r>
-            <a:endParaRPr lang="en-US" dirty="0"/>
+            <a:endParaRPr lang="en-GB" dirty="0"/>
           </a:p>
         </p:txBody>
       </p:sp>
@@ -4215,9 +4544,9 @@
           <a:bodyPr/>
           <a:lstStyle/>
           <a:p>
-            <a:fld id="{737EB954-88EE-45B2-878D-41C5C083E9B9}" type="slidenum">
+            <a:fld id="{23D30045-AEBE-4117-8D8F-8499E1D0AF2B}" type="slidenum">
               <a:rPr lang="en-US" smtClean="0"/>
-              <a:t>5</a:t>
+              <a:t>6</a:t>
             </a:fld>
             <a:endParaRPr lang="en-US"/>
           </a:p>
@@ -4226,7 +4555,7 @@
     </p:spTree>
     <p:extLst>
       <p:ext uri="{BB962C8B-B14F-4D97-AF65-F5344CB8AC3E}">
-        <p14:creationId xmlns:p14="http://schemas.microsoft.com/office/powerpoint/2010/main" val="2314466544"/>
+        <p14:creationId xmlns:p14="http://schemas.microsoft.com/office/powerpoint/2010/main" val="1445769198"/>
       </p:ext>
     </p:extLst>
   </p:cSld>
@@ -4282,11 +4611,8 @@
           <a:p>
             <a:r>
               <a:rPr lang="en-US" dirty="0"/>
-              <a:t>https://msdn.microsoft.com/en-us/library/jj851212(v=vs.103).aspx</a:t>
-            </a:r>
-          </a:p>
-          <a:p>
-            <a:endParaRPr lang="en-US" dirty="0"/>
+              <a:t>http://nathanleclaire.com/images/unit-test-angularjs-service/cowboy.png</a:t>
+            </a:r>
           </a:p>
         </p:txBody>
       </p:sp>
@@ -4305,7 +4631,7 @@
           <a:bodyPr/>
           <a:lstStyle/>
           <a:p>
-            <a:fld id="{737EB954-88EE-45B2-878D-41C5C083E9B9}" type="slidenum">
+            <a:fld id="{23D30045-AEBE-4117-8D8F-8499E1D0AF2B}" type="slidenum">
               <a:rPr lang="en-US" smtClean="0"/>
               <a:t>7</a:t>
             </a:fld>
@@ -4316,7 +4642,7 @@
     </p:spTree>
     <p:extLst>
       <p:ext uri="{BB962C8B-B14F-4D97-AF65-F5344CB8AC3E}">
-        <p14:creationId xmlns:p14="http://schemas.microsoft.com/office/powerpoint/2010/main" val="1145474572"/>
+        <p14:creationId xmlns:p14="http://schemas.microsoft.com/office/powerpoint/2010/main" val="1204602472"/>
       </p:ext>
     </p:extLst>
   </p:cSld>
@@ -4372,11 +4698,11 @@
           <a:p>
             <a:r>
               <a:rPr lang="en-US" dirty="0"/>
-              <a:t>Needs a new name, but</a:t>
+              <a:t>Note</a:t>
             </a:r>
             <a:r>
               <a:rPr lang="en-US" baseline="0" dirty="0"/>
-              <a:t> this is where we talk about our demo app slightly (or code). Give a first requirement we need to do.</a:t>
+              <a:t> that the cost of bugs rises. We know this. The earlier we find issues, the better. We can see from this survey that the cost of bugs rises dramatically as we get closer to the client.</a:t>
             </a:r>
             <a:endParaRPr lang="en-US" dirty="0"/>
           </a:p>
@@ -4399,7 +4725,7 @@
           <a:p>
             <a:fld id="{737EB954-88EE-45B2-878D-41C5C083E9B9}" type="slidenum">
               <a:rPr lang="en-US" smtClean="0"/>
-              <a:t>13</a:t>
+              <a:t>8</a:t>
             </a:fld>
             <a:endParaRPr lang="en-US"/>
           </a:p>
@@ -4408,7 +4734,7 @@
     </p:spTree>
     <p:extLst>
       <p:ext uri="{BB962C8B-B14F-4D97-AF65-F5344CB8AC3E}">
-        <p14:creationId xmlns:p14="http://schemas.microsoft.com/office/powerpoint/2010/main" val="4284040156"/>
+        <p14:creationId xmlns:p14="http://schemas.microsoft.com/office/powerpoint/2010/main" val="1178868894"/>
       </p:ext>
     </p:extLst>
   </p:cSld>
@@ -4464,24 +4790,12 @@
           <a:p>
             <a:r>
               <a:rPr lang="en-US" dirty="0"/>
-              <a:t>Demo that shows how we build a table that doesn’t follow good practices. Use </a:t>
-            </a:r>
-            <a:r>
-              <a:rPr lang="en-US" dirty="0" err="1"/>
-              <a:t>tblStagingImages</a:t>
-            </a:r>
-            <a:r>
-              <a:rPr lang="en-US" dirty="0"/>
-              <a:t> as a table name</a:t>
-            </a:r>
-          </a:p>
-          <a:p>
-            <a:r>
-              <a:rPr lang="en-US" dirty="0"/>
-              <a:t>SQL Cop catches an error. Actually catches two, name and no PK.</a:t>
-            </a:r>
-          </a:p>
-          <a:p>
+              <a:t>Introduce the framework. Give URL, support,</a:t>
+            </a:r>
+            <a:r>
+              <a:rPr lang="en-US" baseline="0" dirty="0"/>
+              <a:t> this is free.</a:t>
+            </a:r>
             <a:endParaRPr lang="en-US" dirty="0"/>
           </a:p>
         </p:txBody>
@@ -4503,7 +4817,7 @@
           <a:p>
             <a:fld id="{737EB954-88EE-45B2-878D-41C5C083E9B9}" type="slidenum">
               <a:rPr lang="en-US" smtClean="0"/>
-              <a:t>14</a:t>
+              <a:t>13</a:t>
             </a:fld>
             <a:endParaRPr lang="en-US"/>
           </a:p>
@@ -4512,7 +4826,7 @@
     </p:spTree>
     <p:extLst>
       <p:ext uri="{BB962C8B-B14F-4D97-AF65-F5344CB8AC3E}">
-        <p14:creationId xmlns:p14="http://schemas.microsoft.com/office/powerpoint/2010/main" val="2852829571"/>
+        <p14:creationId xmlns:p14="http://schemas.microsoft.com/office/powerpoint/2010/main" val="2314466544"/>
       </p:ext>
     </p:extLst>
   </p:cSld>
@@ -4568,33 +4882,10 @@
           <a:p>
             <a:r>
               <a:rPr lang="en-US" dirty="0"/>
-              <a:t>Second</a:t>
-            </a:r>
-            <a:r>
-              <a:rPr lang="en-US" baseline="0" dirty="0"/>
-              <a:t> requirement – simple </a:t>
-            </a:r>
-            <a:r>
-              <a:rPr lang="en-US" baseline="0" dirty="0" err="1"/>
-              <a:t>procs</a:t>
-            </a:r>
-            <a:r>
-              <a:rPr lang="en-US" baseline="0" dirty="0"/>
-              <a:t>.</a:t>
-            </a:r>
-          </a:p>
-          <a:p>
-            <a:endParaRPr lang="en-US" baseline="0" dirty="0"/>
-          </a:p>
-          <a:p>
-            <a:r>
-              <a:rPr lang="en-US" baseline="0" dirty="0"/>
-              <a:t>Create </a:t>
-            </a:r>
-            <a:r>
-              <a:rPr lang="en-US" baseline="0" dirty="0" err="1"/>
-              <a:t>sp_insertArticleImage</a:t>
-            </a:r>
+              <a:t>https://msdn.microsoft.com/en-us/library/jj851212(v=vs.103).aspx</a:t>
+            </a:r>
+          </a:p>
+          <a:p>
             <a:endParaRPr lang="en-US" dirty="0"/>
           </a:p>
         </p:txBody>
@@ -4616,7 +4907,7 @@
           <a:p>
             <a:fld id="{737EB954-88EE-45B2-878D-41C5C083E9B9}" type="slidenum">
               <a:rPr lang="en-US" smtClean="0"/>
-              <a:t>16</a:t>
+              <a:t>15</a:t>
             </a:fld>
             <a:endParaRPr lang="en-US"/>
           </a:p>
@@ -4625,7 +4916,7 @@
     </p:spTree>
     <p:extLst>
       <p:ext uri="{BB962C8B-B14F-4D97-AF65-F5344CB8AC3E}">
-        <p14:creationId xmlns:p14="http://schemas.microsoft.com/office/powerpoint/2010/main" val="4284040156"/>
+        <p14:creationId xmlns:p14="http://schemas.microsoft.com/office/powerpoint/2010/main" val="1145474572"/>
       </p:ext>
     </p:extLst>
   </p:cSld>
@@ -4681,34 +4972,12 @@
           <a:p>
             <a:r>
               <a:rPr lang="en-US" dirty="0"/>
-              <a:t>Write proc for insert and select of images</a:t>
-            </a:r>
-          </a:p>
-          <a:p>
-            <a:r>
-              <a:rPr lang="en-US" dirty="0"/>
-              <a:t>Create new test for insert, don’t fill stub</a:t>
-            </a:r>
-          </a:p>
-          <a:p>
-            <a:r>
-              <a:rPr lang="en-US" dirty="0"/>
-              <a:t>Create new test for select and edit</a:t>
-            </a:r>
-          </a:p>
-          <a:p>
-            <a:r>
-              <a:rPr lang="en-US" dirty="0"/>
-              <a:t>Run tests, get caught naming issues, as well as one procedure works, one fails. We get the failure in the test we didn’t edit.</a:t>
-            </a:r>
-          </a:p>
-          <a:p>
-            <a:r>
-              <a:rPr lang="en-US" dirty="0"/>
-              <a:t>Correct issues in both procedures</a:t>
-            </a:r>
-          </a:p>
-          <a:p>
+              <a:t>Needs a new name, but</a:t>
+            </a:r>
+            <a:r>
+              <a:rPr lang="en-US" baseline="0" dirty="0"/>
+              <a:t> this is where we talk about our demo app slightly (or code). Give a first requirement we need to do.</a:t>
+            </a:r>
             <a:endParaRPr lang="en-US" dirty="0"/>
           </a:p>
         </p:txBody>
@@ -4739,7 +5008,7 @@
     </p:spTree>
     <p:extLst>
       <p:ext uri="{BB962C8B-B14F-4D97-AF65-F5344CB8AC3E}">
-        <p14:creationId xmlns:p14="http://schemas.microsoft.com/office/powerpoint/2010/main" val="582914193"/>
+        <p14:creationId xmlns:p14="http://schemas.microsoft.com/office/powerpoint/2010/main" val="4284040156"/>
       </p:ext>
     </p:extLst>
   </p:cSld>
@@ -8015,7 +8284,7 @@
           <a:p>
             <a:r>
               <a:rPr lang="en-US" dirty="0"/>
-              <a:t>Test Structure</a:t>
+              <a:t>Writing Tests</a:t>
             </a:r>
           </a:p>
         </p:txBody>
@@ -8037,25 +8306,32 @@
           <a:p>
             <a:r>
               <a:rPr lang="en-US" dirty="0"/>
-              <a:t>AAA</a:t>
+              <a:t>TDD?</a:t>
             </a:r>
           </a:p>
           <a:p>
             <a:r>
               <a:rPr lang="en-US" dirty="0"/>
-              <a:t>Assemble – prepare the environment</a:t>
+              <a:t>During development.</a:t>
             </a:r>
           </a:p>
           <a:p>
             <a:r>
               <a:rPr lang="en-US" dirty="0"/>
-              <a:t>Act – Execute the code</a:t>
-            </a:r>
-          </a:p>
-          <a:p>
+              <a:t>Write after if you must.</a:t>
+            </a:r>
+          </a:p>
+          <a:p>
+            <a:pPr lvl="1"/>
             <a:r>
               <a:rPr lang="en-US" dirty="0"/>
-              <a:t>Assert – Determine if the test succeeded. </a:t>
+              <a:t>Good for existing code</a:t>
+            </a:r>
+          </a:p>
+          <a:p>
+            <a:r>
+              <a:rPr lang="en-US" dirty="0"/>
+              <a:t>Write as you get feedback from CI and QA testing.</a:t>
             </a:r>
           </a:p>
         </p:txBody>
@@ -8063,7 +8339,7 @@
     </p:spTree>
     <p:extLst>
       <p:ext uri="{BB962C8B-B14F-4D97-AF65-F5344CB8AC3E}">
-        <p14:creationId xmlns:p14="http://schemas.microsoft.com/office/powerpoint/2010/main" val="1834405379"/>
+        <p14:creationId xmlns:p14="http://schemas.microsoft.com/office/powerpoint/2010/main" val="1110580934"/>
       </p:ext>
     </p:extLst>
   </p:cSld>
@@ -8107,7 +8383,7 @@
           <a:p>
             <a:r>
               <a:rPr lang="en-US" dirty="0"/>
-              <a:t>Types of Tests</a:t>
+              <a:t>Structure of tests</a:t>
             </a:r>
           </a:p>
         </p:txBody>
@@ -8124,32 +8400,144 @@
         </p:nvSpPr>
         <p:spPr/>
         <p:txBody>
-          <a:bodyPr/>
-          <a:lstStyle/>
-          <a:p>
-            <a:r>
-              <a:rPr lang="en-US" dirty="0"/>
-              <a:t>Standards Tests</a:t>
-            </a:r>
-          </a:p>
-          <a:p>
-            <a:r>
-              <a:rPr lang="en-US" dirty="0"/>
-              <a:t>Logic Tests</a:t>
-            </a:r>
-          </a:p>
-          <a:p>
-            <a:r>
-              <a:rPr lang="en-US" dirty="0"/>
-              <a:t>Performance Tests</a:t>
-            </a:r>
+          <a:bodyPr>
+            <a:normAutofit/>
+          </a:bodyPr>
+          <a:lstStyle/>
+          <a:p>
+            <a:pPr>
+              <a:spcAft>
+                <a:spcPts val="450"/>
+              </a:spcAft>
+              <a:buClr>
+                <a:srgbClr val="C00000"/>
+              </a:buClr>
+            </a:pPr>
+            <a:r>
+              <a:rPr lang="en-US" sz="2100" b="1" dirty="0">
+                <a:latin typeface="Arial" panose="020B0604020202020204" pitchFamily="34" charset="0"/>
+                <a:cs typeface="Arial" panose="020B0604020202020204" pitchFamily="34" charset="0"/>
+              </a:rPr>
+              <a:t>Classes</a:t>
+            </a:r>
+          </a:p>
+          <a:p>
+            <a:pPr marL="933450" lvl="1" indent="-457200">
+              <a:buFont typeface="Arial"/>
+              <a:buChar char="•"/>
+            </a:pPr>
+            <a:r>
+              <a:rPr lang="en-US" sz="2100" dirty="0">
+                <a:latin typeface="Arial" panose="020B0604020202020204" pitchFamily="34" charset="0"/>
+                <a:cs typeface="Arial" panose="020B0604020202020204" pitchFamily="34" charset="0"/>
+              </a:rPr>
+              <a:t>Group by object/area being tested</a:t>
+            </a:r>
+          </a:p>
+          <a:p>
+            <a:pPr marL="476250" lvl="1" indent="0">
+              <a:buNone/>
+            </a:pPr>
+            <a:r>
+              <a:rPr lang="en-US" sz="2100" dirty="0">
+                <a:latin typeface="Arial" panose="020B0604020202020204" pitchFamily="34" charset="0"/>
+                <a:cs typeface="Arial" panose="020B0604020202020204" pitchFamily="34" charset="0"/>
+              </a:rPr>
+              <a:t> </a:t>
+            </a:r>
+          </a:p>
+          <a:p>
+            <a:pPr>
+              <a:spcAft>
+                <a:spcPts val="450"/>
+              </a:spcAft>
+              <a:buClr>
+                <a:srgbClr val="C00000"/>
+              </a:buClr>
+            </a:pPr>
+            <a:r>
+              <a:rPr lang="en-US" sz="2100" b="1" dirty="0">
+                <a:latin typeface="Arial" panose="020B0604020202020204" pitchFamily="34" charset="0"/>
+                <a:cs typeface="Arial" panose="020B0604020202020204" pitchFamily="34" charset="0"/>
+              </a:rPr>
+              <a:t>Layout</a:t>
+            </a:r>
+          </a:p>
+          <a:p>
+            <a:pPr marL="933450" lvl="1" indent="-457200">
+              <a:buFont typeface="Arial"/>
+              <a:buChar char="•"/>
+            </a:pPr>
+            <a:r>
+              <a:rPr lang="en-US" sz="2100" dirty="0">
+                <a:latin typeface="Arial" panose="020B0604020202020204" pitchFamily="34" charset="0"/>
+                <a:cs typeface="Arial" panose="020B0604020202020204" pitchFamily="34" charset="0"/>
+              </a:rPr>
+              <a:t>Assemble</a:t>
+            </a:r>
+          </a:p>
+          <a:p>
+            <a:pPr marL="933450" lvl="1" indent="-457200">
+              <a:buFont typeface="Arial"/>
+              <a:buChar char="•"/>
+            </a:pPr>
+            <a:r>
+              <a:rPr lang="en-US" sz="2100" dirty="0">
+                <a:latin typeface="Arial" panose="020B0604020202020204" pitchFamily="34" charset="0"/>
+                <a:cs typeface="Arial" panose="020B0604020202020204" pitchFamily="34" charset="0"/>
+              </a:rPr>
+              <a:t>Act</a:t>
+            </a:r>
+          </a:p>
+          <a:p>
+            <a:pPr marL="933450" lvl="1" indent="-457200">
+              <a:buFont typeface="Arial"/>
+              <a:buChar char="•"/>
+            </a:pPr>
+            <a:r>
+              <a:rPr lang="en-US" sz="2100" dirty="0">
+                <a:latin typeface="Arial" panose="020B0604020202020204" pitchFamily="34" charset="0"/>
+                <a:cs typeface="Arial" panose="020B0604020202020204" pitchFamily="34" charset="0"/>
+              </a:rPr>
+              <a:t>Assert</a:t>
+            </a:r>
+          </a:p>
+          <a:p>
+            <a:pPr marL="933450" lvl="1" indent="-457200">
+              <a:buFont typeface="Arial"/>
+              <a:buChar char="•"/>
+            </a:pPr>
+            <a:endParaRPr lang="en-US" sz="2100" dirty="0">
+              <a:latin typeface="Arial" panose="020B0604020202020204" pitchFamily="34" charset="0"/>
+              <a:cs typeface="Arial" panose="020B0604020202020204" pitchFamily="34" charset="0"/>
+            </a:endParaRPr>
+          </a:p>
+          <a:p>
+            <a:pPr>
+              <a:spcAft>
+                <a:spcPts val="450"/>
+              </a:spcAft>
+              <a:buClr>
+                <a:srgbClr val="C00000"/>
+              </a:buClr>
+            </a:pPr>
+            <a:r>
+              <a:rPr lang="en-US" sz="2100" b="1" dirty="0">
+                <a:latin typeface="Arial" panose="020B0604020202020204" pitchFamily="34" charset="0"/>
+                <a:cs typeface="Arial" panose="020B0604020202020204" pitchFamily="34" charset="0"/>
+              </a:rPr>
+              <a:t>Tests fail first</a:t>
+            </a:r>
+          </a:p>
+          <a:p>
+            <a:endParaRPr lang="en-US" dirty="0"/>
           </a:p>
         </p:txBody>
       </p:sp>
     </p:spTree>
     <p:extLst>
       <p:ext uri="{BB962C8B-B14F-4D97-AF65-F5344CB8AC3E}">
-        <p14:creationId xmlns:p14="http://schemas.microsoft.com/office/powerpoint/2010/main" val="2760051257"/>
+        <p14:creationId xmlns:p14="http://schemas.microsoft.com/office/powerpoint/2010/main" val="3790041024"/>
       </p:ext>
     </p:extLst>
   </p:cSld>
@@ -8193,7 +8581,7 @@
           <a:p>
             <a:r>
               <a:rPr lang="en-US" dirty="0"/>
-              <a:t>Standards Tests</a:t>
+              <a:t>Test Data</a:t>
             </a:r>
           </a:p>
         </p:txBody>
@@ -8215,23 +8603,19 @@
           <a:p>
             <a:r>
               <a:rPr lang="en-US" dirty="0"/>
-              <a:t>Ensure that the standards you care about are followed.</a:t>
-            </a:r>
-          </a:p>
-          <a:p>
-            <a:r>
-              <a:rPr lang="en-US" dirty="0" err="1"/>
-              <a:t>SQLCop</a:t>
-            </a:r>
+              <a:t>We don't need lots of data to write code</a:t>
+            </a:r>
+          </a:p>
+          <a:p>
             <a:r>
               <a:rPr lang="en-US" dirty="0"/>
-              <a:t> – sqlcop.lessthandot.com</a:t>
+              <a:t>Ideally our tests contain data</a:t>
             </a:r>
           </a:p>
           <a:p>
             <a:r>
               <a:rPr lang="en-US" dirty="0"/>
-              <a:t>Easy to write your own.</a:t>
+              <a:t>For more extensive testing, we should have a curated set of data that all developers (and systems) use.</a:t>
             </a:r>
           </a:p>
         </p:txBody>
@@ -8239,7 +8623,7 @@
     </p:spTree>
     <p:extLst>
       <p:ext uri="{BB962C8B-B14F-4D97-AF65-F5344CB8AC3E}">
-        <p14:creationId xmlns:p14="http://schemas.microsoft.com/office/powerpoint/2010/main" val="1619672544"/>
+        <p14:creationId xmlns:p14="http://schemas.microsoft.com/office/powerpoint/2010/main" val="1968612938"/>
       </p:ext>
     </p:extLst>
   </p:cSld>
@@ -8282,45 +8666,100 @@
           <a:lstStyle/>
           <a:p>
             <a:r>
+              <a:rPr lang="en-US" dirty="0" err="1"/>
+              <a:t>tSQLt</a:t>
+            </a:r>
+            <a:endParaRPr lang="en-US" dirty="0"/>
+          </a:p>
+        </p:txBody>
+      </p:sp>
+      <p:sp>
+        <p:nvSpPr>
+          <p:cNvPr id="3" name="Content Placeholder 2"/>
+          <p:cNvSpPr>
+            <a:spLocks noGrp="1"/>
+          </p:cNvSpPr>
+          <p:nvPr>
+            <p:ph idx="1"/>
+          </p:nvPr>
+        </p:nvSpPr>
+        <p:spPr/>
+        <p:txBody>
+          <a:bodyPr/>
+          <a:lstStyle/>
+          <a:p>
+            <a:r>
+              <a:rPr lang="en-US" dirty="0" err="1"/>
+              <a:t>tSQLt</a:t>
+            </a:r>
+            <a:r>
               <a:rPr lang="en-US" dirty="0"/>
-              <a:t>Our Story</a:t>
-            </a:r>
-          </a:p>
-        </p:txBody>
-      </p:sp>
-      <p:sp>
-        <p:nvSpPr>
-          <p:cNvPr id="3" name="Content Placeholder 2"/>
-          <p:cNvSpPr>
-            <a:spLocks noGrp="1"/>
-          </p:cNvSpPr>
-          <p:nvPr>
-            <p:ph idx="1"/>
-          </p:nvPr>
-        </p:nvSpPr>
-        <p:spPr/>
-        <p:txBody>
-          <a:bodyPr/>
-          <a:lstStyle/>
-          <a:p>
+              <a:t> is a free testing framework similar to </a:t>
+            </a:r>
+            <a:r>
+              <a:rPr lang="en-US" dirty="0" err="1"/>
+              <a:t>nUnit</a:t>
+            </a:r>
             <a:r>
               <a:rPr lang="en-US" dirty="0"/>
-              <a:t>This is our app and we need to enhance it</a:t>
+              <a:t>/</a:t>
+            </a:r>
+            <a:r>
+              <a:rPr lang="en-US" dirty="0" err="1"/>
+              <a:t>jUnit</a:t>
+            </a:r>
+            <a:endParaRPr lang="en-US" dirty="0"/>
+          </a:p>
+          <a:p>
+            <a:r>
+              <a:rPr lang="en-US" dirty="0">
+                <a:hlinkClick r:id="rId3"/>
+              </a:rPr>
+              <a:t>tSQLt.org</a:t>
+            </a:r>
+            <a:r>
+              <a:rPr lang="en-US" dirty="0"/>
+              <a:t> – download</a:t>
             </a:r>
           </a:p>
           <a:p>
             <a:pPr lvl="1"/>
             <a:r>
-              <a:rPr lang="en-US" b="1" dirty="0"/>
-              <a:t>We need to add a table to stage the images for articles.</a:t>
-            </a:r>
+              <a:rPr lang="en-US" dirty="0"/>
+              <a:t>Auto setup with SQL Test</a:t>
+            </a:r>
+          </a:p>
+          <a:p>
+            <a:pPr lvl="1"/>
+            <a:r>
+              <a:rPr lang="en-US" dirty="0"/>
+              <a:t>Framework requires CLR</a:t>
+            </a:r>
+          </a:p>
+          <a:p>
+            <a:r>
+              <a:rPr lang="en-US" dirty="0">
+                <a:hlinkClick r:id="rId4"/>
+              </a:rPr>
+              <a:t>Support via Google Groups</a:t>
+            </a:r>
+            <a:endParaRPr lang="en-US" dirty="0"/>
+          </a:p>
+          <a:p>
+            <a:r>
+              <a:rPr lang="en-US" dirty="0">
+                <a:hlinkClick r:id="rId5"/>
+              </a:rPr>
+              <a:t>Articles at Simple Talk</a:t>
+            </a:r>
+            <a:endParaRPr lang="en-US" dirty="0"/>
           </a:p>
         </p:txBody>
       </p:sp>
     </p:spTree>
     <p:extLst>
       <p:ext uri="{BB962C8B-B14F-4D97-AF65-F5344CB8AC3E}">
-        <p14:creationId xmlns:p14="http://schemas.microsoft.com/office/powerpoint/2010/main" val="2542757025"/>
+        <p14:creationId xmlns:p14="http://schemas.microsoft.com/office/powerpoint/2010/main" val="2399096538"/>
       </p:ext>
     </p:extLst>
   </p:cSld>
@@ -8349,7 +8788,7 @@
       </p:grpSpPr>
       <p:sp>
         <p:nvSpPr>
-          <p:cNvPr id="4" name="Title 3"/>
+          <p:cNvPr id="2" name="Title 1"/>
           <p:cNvSpPr>
             <a:spLocks noGrp="1"/>
           </p:cNvSpPr>
@@ -8363,30 +8802,49 @@
           <a:lstStyle/>
           <a:p>
             <a:r>
+              <a:rPr lang="en-US" dirty="0" err="1"/>
+              <a:t>tSQLt</a:t>
+            </a:r>
+            <a:endParaRPr lang="en-US" dirty="0"/>
+          </a:p>
+        </p:txBody>
+      </p:sp>
+      <p:sp>
+        <p:nvSpPr>
+          <p:cNvPr id="3" name="Content Placeholder 2"/>
+          <p:cNvSpPr>
+            <a:spLocks noGrp="1"/>
+          </p:cNvSpPr>
+          <p:nvPr>
+            <p:ph idx="1"/>
+          </p:nvPr>
+        </p:nvSpPr>
+        <p:spPr/>
+        <p:txBody>
+          <a:bodyPr/>
+          <a:lstStyle/>
+          <a:p>
+            <a:r>
               <a:rPr lang="en-US" dirty="0"/>
-              <a:t>Catching bad design</a:t>
-            </a:r>
-          </a:p>
-        </p:txBody>
-      </p:sp>
-      <p:sp>
-        <p:nvSpPr>
-          <p:cNvPr id="5" name="Text Placeholder 4"/>
-          <p:cNvSpPr>
-            <a:spLocks noGrp="1"/>
-          </p:cNvSpPr>
-          <p:nvPr>
-            <p:ph type="body" idx="1"/>
-          </p:nvPr>
-        </p:nvSpPr>
-        <p:spPr/>
-        <p:txBody>
-          <a:bodyPr/>
-          <a:lstStyle/>
+              <a:t>Stored procedures in their own schema</a:t>
+            </a:r>
+          </a:p>
           <a:p>
             <a:r>
               <a:rPr lang="en-US" dirty="0"/>
-              <a:t>Demo</a:t>
+              <a:t>Can run setup before tests</a:t>
+            </a:r>
+          </a:p>
+          <a:p>
+            <a:r>
+              <a:rPr lang="en-US" dirty="0"/>
+              <a:t>Can mock objects </a:t>
+            </a:r>
+          </a:p>
+          <a:p>
+            <a:r>
+              <a:rPr lang="en-US" dirty="0"/>
+              <a:t>Can implement teardown</a:t>
             </a:r>
           </a:p>
         </p:txBody>
@@ -8394,7 +8852,7 @@
     </p:spTree>
     <p:extLst>
       <p:ext uri="{BB962C8B-B14F-4D97-AF65-F5344CB8AC3E}">
-        <p14:creationId xmlns:p14="http://schemas.microsoft.com/office/powerpoint/2010/main" val="420280027"/>
+        <p14:creationId xmlns:p14="http://schemas.microsoft.com/office/powerpoint/2010/main" val="1778634078"/>
       </p:ext>
     </p:extLst>
   </p:cSld>
@@ -8438,7 +8896,7 @@
           <a:p>
             <a:r>
               <a:rPr lang="en-US" dirty="0"/>
-              <a:t>Logic Tests</a:t>
+              <a:t>Microsoft Unit Testing Framework</a:t>
             </a:r>
           </a:p>
         </p:txBody>
@@ -8460,15 +8918,36 @@
           <a:p>
             <a:r>
               <a:rPr lang="en-US" dirty="0"/>
-              <a:t>These are unit tests designed to find issues with a particular specific function</a:t>
-            </a:r>
+              <a:t>For SQL Server, implemented as part of SSDT</a:t>
+            </a:r>
+          </a:p>
+          <a:p>
+            <a:r>
+              <a:rPr lang="en-US" dirty="0"/>
+              <a:t>This framework allows us to write tests in T-SQL.</a:t>
+            </a:r>
+          </a:p>
+          <a:p>
+            <a:r>
+              <a:rPr lang="en-US" dirty="0"/>
+              <a:t>Tests are a part of a Visual Studio Database Project</a:t>
+            </a:r>
+          </a:p>
+          <a:p>
+            <a:r>
+              <a:rPr lang="en-US" dirty="0"/>
+              <a:t>The framework handles transaction wrapping</a:t>
+            </a:r>
+          </a:p>
+          <a:p>
+            <a:endParaRPr lang="en-US" dirty="0"/>
           </a:p>
         </p:txBody>
       </p:sp>
     </p:spTree>
     <p:extLst>
       <p:ext uri="{BB962C8B-B14F-4D97-AF65-F5344CB8AC3E}">
-        <p14:creationId xmlns:p14="http://schemas.microsoft.com/office/powerpoint/2010/main" val="2549004961"/>
+        <p14:creationId xmlns:p14="http://schemas.microsoft.com/office/powerpoint/2010/main" val="966011027"/>
       </p:ext>
     </p:extLst>
   </p:cSld>
@@ -8512,7 +8991,7 @@
           <a:p>
             <a:r>
               <a:rPr lang="en-US" dirty="0"/>
-              <a:t>Our Story</a:t>
+              <a:t>Standards Tests</a:t>
             </a:r>
           </a:p>
         </p:txBody>
@@ -8534,21 +9013,30 @@
           <a:p>
             <a:r>
               <a:rPr lang="en-US" dirty="0"/>
-              <a:t>This is our app and we need to enhance it</a:t>
-            </a:r>
-          </a:p>
-          <a:p>
-            <a:pPr lvl="1"/>
+              <a:t>Ensure that the standards you care about are followed.</a:t>
+            </a:r>
+          </a:p>
+          <a:p>
+            <a:r>
+              <a:rPr lang="en-US" dirty="0" err="1"/>
+              <a:t>SQLCop</a:t>
+            </a:r>
             <a:r>
               <a:rPr lang="en-US" dirty="0"/>
-              <a:t>We need to add a table to hold the images for articles.</a:t>
-            </a:r>
-          </a:p>
-          <a:p>
-            <a:pPr lvl="1"/>
-            <a:r>
-              <a:rPr lang="en-US" b="1" dirty="0"/>
-              <a:t>Let’s write a procedures to insert and select back images</a:t>
+              <a:t> – </a:t>
+            </a:r>
+            <a:r>
+              <a:rPr lang="en-US" dirty="0">
+                <a:hlinkClick r:id="rId2"/>
+              </a:rPr>
+              <a:t>sqlcop.lessthandot.com</a:t>
+            </a:r>
+            <a:endParaRPr lang="en-US" dirty="0"/>
+          </a:p>
+          <a:p>
+            <a:r>
+              <a:rPr lang="en-US" dirty="0"/>
+              <a:t>Easy to write your own.</a:t>
             </a:r>
           </a:p>
         </p:txBody>
@@ -8556,7 +9044,7 @@
     </p:spTree>
     <p:extLst>
       <p:ext uri="{BB962C8B-B14F-4D97-AF65-F5344CB8AC3E}">
-        <p14:creationId xmlns:p14="http://schemas.microsoft.com/office/powerpoint/2010/main" val="3492864798"/>
+        <p14:creationId xmlns:p14="http://schemas.microsoft.com/office/powerpoint/2010/main" val="1619672544"/>
       </p:ext>
     </p:extLst>
   </p:cSld>
@@ -8585,7 +9073,7 @@
       </p:grpSpPr>
       <p:sp>
         <p:nvSpPr>
-          <p:cNvPr id="4" name="Title 3"/>
+          <p:cNvPr id="2" name="Title 1"/>
           <p:cNvSpPr>
             <a:spLocks noGrp="1"/>
           </p:cNvSpPr>
@@ -8600,19 +9088,19 @@
           <a:p>
             <a:r>
               <a:rPr lang="en-US" dirty="0"/>
-              <a:t>Testing Stored Procedures</a:t>
-            </a:r>
-          </a:p>
-        </p:txBody>
-      </p:sp>
-      <p:sp>
-        <p:nvSpPr>
-          <p:cNvPr id="5" name="Text Placeholder 4"/>
-          <p:cNvSpPr>
-            <a:spLocks noGrp="1"/>
-          </p:cNvSpPr>
-          <p:nvPr>
-            <p:ph type="body" idx="1"/>
+              <a:t>Our Story</a:t>
+            </a:r>
+          </a:p>
+        </p:txBody>
+      </p:sp>
+      <p:sp>
+        <p:nvSpPr>
+          <p:cNvPr id="3" name="Content Placeholder 2"/>
+          <p:cNvSpPr>
+            <a:spLocks noGrp="1"/>
+          </p:cNvSpPr>
+          <p:nvPr>
+            <p:ph idx="1"/>
           </p:nvPr>
         </p:nvSpPr>
         <p:spPr/>
@@ -8622,7 +9110,14 @@
           <a:p>
             <a:r>
               <a:rPr lang="en-US" dirty="0"/>
-              <a:t>Demo</a:t>
+              <a:t>This is our app and we need to enhance it</a:t>
+            </a:r>
+          </a:p>
+          <a:p>
+            <a:pPr lvl="1"/>
+            <a:r>
+              <a:rPr lang="en-US" b="1" dirty="0"/>
+              <a:t>We need to add a table to stage the images for articles.</a:t>
             </a:r>
           </a:p>
         </p:txBody>
@@ -8630,7 +9125,7 @@
     </p:spTree>
     <p:extLst>
       <p:ext uri="{BB962C8B-B14F-4D97-AF65-F5344CB8AC3E}">
-        <p14:creationId xmlns:p14="http://schemas.microsoft.com/office/powerpoint/2010/main" val="3075909317"/>
+        <p14:creationId xmlns:p14="http://schemas.microsoft.com/office/powerpoint/2010/main" val="2542757025"/>
       </p:ext>
     </p:extLst>
   </p:cSld>
@@ -8659,7 +9154,7 @@
       </p:grpSpPr>
       <p:sp>
         <p:nvSpPr>
-          <p:cNvPr id="2" name="Title 1"/>
+          <p:cNvPr id="4" name="Title 3"/>
           <p:cNvSpPr>
             <a:spLocks noGrp="1"/>
           </p:cNvSpPr>
@@ -8674,19 +9169,19 @@
           <a:p>
             <a:r>
               <a:rPr lang="en-US" dirty="0"/>
-              <a:t>Our Story</a:t>
-            </a:r>
-          </a:p>
-        </p:txBody>
-      </p:sp>
-      <p:sp>
-        <p:nvSpPr>
-          <p:cNvPr id="3" name="Content Placeholder 2"/>
-          <p:cNvSpPr>
-            <a:spLocks noGrp="1"/>
-          </p:cNvSpPr>
-          <p:nvPr>
-            <p:ph idx="1"/>
+              <a:t>Catching bad design</a:t>
+            </a:r>
+          </a:p>
+        </p:txBody>
+      </p:sp>
+      <p:sp>
+        <p:nvSpPr>
+          <p:cNvPr id="5" name="Text Placeholder 4"/>
+          <p:cNvSpPr>
+            <a:spLocks noGrp="1"/>
+          </p:cNvSpPr>
+          <p:nvPr>
+            <p:ph type="body" idx="1"/>
           </p:nvPr>
         </p:nvSpPr>
         <p:spPr/>
@@ -8696,28 +9191,7 @@
           <a:p>
             <a:r>
               <a:rPr lang="en-US" dirty="0"/>
-              <a:t>This is our app and we need to enhance it</a:t>
-            </a:r>
-          </a:p>
-          <a:p>
-            <a:pPr lvl="1"/>
-            <a:r>
-              <a:rPr lang="en-US" dirty="0"/>
-              <a:t>We need to add a table to hold the images for articles.</a:t>
-            </a:r>
-          </a:p>
-          <a:p>
-            <a:pPr lvl="1"/>
-            <a:r>
-              <a:rPr lang="en-US" dirty="0"/>
-              <a:t>Let’s write a procedures to insert and select back images</a:t>
-            </a:r>
-          </a:p>
-          <a:p>
-            <a:pPr lvl="1"/>
-            <a:r>
-              <a:rPr lang="en-US" b="1" dirty="0"/>
-              <a:t>More complex logic, refactoring a a procedure that can query for some type of aggregate</a:t>
+              <a:t>Demo</a:t>
             </a:r>
           </a:p>
         </p:txBody>
@@ -8725,7 +9199,7 @@
     </p:spTree>
     <p:extLst>
       <p:ext uri="{BB962C8B-B14F-4D97-AF65-F5344CB8AC3E}">
-        <p14:creationId xmlns:p14="http://schemas.microsoft.com/office/powerpoint/2010/main" val="4238152070"/>
+        <p14:creationId xmlns:p14="http://schemas.microsoft.com/office/powerpoint/2010/main" val="420280027"/>
       </p:ext>
     </p:extLst>
   </p:cSld>
@@ -8754,7 +9228,7 @@
       </p:grpSpPr>
       <p:sp>
         <p:nvSpPr>
-          <p:cNvPr id="4" name="Title 3"/>
+          <p:cNvPr id="2" name="Title 1"/>
           <p:cNvSpPr>
             <a:spLocks noGrp="1"/>
           </p:cNvSpPr>
@@ -8769,19 +9243,19 @@
           <a:p>
             <a:r>
               <a:rPr lang="en-US" dirty="0"/>
-              <a:t>Preventing Regressions</a:t>
-            </a:r>
-          </a:p>
-        </p:txBody>
-      </p:sp>
-      <p:sp>
-        <p:nvSpPr>
-          <p:cNvPr id="5" name="Text Placeholder 4"/>
-          <p:cNvSpPr>
-            <a:spLocks noGrp="1"/>
-          </p:cNvSpPr>
-          <p:nvPr>
-            <p:ph type="body" idx="1"/>
+              <a:t>Logic Tests</a:t>
+            </a:r>
+          </a:p>
+        </p:txBody>
+      </p:sp>
+      <p:sp>
+        <p:nvSpPr>
+          <p:cNvPr id="3" name="Content Placeholder 2"/>
+          <p:cNvSpPr>
+            <a:spLocks noGrp="1"/>
+          </p:cNvSpPr>
+          <p:nvPr>
+            <p:ph idx="1"/>
           </p:nvPr>
         </p:nvSpPr>
         <p:spPr/>
@@ -8791,7 +9265,13 @@
           <a:p>
             <a:r>
               <a:rPr lang="en-US" dirty="0"/>
-              <a:t>Demo</a:t>
+              <a:t>These are unit tests designed to find issues with a particular specific function.</a:t>
+            </a:r>
+          </a:p>
+          <a:p>
+            <a:r>
+              <a:rPr lang="en-US" dirty="0"/>
+              <a:t>This are especially useful when refactoring code as requirements may not be clear</a:t>
             </a:r>
           </a:p>
         </p:txBody>
@@ -8799,7 +9279,7 @@
     </p:spTree>
     <p:extLst>
       <p:ext uri="{BB962C8B-B14F-4D97-AF65-F5344CB8AC3E}">
-        <p14:creationId xmlns:p14="http://schemas.microsoft.com/office/powerpoint/2010/main" val="1027799721"/>
+        <p14:creationId xmlns:p14="http://schemas.microsoft.com/office/powerpoint/2010/main" val="2549004961"/>
       </p:ext>
     </p:extLst>
   </p:cSld>
@@ -8940,7 +9420,7 @@
           <a:p>
             <a:r>
               <a:rPr lang="en-US" dirty="0"/>
-              <a:t>Having a Test Suite</a:t>
+              <a:t>Our Story</a:t>
             </a:r>
           </a:p>
         </p:txBody>
@@ -8962,19 +9442,21 @@
           <a:p>
             <a:r>
               <a:rPr lang="en-US" dirty="0"/>
-              <a:t>By continuing to grow your test suite with each change, developers spread the load</a:t>
-            </a:r>
-          </a:p>
-          <a:p>
+              <a:t>This is our app and we need to enhance it</a:t>
+            </a:r>
+          </a:p>
+          <a:p>
+            <a:pPr lvl="1"/>
             <a:r>
               <a:rPr lang="en-US" dirty="0"/>
-              <a:t>By having a large suite, we have better code coverage.</a:t>
-            </a:r>
-          </a:p>
-          <a:p>
-            <a:r>
-              <a:rPr lang="en-US" dirty="0"/>
-              <a:t>We can easily regression test.</a:t>
+              <a:t>We need to add a table to hold the images for articles.</a:t>
+            </a:r>
+          </a:p>
+          <a:p>
+            <a:pPr lvl="1"/>
+            <a:r>
+              <a:rPr lang="en-US" b="1" dirty="0"/>
+              <a:t>Let’s check our sales tax calculation</a:t>
             </a:r>
           </a:p>
         </p:txBody>
@@ -8982,7 +9464,7 @@
     </p:spTree>
     <p:extLst>
       <p:ext uri="{BB962C8B-B14F-4D97-AF65-F5344CB8AC3E}">
-        <p14:creationId xmlns:p14="http://schemas.microsoft.com/office/powerpoint/2010/main" val="2479422556"/>
+        <p14:creationId xmlns:p14="http://schemas.microsoft.com/office/powerpoint/2010/main" val="3492864798"/>
       </p:ext>
     </p:extLst>
   </p:cSld>
@@ -9011,7 +9493,7 @@
       </p:grpSpPr>
       <p:sp>
         <p:nvSpPr>
-          <p:cNvPr id="2" name="Title 1"/>
+          <p:cNvPr id="4" name="Title 3"/>
           <p:cNvSpPr>
             <a:spLocks noGrp="1"/>
           </p:cNvSpPr>
@@ -9026,19 +9508,19 @@
           <a:p>
             <a:r>
               <a:rPr lang="en-US" dirty="0"/>
-              <a:t>Summary</a:t>
-            </a:r>
-          </a:p>
-        </p:txBody>
-      </p:sp>
-      <p:sp>
-        <p:nvSpPr>
-          <p:cNvPr id="3" name="Content Placeholder 2"/>
-          <p:cNvSpPr>
-            <a:spLocks noGrp="1"/>
-          </p:cNvSpPr>
-          <p:nvPr>
-            <p:ph idx="1"/>
+              <a:t>Testing Stored Procedures</a:t>
+            </a:r>
+          </a:p>
+        </p:txBody>
+      </p:sp>
+      <p:sp>
+        <p:nvSpPr>
+          <p:cNvPr id="5" name="Text Placeholder 4"/>
+          <p:cNvSpPr>
+            <a:spLocks noGrp="1"/>
+          </p:cNvSpPr>
+          <p:nvPr>
+            <p:ph type="body" idx="1"/>
           </p:nvPr>
         </p:nvSpPr>
         <p:spPr/>
@@ -9048,33 +9530,7 @@
           <a:p>
             <a:r>
               <a:rPr lang="en-US" dirty="0"/>
-              <a:t>Testing will improve the quality of your code</a:t>
-            </a:r>
-          </a:p>
-          <a:p>
-            <a:r>
-              <a:rPr lang="en-US" dirty="0"/>
-              <a:t>Testing will lower the cost of code</a:t>
-            </a:r>
-          </a:p>
-          <a:p>
-            <a:r>
-              <a:rPr lang="en-US" dirty="0" err="1"/>
-              <a:t>tSQLt</a:t>
-            </a:r>
-            <a:r>
-              <a:rPr lang="en-US" dirty="0"/>
-              <a:t> is a framework for testing T-SQL code</a:t>
-            </a:r>
-          </a:p>
-          <a:p>
-            <a:r>
-              <a:rPr lang="en-US" dirty="0"/>
-              <a:t>SQL Cop can help you easily test </a:t>
-            </a:r>
-            <a:r>
-              <a:rPr lang="en-US"/>
-              <a:t>for standards</a:t>
+              <a:t>Demo</a:t>
             </a:r>
           </a:p>
         </p:txBody>
@@ -9082,7 +9538,7 @@
     </p:spTree>
     <p:extLst>
       <p:ext uri="{BB962C8B-B14F-4D97-AF65-F5344CB8AC3E}">
-        <p14:creationId xmlns:p14="http://schemas.microsoft.com/office/powerpoint/2010/main" val="3709868887"/>
+        <p14:creationId xmlns:p14="http://schemas.microsoft.com/office/powerpoint/2010/main" val="3075909317"/>
       </p:ext>
     </p:extLst>
   </p:cSld>
@@ -9126,6 +9582,366 @@
           <a:p>
             <a:r>
               <a:rPr lang="en-US" dirty="0"/>
+              <a:t>Our Story</a:t>
+            </a:r>
+          </a:p>
+        </p:txBody>
+      </p:sp>
+      <p:sp>
+        <p:nvSpPr>
+          <p:cNvPr id="3" name="Content Placeholder 2"/>
+          <p:cNvSpPr>
+            <a:spLocks noGrp="1"/>
+          </p:cNvSpPr>
+          <p:nvPr>
+            <p:ph idx="1"/>
+          </p:nvPr>
+        </p:nvSpPr>
+        <p:spPr/>
+        <p:txBody>
+          <a:bodyPr/>
+          <a:lstStyle/>
+          <a:p>
+            <a:r>
+              <a:rPr lang="en-US" dirty="0"/>
+              <a:t>This is our app and we need to enhance it</a:t>
+            </a:r>
+          </a:p>
+          <a:p>
+            <a:pPr lvl="1"/>
+            <a:r>
+              <a:rPr lang="en-US" dirty="0"/>
+              <a:t>We need to add a table to hold the images for articles.</a:t>
+            </a:r>
+          </a:p>
+          <a:p>
+            <a:pPr lvl="1"/>
+            <a:r>
+              <a:rPr lang="en-US" dirty="0"/>
+              <a:t>Let’s check our sales tax calculation</a:t>
+            </a:r>
+          </a:p>
+          <a:p>
+            <a:pPr lvl="1"/>
+            <a:r>
+              <a:rPr lang="en-US" b="1" dirty="0"/>
+              <a:t>We want to ensure we always get the latest headlines</a:t>
+            </a:r>
+          </a:p>
+        </p:txBody>
+      </p:sp>
+    </p:spTree>
+    <p:extLst>
+      <p:ext uri="{BB962C8B-B14F-4D97-AF65-F5344CB8AC3E}">
+        <p14:creationId xmlns:p14="http://schemas.microsoft.com/office/powerpoint/2010/main" val="4238152070"/>
+      </p:ext>
+    </p:extLst>
+  </p:cSld>
+  <p:clrMapOvr>
+    <a:masterClrMapping/>
+  </p:clrMapOvr>
+</p:sld>
+</file>
+
+<file path=ppt/slides/slide23.xml><?xml version="1.0" encoding="utf-8"?>
+<p:sld xmlns:a="http://schemas.openxmlformats.org/drawingml/2006/main" xmlns:r="http://schemas.openxmlformats.org/officeDocument/2006/relationships" xmlns:p="http://schemas.openxmlformats.org/presentationml/2006/main">
+  <p:cSld>
+    <p:spTree>
+      <p:nvGrpSpPr>
+        <p:cNvPr id="1" name=""/>
+        <p:cNvGrpSpPr/>
+        <p:nvPr/>
+      </p:nvGrpSpPr>
+      <p:grpSpPr>
+        <a:xfrm>
+          <a:off x="0" y="0"/>
+          <a:ext cx="0" cy="0"/>
+          <a:chOff x="0" y="0"/>
+          <a:chExt cx="0" cy="0"/>
+        </a:xfrm>
+      </p:grpSpPr>
+      <p:sp>
+        <p:nvSpPr>
+          <p:cNvPr id="4" name="Title 3"/>
+          <p:cNvSpPr>
+            <a:spLocks noGrp="1"/>
+          </p:cNvSpPr>
+          <p:nvPr>
+            <p:ph type="title"/>
+          </p:nvPr>
+        </p:nvSpPr>
+        <p:spPr/>
+        <p:txBody>
+          <a:bodyPr/>
+          <a:lstStyle/>
+          <a:p>
+            <a:r>
+              <a:rPr lang="en-US" dirty="0"/>
+              <a:t>Preventing Data </a:t>
+            </a:r>
+            <a:r>
+              <a:rPr lang="en-US" dirty="0" err="1"/>
+              <a:t>IsSues</a:t>
+            </a:r>
+            <a:endParaRPr lang="en-US" dirty="0"/>
+          </a:p>
+        </p:txBody>
+      </p:sp>
+      <p:sp>
+        <p:nvSpPr>
+          <p:cNvPr id="5" name="Text Placeholder 4"/>
+          <p:cNvSpPr>
+            <a:spLocks noGrp="1"/>
+          </p:cNvSpPr>
+          <p:nvPr>
+            <p:ph type="body" idx="1"/>
+          </p:nvPr>
+        </p:nvSpPr>
+        <p:spPr/>
+        <p:txBody>
+          <a:bodyPr/>
+          <a:lstStyle/>
+          <a:p>
+            <a:r>
+              <a:rPr lang="en-US" dirty="0"/>
+              <a:t>Demo</a:t>
+            </a:r>
+          </a:p>
+        </p:txBody>
+      </p:sp>
+    </p:spTree>
+    <p:extLst>
+      <p:ext uri="{BB962C8B-B14F-4D97-AF65-F5344CB8AC3E}">
+        <p14:creationId xmlns:p14="http://schemas.microsoft.com/office/powerpoint/2010/main" val="1027799721"/>
+      </p:ext>
+    </p:extLst>
+  </p:cSld>
+  <p:clrMapOvr>
+    <a:masterClrMapping/>
+  </p:clrMapOvr>
+</p:sld>
+</file>
+
+<file path=ppt/slides/slide24.xml><?xml version="1.0" encoding="utf-8"?>
+<p:sld xmlns:a="http://schemas.openxmlformats.org/drawingml/2006/main" xmlns:r="http://schemas.openxmlformats.org/officeDocument/2006/relationships" xmlns:p="http://schemas.openxmlformats.org/presentationml/2006/main">
+  <p:cSld>
+    <p:spTree>
+      <p:nvGrpSpPr>
+        <p:cNvPr id="1" name=""/>
+        <p:cNvGrpSpPr/>
+        <p:nvPr/>
+      </p:nvGrpSpPr>
+      <p:grpSpPr>
+        <a:xfrm>
+          <a:off x="0" y="0"/>
+          <a:ext cx="0" cy="0"/>
+          <a:chOff x="0" y="0"/>
+          <a:chExt cx="0" cy="0"/>
+        </a:xfrm>
+      </p:grpSpPr>
+      <p:sp>
+        <p:nvSpPr>
+          <p:cNvPr id="2" name="Title 1"/>
+          <p:cNvSpPr>
+            <a:spLocks noGrp="1"/>
+          </p:cNvSpPr>
+          <p:nvPr>
+            <p:ph type="title"/>
+          </p:nvPr>
+        </p:nvSpPr>
+        <p:spPr/>
+        <p:txBody>
+          <a:bodyPr/>
+          <a:lstStyle/>
+          <a:p>
+            <a:r>
+              <a:rPr lang="en-US" dirty="0"/>
+              <a:t>Having a Test Suite</a:t>
+            </a:r>
+          </a:p>
+        </p:txBody>
+      </p:sp>
+      <p:sp>
+        <p:nvSpPr>
+          <p:cNvPr id="3" name="Content Placeholder 2"/>
+          <p:cNvSpPr>
+            <a:spLocks noGrp="1"/>
+          </p:cNvSpPr>
+          <p:nvPr>
+            <p:ph idx="1"/>
+          </p:nvPr>
+        </p:nvSpPr>
+        <p:spPr/>
+        <p:txBody>
+          <a:bodyPr/>
+          <a:lstStyle/>
+          <a:p>
+            <a:r>
+              <a:rPr lang="en-US" dirty="0"/>
+              <a:t>By continuing to grow your test suite with each change, developers spread the load</a:t>
+            </a:r>
+          </a:p>
+          <a:p>
+            <a:r>
+              <a:rPr lang="en-US" dirty="0"/>
+              <a:t>By having a large suite, we have better code coverage.</a:t>
+            </a:r>
+          </a:p>
+          <a:p>
+            <a:r>
+              <a:rPr lang="en-US" dirty="0"/>
+              <a:t>We can easily regression test.</a:t>
+            </a:r>
+          </a:p>
+        </p:txBody>
+      </p:sp>
+    </p:spTree>
+    <p:extLst>
+      <p:ext uri="{BB962C8B-B14F-4D97-AF65-F5344CB8AC3E}">
+        <p14:creationId xmlns:p14="http://schemas.microsoft.com/office/powerpoint/2010/main" val="2479422556"/>
+      </p:ext>
+    </p:extLst>
+  </p:cSld>
+  <p:clrMapOvr>
+    <a:masterClrMapping/>
+  </p:clrMapOvr>
+</p:sld>
+</file>
+
+<file path=ppt/slides/slide25.xml><?xml version="1.0" encoding="utf-8"?>
+<p:sld xmlns:a="http://schemas.openxmlformats.org/drawingml/2006/main" xmlns:r="http://schemas.openxmlformats.org/officeDocument/2006/relationships" xmlns:p="http://schemas.openxmlformats.org/presentationml/2006/main">
+  <p:cSld>
+    <p:spTree>
+      <p:nvGrpSpPr>
+        <p:cNvPr id="1" name=""/>
+        <p:cNvGrpSpPr/>
+        <p:nvPr/>
+      </p:nvGrpSpPr>
+      <p:grpSpPr>
+        <a:xfrm>
+          <a:off x="0" y="0"/>
+          <a:ext cx="0" cy="0"/>
+          <a:chOff x="0" y="0"/>
+          <a:chExt cx="0" cy="0"/>
+        </a:xfrm>
+      </p:grpSpPr>
+      <p:sp>
+        <p:nvSpPr>
+          <p:cNvPr id="2" name="Title 1"/>
+          <p:cNvSpPr>
+            <a:spLocks noGrp="1"/>
+          </p:cNvSpPr>
+          <p:nvPr>
+            <p:ph type="title"/>
+          </p:nvPr>
+        </p:nvSpPr>
+        <p:spPr/>
+        <p:txBody>
+          <a:bodyPr/>
+          <a:lstStyle/>
+          <a:p>
+            <a:r>
+              <a:rPr lang="en-US" dirty="0"/>
+              <a:t>Summary</a:t>
+            </a:r>
+          </a:p>
+        </p:txBody>
+      </p:sp>
+      <p:sp>
+        <p:nvSpPr>
+          <p:cNvPr id="3" name="Content Placeholder 2"/>
+          <p:cNvSpPr>
+            <a:spLocks noGrp="1"/>
+          </p:cNvSpPr>
+          <p:nvPr>
+            <p:ph idx="1"/>
+          </p:nvPr>
+        </p:nvSpPr>
+        <p:spPr/>
+        <p:txBody>
+          <a:bodyPr/>
+          <a:lstStyle/>
+          <a:p>
+            <a:r>
+              <a:rPr lang="en-US" dirty="0"/>
+              <a:t>Testing will improve the quality of your code</a:t>
+            </a:r>
+          </a:p>
+          <a:p>
+            <a:r>
+              <a:rPr lang="en-US" dirty="0"/>
+              <a:t>Testing will lower the cost of code</a:t>
+            </a:r>
+          </a:p>
+          <a:p>
+            <a:r>
+              <a:rPr lang="en-US" dirty="0" err="1"/>
+              <a:t>tSQLt</a:t>
+            </a:r>
+            <a:r>
+              <a:rPr lang="en-US" dirty="0"/>
+              <a:t> is a framework for testing T-SQL code</a:t>
+            </a:r>
+          </a:p>
+          <a:p>
+            <a:r>
+              <a:rPr lang="en-US" dirty="0"/>
+              <a:t>SQL Cop can help you easily test </a:t>
+            </a:r>
+            <a:r>
+              <a:rPr lang="en-US"/>
+              <a:t>for standards</a:t>
+            </a:r>
+          </a:p>
+        </p:txBody>
+      </p:sp>
+    </p:spTree>
+    <p:extLst>
+      <p:ext uri="{BB962C8B-B14F-4D97-AF65-F5344CB8AC3E}">
+        <p14:creationId xmlns:p14="http://schemas.microsoft.com/office/powerpoint/2010/main" val="3709868887"/>
+      </p:ext>
+    </p:extLst>
+  </p:cSld>
+  <p:clrMapOvr>
+    <a:masterClrMapping/>
+  </p:clrMapOvr>
+</p:sld>
+</file>
+
+<file path=ppt/slides/slide26.xml><?xml version="1.0" encoding="utf-8"?>
+<p:sld xmlns:a="http://schemas.openxmlformats.org/drawingml/2006/main" xmlns:r="http://schemas.openxmlformats.org/officeDocument/2006/relationships" xmlns:p="http://schemas.openxmlformats.org/presentationml/2006/main">
+  <p:cSld>
+    <p:spTree>
+      <p:nvGrpSpPr>
+        <p:cNvPr id="1" name=""/>
+        <p:cNvGrpSpPr/>
+        <p:nvPr/>
+      </p:nvGrpSpPr>
+      <p:grpSpPr>
+        <a:xfrm>
+          <a:off x="0" y="0"/>
+          <a:ext cx="0" cy="0"/>
+          <a:chOff x="0" y="0"/>
+          <a:chExt cx="0" cy="0"/>
+        </a:xfrm>
+      </p:grpSpPr>
+      <p:sp>
+        <p:nvSpPr>
+          <p:cNvPr id="2" name="Title 1"/>
+          <p:cNvSpPr>
+            <a:spLocks noGrp="1"/>
+          </p:cNvSpPr>
+          <p:nvPr>
+            <p:ph type="title"/>
+          </p:nvPr>
+        </p:nvSpPr>
+        <p:spPr/>
+        <p:txBody>
+          <a:bodyPr/>
+          <a:lstStyle/>
+          <a:p>
+            <a:r>
+              <a:rPr lang="en-US" dirty="0"/>
               <a:t>The Continuous Delivery Pipeline</a:t>
             </a:r>
           </a:p>
@@ -9169,7 +9985,7 @@
 </p:sld>
 </file>
 
-<file path=ppt/slides/slide23.xml><?xml version="1.0" encoding="utf-8"?>
+<file path=ppt/slides/slide27.xml><?xml version="1.0" encoding="utf-8"?>
 <p:sld xmlns:a="http://schemas.openxmlformats.org/drawingml/2006/main" xmlns:r="http://schemas.openxmlformats.org/officeDocument/2006/relationships" xmlns:p="http://schemas.openxmlformats.org/presentationml/2006/main">
   <p:cSld>
     <p:spTree>
@@ -9762,7 +10578,7 @@
 </p:sld>
 </file>
 
-<file path=ppt/slides/slide24.xml><?xml version="1.0" encoding="utf-8"?>
+<file path=ppt/slides/slide28.xml><?xml version="1.0" encoding="utf-8"?>
 <p:sld xmlns:a="http://schemas.openxmlformats.org/drawingml/2006/main" xmlns:r="http://schemas.openxmlformats.org/officeDocument/2006/relationships" xmlns:p="http://schemas.openxmlformats.org/presentationml/2006/main">
   <p:cSld>
     <p:spTree>
@@ -9860,7 +10676,7 @@
 </p:sld>
 </file>
 
-<file path=ppt/slides/slide25.xml><?xml version="1.0" encoding="utf-8"?>
+<file path=ppt/slides/slide29.xml><?xml version="1.0" encoding="utf-8"?>
 <p:sld xmlns:a="http://schemas.openxmlformats.org/drawingml/2006/main" xmlns:r="http://schemas.openxmlformats.org/officeDocument/2006/relationships" xmlns:p="http://schemas.openxmlformats.org/presentationml/2006/main">
   <p:cSld>
     <p:spTree>
@@ -9948,74 +10764,6 @@
     <p:extLst>
       <p:ext uri="{BB962C8B-B14F-4D97-AF65-F5344CB8AC3E}">
         <p14:creationId xmlns:p14="http://schemas.microsoft.com/office/powerpoint/2010/main" val="2354176993"/>
-      </p:ext>
-    </p:extLst>
-  </p:cSld>
-  <p:clrMapOvr>
-    <a:masterClrMapping/>
-  </p:clrMapOvr>
-</p:sld>
-</file>
-
-<file path=ppt/slides/slide26.xml><?xml version="1.0" encoding="utf-8"?>
-<p:sld xmlns:a="http://schemas.openxmlformats.org/drawingml/2006/main" xmlns:r="http://schemas.openxmlformats.org/officeDocument/2006/relationships" xmlns:p="http://schemas.openxmlformats.org/presentationml/2006/main">
-  <p:cSld>
-    <p:spTree>
-      <p:nvGrpSpPr>
-        <p:cNvPr id="1" name=""/>
-        <p:cNvGrpSpPr/>
-        <p:nvPr/>
-      </p:nvGrpSpPr>
-      <p:grpSpPr>
-        <a:xfrm>
-          <a:off x="0" y="0"/>
-          <a:ext cx="0" cy="0"/>
-          <a:chOff x="0" y="0"/>
-          <a:chExt cx="0" cy="0"/>
-        </a:xfrm>
-      </p:grpSpPr>
-      <p:sp>
-        <p:nvSpPr>
-          <p:cNvPr id="2" name="Title 1"/>
-          <p:cNvSpPr>
-            <a:spLocks noGrp="1"/>
-          </p:cNvSpPr>
-          <p:nvPr>
-            <p:ph type="title"/>
-          </p:nvPr>
-        </p:nvSpPr>
-        <p:spPr/>
-        <p:txBody>
-          <a:bodyPr/>
-          <a:lstStyle/>
-          <a:p>
-            <a:endParaRPr lang="en-US" dirty="0"/>
-          </a:p>
-        </p:txBody>
-      </p:sp>
-      <p:sp>
-        <p:nvSpPr>
-          <p:cNvPr id="3" name="Content Placeholder 2"/>
-          <p:cNvSpPr>
-            <a:spLocks noGrp="1"/>
-          </p:cNvSpPr>
-          <p:nvPr>
-            <p:ph idx="1"/>
-          </p:nvPr>
-        </p:nvSpPr>
-        <p:spPr/>
-        <p:txBody>
-          <a:bodyPr/>
-          <a:lstStyle/>
-          <a:p>
-            <a:endParaRPr lang="en-US"/>
-          </a:p>
-        </p:txBody>
-      </p:sp>
-    </p:spTree>
-    <p:extLst>
-      <p:ext uri="{BB962C8B-B14F-4D97-AF65-F5344CB8AC3E}">
-        <p14:creationId xmlns:p14="http://schemas.microsoft.com/office/powerpoint/2010/main" val="1667791595"/>
       </p:ext>
     </p:extLst>
   </p:cSld>
@@ -10528,7 +11276,989 @@
 </p:sld>
 </file>
 
+<file path=ppt/slides/slide30.xml><?xml version="1.0" encoding="utf-8"?>
+<p:sld xmlns:a="http://schemas.openxmlformats.org/drawingml/2006/main" xmlns:r="http://schemas.openxmlformats.org/officeDocument/2006/relationships" xmlns:p="http://schemas.openxmlformats.org/presentationml/2006/main">
+  <p:cSld>
+    <p:spTree>
+      <p:nvGrpSpPr>
+        <p:cNvPr id="1" name=""/>
+        <p:cNvGrpSpPr/>
+        <p:nvPr/>
+      </p:nvGrpSpPr>
+      <p:grpSpPr>
+        <a:xfrm>
+          <a:off x="0" y="0"/>
+          <a:ext cx="0" cy="0"/>
+          <a:chOff x="0" y="0"/>
+          <a:chExt cx="0" cy="0"/>
+        </a:xfrm>
+      </p:grpSpPr>
+      <p:sp>
+        <p:nvSpPr>
+          <p:cNvPr id="2" name="Title 1"/>
+          <p:cNvSpPr>
+            <a:spLocks noGrp="1"/>
+          </p:cNvSpPr>
+          <p:nvPr>
+            <p:ph type="title"/>
+          </p:nvPr>
+        </p:nvSpPr>
+        <p:spPr/>
+        <p:txBody>
+          <a:bodyPr/>
+          <a:lstStyle/>
+          <a:p>
+            <a:endParaRPr lang="en-US" dirty="0"/>
+          </a:p>
+        </p:txBody>
+      </p:sp>
+      <p:sp>
+        <p:nvSpPr>
+          <p:cNvPr id="3" name="Content Placeholder 2"/>
+          <p:cNvSpPr>
+            <a:spLocks noGrp="1"/>
+          </p:cNvSpPr>
+          <p:nvPr>
+            <p:ph idx="1"/>
+          </p:nvPr>
+        </p:nvSpPr>
+        <p:spPr/>
+        <p:txBody>
+          <a:bodyPr/>
+          <a:lstStyle/>
+          <a:p>
+            <a:endParaRPr lang="en-US"/>
+          </a:p>
+        </p:txBody>
+      </p:sp>
+    </p:spTree>
+    <p:extLst>
+      <p:ext uri="{BB962C8B-B14F-4D97-AF65-F5344CB8AC3E}">
+        <p14:creationId xmlns:p14="http://schemas.microsoft.com/office/powerpoint/2010/main" val="1667791595"/>
+      </p:ext>
+    </p:extLst>
+  </p:cSld>
+  <p:clrMapOvr>
+    <a:masterClrMapping/>
+  </p:clrMapOvr>
+</p:sld>
+</file>
+
 <file path=ppt/slides/slide4.xml><?xml version="1.0" encoding="utf-8"?>
+<p:sld xmlns:a="http://schemas.openxmlformats.org/drawingml/2006/main" xmlns:r="http://schemas.openxmlformats.org/officeDocument/2006/relationships" xmlns:p="http://schemas.openxmlformats.org/presentationml/2006/main">
+  <p:cSld>
+    <p:spTree>
+      <p:nvGrpSpPr>
+        <p:cNvPr id="1" name=""/>
+        <p:cNvGrpSpPr/>
+        <p:nvPr/>
+      </p:nvGrpSpPr>
+      <p:grpSpPr>
+        <a:xfrm>
+          <a:off x="0" y="0"/>
+          <a:ext cx="0" cy="0"/>
+          <a:chOff x="0" y="0"/>
+          <a:chExt cx="0" cy="0"/>
+        </a:xfrm>
+      </p:grpSpPr>
+      <p:sp>
+        <p:nvSpPr>
+          <p:cNvPr id="2" name="Title 1"/>
+          <p:cNvSpPr>
+            <a:spLocks noGrp="1"/>
+          </p:cNvSpPr>
+          <p:nvPr>
+            <p:ph type="title"/>
+          </p:nvPr>
+        </p:nvSpPr>
+        <p:spPr/>
+        <p:txBody>
+          <a:bodyPr/>
+          <a:lstStyle/>
+          <a:p>
+            <a:r>
+              <a:rPr lang="en-US" dirty="0"/>
+              <a:t>Who Does T-SQL Unit Testing?</a:t>
+            </a:r>
+          </a:p>
+        </p:txBody>
+      </p:sp>
+      <p:pic>
+        <p:nvPicPr>
+          <p:cNvPr id="3" name="Picture 2"/>
+          <p:cNvPicPr>
+            <a:picLocks noChangeAspect="1"/>
+          </p:cNvPicPr>
+          <p:nvPr/>
+        </p:nvPicPr>
+        <p:blipFill>
+          <a:blip r:embed="rId2">
+            <a:extLst>
+              <a:ext uri="{28A0092B-C50C-407E-A947-70E740481C1C}">
+                <a14:useLocalDpi xmlns:a14="http://schemas.microsoft.com/office/drawing/2010/main" val="0"/>
+              </a:ext>
+            </a:extLst>
+          </a:blip>
+          <a:stretch>
+            <a:fillRect/>
+          </a:stretch>
+        </p:blipFill>
+        <p:spPr>
+          <a:xfrm>
+            <a:off x="670968" y="4967242"/>
+            <a:ext cx="7802064" cy="657317"/>
+          </a:xfrm>
+          <a:prstGeom prst="rect">
+            <a:avLst/>
+          </a:prstGeom>
+        </p:spPr>
+      </p:pic>
+      <p:pic>
+        <p:nvPicPr>
+          <p:cNvPr id="4" name="Picture 3"/>
+          <p:cNvPicPr>
+            <a:picLocks noChangeAspect="1"/>
+          </p:cNvPicPr>
+          <p:nvPr/>
+        </p:nvPicPr>
+        <p:blipFill>
+          <a:blip r:embed="rId3">
+            <a:extLst>
+              <a:ext uri="{28A0092B-C50C-407E-A947-70E740481C1C}">
+                <a14:useLocalDpi xmlns:a14="http://schemas.microsoft.com/office/drawing/2010/main" val="0"/>
+              </a:ext>
+            </a:extLst>
+          </a:blip>
+          <a:stretch>
+            <a:fillRect/>
+          </a:stretch>
+        </p:blipFill>
+        <p:spPr>
+          <a:xfrm>
+            <a:off x="670969" y="1985838"/>
+            <a:ext cx="2848373" cy="1781424"/>
+          </a:xfrm>
+          <a:prstGeom prst="rect">
+            <a:avLst/>
+          </a:prstGeom>
+        </p:spPr>
+      </p:pic>
+      <p:sp>
+        <p:nvSpPr>
+          <p:cNvPr id="5" name="TextBox 4"/>
+          <p:cNvSpPr txBox="1"/>
+          <p:nvPr/>
+        </p:nvSpPr>
+        <p:spPr>
+          <a:xfrm>
+            <a:off x="4914900" y="1928689"/>
+            <a:ext cx="3124200" cy="584775"/>
+          </a:xfrm>
+          <a:prstGeom prst="rect">
+            <a:avLst/>
+          </a:prstGeom>
+          <a:noFill/>
+        </p:spPr>
+        <p:txBody>
+          <a:bodyPr wrap="square" rtlCol="0">
+            <a:spAutoFit/>
+          </a:bodyPr>
+          <a:lstStyle/>
+          <a:p>
+            <a:r>
+              <a:rPr lang="en-US" sz="3200" b="1" dirty="0">
+                <a:solidFill>
+                  <a:srgbClr val="CC0000"/>
+                </a:solidFill>
+              </a:rPr>
+              <a:t>Not this</a:t>
+            </a:r>
+          </a:p>
+        </p:txBody>
+      </p:sp>
+      <p:cxnSp>
+        <p:nvCxnSpPr>
+          <p:cNvPr id="7" name="Straight Arrow Connector 6"/>
+          <p:cNvCxnSpPr/>
+          <p:nvPr/>
+        </p:nvCxnSpPr>
+        <p:spPr>
+          <a:xfrm flipH="1">
+            <a:off x="3519342" y="2235476"/>
+            <a:ext cx="1357459" cy="164824"/>
+          </a:xfrm>
+          <a:prstGeom prst="straightConnector1">
+            <a:avLst/>
+          </a:prstGeom>
+          <a:ln w="127000">
+            <a:solidFill>
+              <a:srgbClr val="CC0000"/>
+            </a:solidFill>
+            <a:tailEnd type="triangle"/>
+          </a:ln>
+        </p:spPr>
+        <p:style>
+          <a:lnRef idx="1">
+            <a:schemeClr val="accent1"/>
+          </a:lnRef>
+          <a:fillRef idx="0">
+            <a:schemeClr val="accent1"/>
+          </a:fillRef>
+          <a:effectRef idx="0">
+            <a:schemeClr val="accent1"/>
+          </a:effectRef>
+          <a:fontRef idx="minor">
+            <a:schemeClr val="tx1"/>
+          </a:fontRef>
+        </p:style>
+      </p:cxnSp>
+      <p:cxnSp>
+        <p:nvCxnSpPr>
+          <p:cNvPr id="10" name="Straight Arrow Connector 9"/>
+          <p:cNvCxnSpPr/>
+          <p:nvPr/>
+        </p:nvCxnSpPr>
+        <p:spPr>
+          <a:xfrm flipH="1">
+            <a:off x="3519342" y="3786312"/>
+            <a:ext cx="1295400" cy="976450"/>
+          </a:xfrm>
+          <a:prstGeom prst="straightConnector1">
+            <a:avLst/>
+          </a:prstGeom>
+          <a:ln w="127000">
+            <a:solidFill>
+              <a:srgbClr val="CC0000"/>
+            </a:solidFill>
+            <a:tailEnd type="triangle"/>
+          </a:ln>
+        </p:spPr>
+        <p:style>
+          <a:lnRef idx="1">
+            <a:schemeClr val="accent1"/>
+          </a:lnRef>
+          <a:fillRef idx="0">
+            <a:schemeClr val="accent1"/>
+          </a:fillRef>
+          <a:effectRef idx="0">
+            <a:schemeClr val="accent1"/>
+          </a:effectRef>
+          <a:fontRef idx="minor">
+            <a:schemeClr val="tx1"/>
+          </a:fontRef>
+        </p:style>
+      </p:cxnSp>
+      <p:sp>
+        <p:nvSpPr>
+          <p:cNvPr id="14" name="Oval 13"/>
+          <p:cNvSpPr/>
+          <p:nvPr/>
+        </p:nvSpPr>
+        <p:spPr>
+          <a:xfrm>
+            <a:off x="342900" y="4387165"/>
+            <a:ext cx="5200650" cy="1351589"/>
+          </a:xfrm>
+          <a:prstGeom prst="ellipse">
+            <a:avLst/>
+          </a:prstGeom>
+          <a:noFill/>
+          <a:ln w="31750">
+            <a:solidFill>
+              <a:srgbClr val="CC0000"/>
+            </a:solidFill>
+          </a:ln>
+        </p:spPr>
+        <p:style>
+          <a:lnRef idx="2">
+            <a:schemeClr val="accent1">
+              <a:shade val="50000"/>
+            </a:schemeClr>
+          </a:lnRef>
+          <a:fillRef idx="1">
+            <a:schemeClr val="accent1"/>
+          </a:fillRef>
+          <a:effectRef idx="0">
+            <a:schemeClr val="accent1"/>
+          </a:effectRef>
+          <a:fontRef idx="minor">
+            <a:schemeClr val="lt1"/>
+          </a:fontRef>
+        </p:style>
+        <p:txBody>
+          <a:bodyPr rtlCol="0" anchor="ctr"/>
+          <a:lstStyle/>
+          <a:p>
+            <a:pPr algn="ctr"/>
+            <a:endParaRPr lang="en-US"/>
+          </a:p>
+        </p:txBody>
+      </p:sp>
+      <p:sp>
+        <p:nvSpPr>
+          <p:cNvPr id="6" name="Multiplication Sign 5"/>
+          <p:cNvSpPr/>
+          <p:nvPr/>
+        </p:nvSpPr>
+        <p:spPr>
+          <a:xfrm>
+            <a:off x="559521" y="1799557"/>
+            <a:ext cx="2438400" cy="2062103"/>
+          </a:xfrm>
+          <a:prstGeom prst="mathMultiply">
+            <a:avLst/>
+          </a:prstGeom>
+          <a:solidFill>
+            <a:schemeClr val="accent2"/>
+          </a:solidFill>
+          <a:ln>
+            <a:solidFill>
+              <a:schemeClr val="accent2"/>
+            </a:solidFill>
+          </a:ln>
+        </p:spPr>
+        <p:style>
+          <a:lnRef idx="2">
+            <a:schemeClr val="accent1">
+              <a:shade val="50000"/>
+            </a:schemeClr>
+          </a:lnRef>
+          <a:fillRef idx="1">
+            <a:schemeClr val="accent1"/>
+          </a:fillRef>
+          <a:effectRef idx="0">
+            <a:schemeClr val="accent1"/>
+          </a:effectRef>
+          <a:fontRef idx="minor">
+            <a:schemeClr val="lt1"/>
+          </a:fontRef>
+        </p:style>
+        <p:txBody>
+          <a:bodyPr rtlCol="0" anchor="ctr"/>
+          <a:lstStyle/>
+          <a:p>
+            <a:pPr algn="ctr"/>
+            <a:endParaRPr lang="en-US"/>
+          </a:p>
+        </p:txBody>
+      </p:sp>
+      <p:sp>
+        <p:nvSpPr>
+          <p:cNvPr id="11" name="TextBox 10"/>
+          <p:cNvSpPr txBox="1"/>
+          <p:nvPr/>
+        </p:nvSpPr>
+        <p:spPr>
+          <a:xfrm>
+            <a:off x="4918365" y="3157927"/>
+            <a:ext cx="3124200" cy="584775"/>
+          </a:xfrm>
+          <a:prstGeom prst="rect">
+            <a:avLst/>
+          </a:prstGeom>
+          <a:noFill/>
+        </p:spPr>
+        <p:txBody>
+          <a:bodyPr wrap="square" rtlCol="0">
+            <a:spAutoFit/>
+          </a:bodyPr>
+          <a:lstStyle/>
+          <a:p>
+            <a:r>
+              <a:rPr lang="en-US" sz="3200" b="1" dirty="0">
+                <a:solidFill>
+                  <a:srgbClr val="CC0000"/>
+                </a:solidFill>
+              </a:rPr>
+              <a:t>This</a:t>
+            </a:r>
+          </a:p>
+        </p:txBody>
+      </p:sp>
+    </p:spTree>
+    <p:extLst>
+      <p:ext uri="{BB962C8B-B14F-4D97-AF65-F5344CB8AC3E}">
+        <p14:creationId xmlns:p14="http://schemas.microsoft.com/office/powerpoint/2010/main" val="23070790"/>
+      </p:ext>
+    </p:extLst>
+  </p:cSld>
+  <p:clrMapOvr>
+    <a:masterClrMapping/>
+  </p:clrMapOvr>
+  <p:timing>
+    <p:tnLst>
+      <p:par>
+        <p:cTn id="1" dur="indefinite" restart="never" nodeType="tmRoot">
+          <p:childTnLst>
+            <p:seq concurrent="1" nextAc="seek">
+              <p:cTn id="2" dur="indefinite" nodeType="mainSeq">
+                <p:childTnLst>
+                  <p:par>
+                    <p:cTn id="3" fill="hold">
+                      <p:stCondLst>
+                        <p:cond delay="indefinite"/>
+                      </p:stCondLst>
+                      <p:childTnLst>
+                        <p:par>
+                          <p:cTn id="4" fill="hold">
+                            <p:stCondLst>
+                              <p:cond delay="0"/>
+                            </p:stCondLst>
+                            <p:childTnLst>
+                              <p:par>
+                                <p:cTn id="5" presetID="10" presetClass="entr" presetSubtype="0" fill="hold" grpId="0" nodeType="clickEffect">
+                                  <p:stCondLst>
+                                    <p:cond delay="0"/>
+                                  </p:stCondLst>
+                                  <p:childTnLst>
+                                    <p:set>
+                                      <p:cBhvr>
+                                        <p:cTn id="6" dur="1" fill="hold">
+                                          <p:stCondLst>
+                                            <p:cond delay="0"/>
+                                          </p:stCondLst>
+                                        </p:cTn>
+                                        <p:tgtEl>
+                                          <p:spTgt spid="6"/>
+                                        </p:tgtEl>
+                                        <p:attrNameLst>
+                                          <p:attrName>style.visibility</p:attrName>
+                                        </p:attrNameLst>
+                                      </p:cBhvr>
+                                      <p:to>
+                                        <p:strVal val="visible"/>
+                                      </p:to>
+                                    </p:set>
+                                    <p:animEffect transition="in" filter="fade">
+                                      <p:cBhvr>
+                                        <p:cTn id="7" dur="500"/>
+                                        <p:tgtEl>
+                                          <p:spTgt spid="6"/>
+                                        </p:tgtEl>
+                                      </p:cBhvr>
+                                    </p:animEffect>
+                                  </p:childTnLst>
+                                </p:cTn>
+                              </p:par>
+                              <p:par>
+                                <p:cTn id="8" presetID="10" presetClass="entr" presetSubtype="0" fill="hold" nodeType="withEffect">
+                                  <p:stCondLst>
+                                    <p:cond delay="0"/>
+                                  </p:stCondLst>
+                                  <p:childTnLst>
+                                    <p:set>
+                                      <p:cBhvr>
+                                        <p:cTn id="9" dur="1" fill="hold">
+                                          <p:stCondLst>
+                                            <p:cond delay="0"/>
+                                          </p:stCondLst>
+                                        </p:cTn>
+                                        <p:tgtEl>
+                                          <p:spTgt spid="7"/>
+                                        </p:tgtEl>
+                                        <p:attrNameLst>
+                                          <p:attrName>style.visibility</p:attrName>
+                                        </p:attrNameLst>
+                                      </p:cBhvr>
+                                      <p:to>
+                                        <p:strVal val="visible"/>
+                                      </p:to>
+                                    </p:set>
+                                    <p:animEffect transition="in" filter="fade">
+                                      <p:cBhvr>
+                                        <p:cTn id="10" dur="500"/>
+                                        <p:tgtEl>
+                                          <p:spTgt spid="7"/>
+                                        </p:tgtEl>
+                                      </p:cBhvr>
+                                    </p:animEffect>
+                                  </p:childTnLst>
+                                </p:cTn>
+                              </p:par>
+                              <p:par>
+                                <p:cTn id="11" presetID="10" presetClass="entr" presetSubtype="0" fill="hold" grpId="0" nodeType="withEffect">
+                                  <p:stCondLst>
+                                    <p:cond delay="0"/>
+                                  </p:stCondLst>
+                                  <p:childTnLst>
+                                    <p:set>
+                                      <p:cBhvr>
+                                        <p:cTn id="12" dur="1" fill="hold">
+                                          <p:stCondLst>
+                                            <p:cond delay="0"/>
+                                          </p:stCondLst>
+                                        </p:cTn>
+                                        <p:tgtEl>
+                                          <p:spTgt spid="5"/>
+                                        </p:tgtEl>
+                                        <p:attrNameLst>
+                                          <p:attrName>style.visibility</p:attrName>
+                                        </p:attrNameLst>
+                                      </p:cBhvr>
+                                      <p:to>
+                                        <p:strVal val="visible"/>
+                                      </p:to>
+                                    </p:set>
+                                    <p:animEffect transition="in" filter="fade">
+                                      <p:cBhvr>
+                                        <p:cTn id="13" dur="500"/>
+                                        <p:tgtEl>
+                                          <p:spTgt spid="5"/>
+                                        </p:tgtEl>
+                                      </p:cBhvr>
+                                    </p:animEffect>
+                                  </p:childTnLst>
+                                </p:cTn>
+                              </p:par>
+                            </p:childTnLst>
+                          </p:cTn>
+                        </p:par>
+                      </p:childTnLst>
+                    </p:cTn>
+                  </p:par>
+                  <p:par>
+                    <p:cTn id="14" fill="hold">
+                      <p:stCondLst>
+                        <p:cond delay="indefinite"/>
+                      </p:stCondLst>
+                      <p:childTnLst>
+                        <p:par>
+                          <p:cTn id="15" fill="hold">
+                            <p:stCondLst>
+                              <p:cond delay="0"/>
+                            </p:stCondLst>
+                            <p:childTnLst>
+                              <p:par>
+                                <p:cTn id="16" presetID="10" presetClass="entr" presetSubtype="0" fill="hold" nodeType="clickEffect">
+                                  <p:stCondLst>
+                                    <p:cond delay="0"/>
+                                  </p:stCondLst>
+                                  <p:childTnLst>
+                                    <p:set>
+                                      <p:cBhvr>
+                                        <p:cTn id="17" dur="1" fill="hold">
+                                          <p:stCondLst>
+                                            <p:cond delay="0"/>
+                                          </p:stCondLst>
+                                        </p:cTn>
+                                        <p:tgtEl>
+                                          <p:spTgt spid="10"/>
+                                        </p:tgtEl>
+                                        <p:attrNameLst>
+                                          <p:attrName>style.visibility</p:attrName>
+                                        </p:attrNameLst>
+                                      </p:cBhvr>
+                                      <p:to>
+                                        <p:strVal val="visible"/>
+                                      </p:to>
+                                    </p:set>
+                                    <p:animEffect transition="in" filter="fade">
+                                      <p:cBhvr>
+                                        <p:cTn id="18" dur="500"/>
+                                        <p:tgtEl>
+                                          <p:spTgt spid="10"/>
+                                        </p:tgtEl>
+                                      </p:cBhvr>
+                                    </p:animEffect>
+                                  </p:childTnLst>
+                                </p:cTn>
+                              </p:par>
+                            </p:childTnLst>
+                          </p:cTn>
+                        </p:par>
+                        <p:par>
+                          <p:cTn id="19" fill="hold">
+                            <p:stCondLst>
+                              <p:cond delay="500"/>
+                            </p:stCondLst>
+                            <p:childTnLst>
+                              <p:par>
+                                <p:cTn id="20" presetID="10" presetClass="entr" presetSubtype="0" fill="hold" grpId="0" nodeType="afterEffect">
+                                  <p:stCondLst>
+                                    <p:cond delay="0"/>
+                                  </p:stCondLst>
+                                  <p:childTnLst>
+                                    <p:set>
+                                      <p:cBhvr>
+                                        <p:cTn id="21" dur="1" fill="hold">
+                                          <p:stCondLst>
+                                            <p:cond delay="0"/>
+                                          </p:stCondLst>
+                                        </p:cTn>
+                                        <p:tgtEl>
+                                          <p:spTgt spid="14"/>
+                                        </p:tgtEl>
+                                        <p:attrNameLst>
+                                          <p:attrName>style.visibility</p:attrName>
+                                        </p:attrNameLst>
+                                      </p:cBhvr>
+                                      <p:to>
+                                        <p:strVal val="visible"/>
+                                      </p:to>
+                                    </p:set>
+                                    <p:animEffect transition="in" filter="fade">
+                                      <p:cBhvr>
+                                        <p:cTn id="22" dur="500"/>
+                                        <p:tgtEl>
+                                          <p:spTgt spid="14"/>
+                                        </p:tgtEl>
+                                      </p:cBhvr>
+                                    </p:animEffect>
+                                  </p:childTnLst>
+                                </p:cTn>
+                              </p:par>
+                              <p:par>
+                                <p:cTn id="23" presetID="10" presetClass="entr" presetSubtype="0" fill="hold" grpId="0" nodeType="withEffect">
+                                  <p:stCondLst>
+                                    <p:cond delay="0"/>
+                                  </p:stCondLst>
+                                  <p:childTnLst>
+                                    <p:set>
+                                      <p:cBhvr>
+                                        <p:cTn id="24" dur="1" fill="hold">
+                                          <p:stCondLst>
+                                            <p:cond delay="0"/>
+                                          </p:stCondLst>
+                                        </p:cTn>
+                                        <p:tgtEl>
+                                          <p:spTgt spid="11"/>
+                                        </p:tgtEl>
+                                        <p:attrNameLst>
+                                          <p:attrName>style.visibility</p:attrName>
+                                        </p:attrNameLst>
+                                      </p:cBhvr>
+                                      <p:to>
+                                        <p:strVal val="visible"/>
+                                      </p:to>
+                                    </p:set>
+                                    <p:animEffect transition="in" filter="fade">
+                                      <p:cBhvr>
+                                        <p:cTn id="25" dur="500"/>
+                                        <p:tgtEl>
+                                          <p:spTgt spid="11"/>
+                                        </p:tgtEl>
+                                      </p:cBhvr>
+                                    </p:animEffect>
+                                  </p:childTnLst>
+                                </p:cTn>
+                              </p:par>
+                            </p:childTnLst>
+                          </p:cTn>
+                        </p:par>
+                      </p:childTnLst>
+                    </p:cTn>
+                  </p:par>
+                </p:childTnLst>
+              </p:cTn>
+              <p:prevCondLst>
+                <p:cond evt="onPrev" delay="0">
+                  <p:tgtEl>
+                    <p:sldTgt/>
+                  </p:tgtEl>
+                </p:cond>
+              </p:prevCondLst>
+              <p:nextCondLst>
+                <p:cond evt="onNext" delay="0">
+                  <p:tgtEl>
+                    <p:sldTgt/>
+                  </p:tgtEl>
+                </p:cond>
+              </p:nextCondLst>
+            </p:seq>
+          </p:childTnLst>
+        </p:cTn>
+      </p:par>
+    </p:tnLst>
+    <p:bldLst>
+      <p:bldP spid="5" grpId="0"/>
+      <p:bldP spid="14" grpId="0" animBg="1"/>
+      <p:bldP spid="6" grpId="0" animBg="1"/>
+      <p:bldP spid="11" grpId="0"/>
+    </p:bldLst>
+  </p:timing>
+</p:sld>
+</file>
+
+<file path=ppt/slides/slide5.xml><?xml version="1.0" encoding="utf-8"?>
+<p:sld xmlns:a="http://schemas.openxmlformats.org/drawingml/2006/main" xmlns:r="http://schemas.openxmlformats.org/officeDocument/2006/relationships" xmlns:p="http://schemas.openxmlformats.org/presentationml/2006/main">
+  <p:cSld>
+    <p:spTree>
+      <p:nvGrpSpPr>
+        <p:cNvPr id="1" name=""/>
+        <p:cNvGrpSpPr/>
+        <p:nvPr/>
+      </p:nvGrpSpPr>
+      <p:grpSpPr>
+        <a:xfrm>
+          <a:off x="0" y="0"/>
+          <a:ext cx="0" cy="0"/>
+          <a:chOff x="0" y="0"/>
+          <a:chExt cx="0" cy="0"/>
+        </a:xfrm>
+      </p:grpSpPr>
+      <p:sp>
+        <p:nvSpPr>
+          <p:cNvPr id="2" name="Title 1"/>
+          <p:cNvSpPr>
+            <a:spLocks noGrp="1"/>
+          </p:cNvSpPr>
+          <p:nvPr>
+            <p:ph type="title"/>
+          </p:nvPr>
+        </p:nvSpPr>
+        <p:spPr/>
+        <p:txBody>
+          <a:bodyPr/>
+          <a:lstStyle/>
+          <a:p>
+            <a:r>
+              <a:rPr lang="en-US" dirty="0"/>
+              <a:t>Unit Testing</a:t>
+            </a:r>
+          </a:p>
+        </p:txBody>
+      </p:sp>
+      <p:sp>
+        <p:nvSpPr>
+          <p:cNvPr id="5" name="TextBox 4"/>
+          <p:cNvSpPr txBox="1"/>
+          <p:nvPr/>
+        </p:nvSpPr>
+        <p:spPr>
+          <a:xfrm>
+            <a:off x="405244" y="1987811"/>
+            <a:ext cx="7886700" cy="3877985"/>
+          </a:xfrm>
+          <a:prstGeom prst="rect">
+            <a:avLst/>
+          </a:prstGeom>
+          <a:noFill/>
+        </p:spPr>
+        <p:txBody>
+          <a:bodyPr wrap="square" rtlCol="0">
+            <a:spAutoFit/>
+          </a:bodyPr>
+          <a:lstStyle/>
+          <a:p>
+            <a:r>
+              <a:rPr lang="en-US" sz="3600" dirty="0"/>
+              <a:t>“The primary goal of unit testing is to take the smallest piece of testable software in the application, isolate it from the remainder of the code, and determine whether it behaves exactly as you expect.“</a:t>
+            </a:r>
+          </a:p>
+          <a:p>
+            <a:endParaRPr lang="en-US" dirty="0"/>
+          </a:p>
+          <a:p>
+            <a:r>
+              <a:rPr lang="en-US" sz="1200" dirty="0"/>
+              <a:t>From </a:t>
+            </a:r>
+            <a:r>
+              <a:rPr lang="en-US" sz="1200" dirty="0">
+                <a:hlinkClick r:id="rId3"/>
+              </a:rPr>
+              <a:t>https://msdn.microsoft.com/en-us/library/aa292197%28v=vs.71%29.aspx</a:t>
+            </a:r>
+            <a:endParaRPr lang="en-US" sz="1200" dirty="0"/>
+          </a:p>
+        </p:txBody>
+      </p:sp>
+    </p:spTree>
+    <p:extLst>
+      <p:ext uri="{BB962C8B-B14F-4D97-AF65-F5344CB8AC3E}">
+        <p14:creationId xmlns:p14="http://schemas.microsoft.com/office/powerpoint/2010/main" val="2912118878"/>
+      </p:ext>
+    </p:extLst>
+  </p:cSld>
+  <p:clrMapOvr>
+    <a:masterClrMapping/>
+  </p:clrMapOvr>
+</p:sld>
+</file>
+
+<file path=ppt/slides/slide6.xml><?xml version="1.0" encoding="utf-8"?>
+<p:sld xmlns:a="http://schemas.openxmlformats.org/drawingml/2006/main" xmlns:r="http://schemas.openxmlformats.org/officeDocument/2006/relationships" xmlns:p="http://schemas.openxmlformats.org/presentationml/2006/main">
+  <p:cSld>
+    <p:spTree>
+      <p:nvGrpSpPr>
+        <p:cNvPr id="1" name=""/>
+        <p:cNvGrpSpPr/>
+        <p:nvPr/>
+      </p:nvGrpSpPr>
+      <p:grpSpPr>
+        <a:xfrm>
+          <a:off x="0" y="0"/>
+          <a:ext cx="0" cy="0"/>
+          <a:chOff x="0" y="0"/>
+          <a:chExt cx="0" cy="0"/>
+        </a:xfrm>
+      </p:grpSpPr>
+      <p:sp>
+        <p:nvSpPr>
+          <p:cNvPr id="2" name="Title 1"/>
+          <p:cNvSpPr>
+            <a:spLocks noGrp="1"/>
+          </p:cNvSpPr>
+          <p:nvPr>
+            <p:ph type="title"/>
+          </p:nvPr>
+        </p:nvSpPr>
+        <p:spPr/>
+        <p:txBody>
+          <a:bodyPr/>
+          <a:lstStyle/>
+          <a:p>
+            <a:r>
+              <a:rPr lang="en-US" dirty="0"/>
+              <a:t>Unit Testing</a:t>
+            </a:r>
+          </a:p>
+        </p:txBody>
+      </p:sp>
+      <p:sp>
+        <p:nvSpPr>
+          <p:cNvPr id="12" name="TextBox 11"/>
+          <p:cNvSpPr txBox="1"/>
+          <p:nvPr/>
+        </p:nvSpPr>
+        <p:spPr>
+          <a:xfrm>
+            <a:off x="405245" y="2125268"/>
+            <a:ext cx="8208819" cy="3877985"/>
+          </a:xfrm>
+          <a:prstGeom prst="rect">
+            <a:avLst/>
+          </a:prstGeom>
+          <a:noFill/>
+        </p:spPr>
+        <p:txBody>
+          <a:bodyPr wrap="square" rtlCol="0">
+            <a:spAutoFit/>
+          </a:bodyPr>
+          <a:lstStyle/>
+          <a:p>
+            <a:r>
+              <a:rPr lang="en-US" sz="3600" b="1" dirty="0"/>
+              <a:t>“Unit testing is a lot like going to the gym.</a:t>
+            </a:r>
+            <a:r>
+              <a:rPr lang="en-US" sz="3600" dirty="0"/>
+              <a:t> You know it is good for you, all the arguments make sense, so you start working out. There's an initial rush, which is great, but after a few days you start to wonder if it is worth the trouble.”</a:t>
+            </a:r>
+          </a:p>
+          <a:p>
+            <a:endParaRPr lang="en-US" dirty="0"/>
+          </a:p>
+          <a:p>
+            <a:r>
+              <a:rPr lang="en-US" sz="1200" dirty="0"/>
+              <a:t>From </a:t>
+            </a:r>
+            <a:r>
+              <a:rPr lang="en-US" sz="1200" dirty="0">
+                <a:hlinkClick r:id="rId3"/>
+              </a:rPr>
+              <a:t>http://stackoverflow.com/questions/67299/is-unit-testing-worth-the-effort</a:t>
+            </a:r>
+            <a:endParaRPr lang="en-US" sz="1200" dirty="0"/>
+          </a:p>
+        </p:txBody>
+      </p:sp>
+    </p:spTree>
+    <p:extLst>
+      <p:ext uri="{BB962C8B-B14F-4D97-AF65-F5344CB8AC3E}">
+        <p14:creationId xmlns:p14="http://schemas.microsoft.com/office/powerpoint/2010/main" val="1340594583"/>
+      </p:ext>
+    </p:extLst>
+  </p:cSld>
+  <p:clrMapOvr>
+    <a:masterClrMapping/>
+  </p:clrMapOvr>
+</p:sld>
+</file>
+
+<file path=ppt/slides/slide7.xml><?xml version="1.0" encoding="utf-8"?>
+<p:sld xmlns:a="http://schemas.openxmlformats.org/drawingml/2006/main" xmlns:r="http://schemas.openxmlformats.org/officeDocument/2006/relationships" xmlns:p="http://schemas.openxmlformats.org/presentationml/2006/main">
+  <p:cSld>
+    <p:spTree>
+      <p:nvGrpSpPr>
+        <p:cNvPr id="1" name=""/>
+        <p:cNvGrpSpPr/>
+        <p:nvPr/>
+      </p:nvGrpSpPr>
+      <p:grpSpPr>
+        <a:xfrm>
+          <a:off x="0" y="0"/>
+          <a:ext cx="0" cy="0"/>
+          <a:chOff x="0" y="0"/>
+          <a:chExt cx="0" cy="0"/>
+        </a:xfrm>
+      </p:grpSpPr>
+      <p:sp>
+        <p:nvSpPr>
+          <p:cNvPr id="2" name="Title 1"/>
+          <p:cNvSpPr>
+            <a:spLocks noGrp="1"/>
+          </p:cNvSpPr>
+          <p:nvPr>
+            <p:ph type="title"/>
+          </p:nvPr>
+        </p:nvSpPr>
+        <p:spPr/>
+        <p:txBody>
+          <a:bodyPr/>
+          <a:lstStyle/>
+          <a:p>
+            <a:r>
+              <a:rPr lang="en-US" dirty="0"/>
+              <a:t>Database Unit Testing</a:t>
+            </a:r>
+          </a:p>
+        </p:txBody>
+      </p:sp>
+      <p:pic>
+        <p:nvPicPr>
+          <p:cNvPr id="6" name="Content Placeholder 5"/>
+          <p:cNvPicPr>
+            <a:picLocks noGrp="1" noChangeAspect="1"/>
+          </p:cNvPicPr>
+          <p:nvPr>
+            <p:ph idx="1"/>
+          </p:nvPr>
+        </p:nvPicPr>
+        <p:blipFill>
+          <a:blip r:embed="rId3">
+            <a:extLst>
+              <a:ext uri="{28A0092B-C50C-407E-A947-70E740481C1C}">
+                <a14:useLocalDpi xmlns:a14="http://schemas.microsoft.com/office/drawing/2010/main" val="0"/>
+              </a:ext>
+            </a:extLst>
+          </a:blip>
+          <a:stretch>
+            <a:fillRect/>
+          </a:stretch>
+        </p:blipFill>
+        <p:spPr>
+          <a:xfrm>
+            <a:off x="2101964" y="1961791"/>
+            <a:ext cx="4940072" cy="3262312"/>
+          </a:xfrm>
+        </p:spPr>
+      </p:pic>
+    </p:spTree>
+    <p:extLst>
+      <p:ext uri="{BB962C8B-B14F-4D97-AF65-F5344CB8AC3E}">
+        <p14:creationId xmlns:p14="http://schemas.microsoft.com/office/powerpoint/2010/main" val="2094435692"/>
+      </p:ext>
+    </p:extLst>
+  </p:cSld>
+  <p:clrMapOvr>
+    <a:masterClrMapping/>
+  </p:clrMapOvr>
+</p:sld>
+</file>
+
+<file path=ppt/slides/slide8.xml><?xml version="1.0" encoding="utf-8"?>
 <p:sld xmlns:a="http://schemas.openxmlformats.org/drawingml/2006/main" xmlns:r="http://schemas.openxmlformats.org/officeDocument/2006/relationships" xmlns:p="http://schemas.openxmlformats.org/presentationml/2006/main">
   <p:cSld>
     <p:spTree>
@@ -10609,416 +12339,6 @@
 </p:sld>
 </file>
 
-<file path=ppt/slides/slide5.xml><?xml version="1.0" encoding="utf-8"?>
-<p:sld xmlns:a="http://schemas.openxmlformats.org/drawingml/2006/main" xmlns:r="http://schemas.openxmlformats.org/officeDocument/2006/relationships" xmlns:p="http://schemas.openxmlformats.org/presentationml/2006/main">
-  <p:cSld>
-    <p:spTree>
-      <p:nvGrpSpPr>
-        <p:cNvPr id="1" name=""/>
-        <p:cNvGrpSpPr/>
-        <p:nvPr/>
-      </p:nvGrpSpPr>
-      <p:grpSpPr>
-        <a:xfrm>
-          <a:off x="0" y="0"/>
-          <a:ext cx="0" cy="0"/>
-          <a:chOff x="0" y="0"/>
-          <a:chExt cx="0" cy="0"/>
-        </a:xfrm>
-      </p:grpSpPr>
-      <p:sp>
-        <p:nvSpPr>
-          <p:cNvPr id="2" name="Title 1"/>
-          <p:cNvSpPr>
-            <a:spLocks noGrp="1"/>
-          </p:cNvSpPr>
-          <p:nvPr>
-            <p:ph type="title"/>
-          </p:nvPr>
-        </p:nvSpPr>
-        <p:spPr/>
-        <p:txBody>
-          <a:bodyPr/>
-          <a:lstStyle/>
-          <a:p>
-            <a:r>
-              <a:rPr lang="en-US" dirty="0" err="1"/>
-              <a:t>tSQLt</a:t>
-            </a:r>
-            <a:endParaRPr lang="en-US" dirty="0"/>
-          </a:p>
-        </p:txBody>
-      </p:sp>
-      <p:sp>
-        <p:nvSpPr>
-          <p:cNvPr id="3" name="Content Placeholder 2"/>
-          <p:cNvSpPr>
-            <a:spLocks noGrp="1"/>
-          </p:cNvSpPr>
-          <p:nvPr>
-            <p:ph idx="1"/>
-          </p:nvPr>
-        </p:nvSpPr>
-        <p:spPr/>
-        <p:txBody>
-          <a:bodyPr/>
-          <a:lstStyle/>
-          <a:p>
-            <a:r>
-              <a:rPr lang="en-US" dirty="0" err="1"/>
-              <a:t>tSQLt</a:t>
-            </a:r>
-            <a:r>
-              <a:rPr lang="en-US" dirty="0"/>
-              <a:t> is a free testing framework similar to </a:t>
-            </a:r>
-            <a:r>
-              <a:rPr lang="en-US" dirty="0" err="1"/>
-              <a:t>nUnit</a:t>
-            </a:r>
-            <a:r>
-              <a:rPr lang="en-US" dirty="0"/>
-              <a:t>/</a:t>
-            </a:r>
-            <a:r>
-              <a:rPr lang="en-US" dirty="0" err="1"/>
-              <a:t>jUnit</a:t>
-            </a:r>
-            <a:endParaRPr lang="en-US" dirty="0"/>
-          </a:p>
-          <a:p>
-            <a:r>
-              <a:rPr lang="en-US" dirty="0">
-                <a:hlinkClick r:id="rId3"/>
-              </a:rPr>
-              <a:t>tSQLt.org</a:t>
-            </a:r>
-            <a:r>
-              <a:rPr lang="en-US" dirty="0"/>
-              <a:t> – download</a:t>
-            </a:r>
-          </a:p>
-          <a:p>
-            <a:pPr lvl="1"/>
-            <a:r>
-              <a:rPr lang="en-US" dirty="0"/>
-              <a:t>Auto setup with SQL Test</a:t>
-            </a:r>
-          </a:p>
-          <a:p>
-            <a:pPr lvl="1"/>
-            <a:r>
-              <a:rPr lang="en-US" dirty="0"/>
-              <a:t>Framework requires CLR</a:t>
-            </a:r>
-          </a:p>
-          <a:p>
-            <a:r>
-              <a:rPr lang="en-US" dirty="0">
-                <a:hlinkClick r:id="rId4"/>
-              </a:rPr>
-              <a:t>Support via Google Groups</a:t>
-            </a:r>
-            <a:endParaRPr lang="en-US" dirty="0"/>
-          </a:p>
-          <a:p>
-            <a:r>
-              <a:rPr lang="en-US" dirty="0">
-                <a:hlinkClick r:id="rId5"/>
-              </a:rPr>
-              <a:t>Articles at Simple Talk</a:t>
-            </a:r>
-            <a:endParaRPr lang="en-US" dirty="0"/>
-          </a:p>
-        </p:txBody>
-      </p:sp>
-    </p:spTree>
-    <p:extLst>
-      <p:ext uri="{BB962C8B-B14F-4D97-AF65-F5344CB8AC3E}">
-        <p14:creationId xmlns:p14="http://schemas.microsoft.com/office/powerpoint/2010/main" val="2399096538"/>
-      </p:ext>
-    </p:extLst>
-  </p:cSld>
-  <p:clrMapOvr>
-    <a:masterClrMapping/>
-  </p:clrMapOvr>
-</p:sld>
-</file>
-
-<file path=ppt/slides/slide6.xml><?xml version="1.0" encoding="utf-8"?>
-<p:sld xmlns:a="http://schemas.openxmlformats.org/drawingml/2006/main" xmlns:r="http://schemas.openxmlformats.org/officeDocument/2006/relationships" xmlns:p="http://schemas.openxmlformats.org/presentationml/2006/main">
-  <p:cSld>
-    <p:spTree>
-      <p:nvGrpSpPr>
-        <p:cNvPr id="1" name=""/>
-        <p:cNvGrpSpPr/>
-        <p:nvPr/>
-      </p:nvGrpSpPr>
-      <p:grpSpPr>
-        <a:xfrm>
-          <a:off x="0" y="0"/>
-          <a:ext cx="0" cy="0"/>
-          <a:chOff x="0" y="0"/>
-          <a:chExt cx="0" cy="0"/>
-        </a:xfrm>
-      </p:grpSpPr>
-      <p:sp>
-        <p:nvSpPr>
-          <p:cNvPr id="2" name="Title 1"/>
-          <p:cNvSpPr>
-            <a:spLocks noGrp="1"/>
-          </p:cNvSpPr>
-          <p:nvPr>
-            <p:ph type="title"/>
-          </p:nvPr>
-        </p:nvSpPr>
-        <p:spPr/>
-        <p:txBody>
-          <a:bodyPr/>
-          <a:lstStyle/>
-          <a:p>
-            <a:r>
-              <a:rPr lang="en-US" dirty="0" err="1"/>
-              <a:t>tSQLt</a:t>
-            </a:r>
-            <a:endParaRPr lang="en-US" dirty="0"/>
-          </a:p>
-        </p:txBody>
-      </p:sp>
-      <p:sp>
-        <p:nvSpPr>
-          <p:cNvPr id="3" name="Content Placeholder 2"/>
-          <p:cNvSpPr>
-            <a:spLocks noGrp="1"/>
-          </p:cNvSpPr>
-          <p:nvPr>
-            <p:ph idx="1"/>
-          </p:nvPr>
-        </p:nvSpPr>
-        <p:spPr/>
-        <p:txBody>
-          <a:bodyPr/>
-          <a:lstStyle/>
-          <a:p>
-            <a:r>
-              <a:rPr lang="en-US" dirty="0"/>
-              <a:t>Stored procedures in their own schema</a:t>
-            </a:r>
-          </a:p>
-          <a:p>
-            <a:r>
-              <a:rPr lang="en-US" dirty="0"/>
-              <a:t>Can run setup before tests</a:t>
-            </a:r>
-          </a:p>
-          <a:p>
-            <a:r>
-              <a:rPr lang="en-US" dirty="0"/>
-              <a:t>Can mock objects </a:t>
-            </a:r>
-          </a:p>
-          <a:p>
-            <a:r>
-              <a:rPr lang="en-US" dirty="0"/>
-              <a:t>Can implement teardown</a:t>
-            </a:r>
-          </a:p>
-        </p:txBody>
-      </p:sp>
-    </p:spTree>
-    <p:extLst>
-      <p:ext uri="{BB962C8B-B14F-4D97-AF65-F5344CB8AC3E}">
-        <p14:creationId xmlns:p14="http://schemas.microsoft.com/office/powerpoint/2010/main" val="1778634078"/>
-      </p:ext>
-    </p:extLst>
-  </p:cSld>
-  <p:clrMapOvr>
-    <a:masterClrMapping/>
-  </p:clrMapOvr>
-</p:sld>
-</file>
-
-<file path=ppt/slides/slide7.xml><?xml version="1.0" encoding="utf-8"?>
-<p:sld xmlns:a="http://schemas.openxmlformats.org/drawingml/2006/main" xmlns:r="http://schemas.openxmlformats.org/officeDocument/2006/relationships" xmlns:p="http://schemas.openxmlformats.org/presentationml/2006/main">
-  <p:cSld>
-    <p:spTree>
-      <p:nvGrpSpPr>
-        <p:cNvPr id="1" name=""/>
-        <p:cNvGrpSpPr/>
-        <p:nvPr/>
-      </p:nvGrpSpPr>
-      <p:grpSpPr>
-        <a:xfrm>
-          <a:off x="0" y="0"/>
-          <a:ext cx="0" cy="0"/>
-          <a:chOff x="0" y="0"/>
-          <a:chExt cx="0" cy="0"/>
-        </a:xfrm>
-      </p:grpSpPr>
-      <p:sp>
-        <p:nvSpPr>
-          <p:cNvPr id="2" name="Title 1"/>
-          <p:cNvSpPr>
-            <a:spLocks noGrp="1"/>
-          </p:cNvSpPr>
-          <p:nvPr>
-            <p:ph type="title"/>
-          </p:nvPr>
-        </p:nvSpPr>
-        <p:spPr/>
-        <p:txBody>
-          <a:bodyPr/>
-          <a:lstStyle/>
-          <a:p>
-            <a:r>
-              <a:rPr lang="en-US" dirty="0"/>
-              <a:t>Microsoft Unit Testing Framework</a:t>
-            </a:r>
-          </a:p>
-        </p:txBody>
-      </p:sp>
-      <p:sp>
-        <p:nvSpPr>
-          <p:cNvPr id="3" name="Content Placeholder 2"/>
-          <p:cNvSpPr>
-            <a:spLocks noGrp="1"/>
-          </p:cNvSpPr>
-          <p:nvPr>
-            <p:ph idx="1"/>
-          </p:nvPr>
-        </p:nvSpPr>
-        <p:spPr/>
-        <p:txBody>
-          <a:bodyPr/>
-          <a:lstStyle/>
-          <a:p>
-            <a:r>
-              <a:rPr lang="en-US" dirty="0"/>
-              <a:t>For SQL Server, implemented as part of SSDT</a:t>
-            </a:r>
-          </a:p>
-          <a:p>
-            <a:r>
-              <a:rPr lang="en-US" dirty="0"/>
-              <a:t>This framework allows us to write tests in T-SQL.</a:t>
-            </a:r>
-          </a:p>
-          <a:p>
-            <a:r>
-              <a:rPr lang="en-US" dirty="0"/>
-              <a:t>Tests are a part of a Visual Studio Database Project</a:t>
-            </a:r>
-          </a:p>
-          <a:p>
-            <a:r>
-              <a:rPr lang="en-US" dirty="0"/>
-              <a:t>The framework handles transaction wrapping</a:t>
-            </a:r>
-          </a:p>
-          <a:p>
-            <a:endParaRPr lang="en-US" dirty="0"/>
-          </a:p>
-        </p:txBody>
-      </p:sp>
-    </p:spTree>
-    <p:extLst>
-      <p:ext uri="{BB962C8B-B14F-4D97-AF65-F5344CB8AC3E}">
-        <p14:creationId xmlns:p14="http://schemas.microsoft.com/office/powerpoint/2010/main" val="966011027"/>
-      </p:ext>
-    </p:extLst>
-  </p:cSld>
-  <p:clrMapOvr>
-    <a:masterClrMapping/>
-  </p:clrMapOvr>
-</p:sld>
-</file>
-
-<file path=ppt/slides/slide8.xml><?xml version="1.0" encoding="utf-8"?>
-<p:sld xmlns:a="http://schemas.openxmlformats.org/drawingml/2006/main" xmlns:r="http://schemas.openxmlformats.org/officeDocument/2006/relationships" xmlns:p="http://schemas.openxmlformats.org/presentationml/2006/main">
-  <p:cSld>
-    <p:spTree>
-      <p:nvGrpSpPr>
-        <p:cNvPr id="1" name=""/>
-        <p:cNvGrpSpPr/>
-        <p:nvPr/>
-      </p:nvGrpSpPr>
-      <p:grpSpPr>
-        <a:xfrm>
-          <a:off x="0" y="0"/>
-          <a:ext cx="0" cy="0"/>
-          <a:chOff x="0" y="0"/>
-          <a:chExt cx="0" cy="0"/>
-        </a:xfrm>
-      </p:grpSpPr>
-      <p:sp>
-        <p:nvSpPr>
-          <p:cNvPr id="2" name="Title 1"/>
-          <p:cNvSpPr>
-            <a:spLocks noGrp="1"/>
-          </p:cNvSpPr>
-          <p:nvPr>
-            <p:ph type="title"/>
-          </p:nvPr>
-        </p:nvSpPr>
-        <p:spPr/>
-        <p:txBody>
-          <a:bodyPr/>
-          <a:lstStyle/>
-          <a:p>
-            <a:r>
-              <a:rPr lang="en-US" dirty="0"/>
-              <a:t>Building Tests</a:t>
-            </a:r>
-          </a:p>
-        </p:txBody>
-      </p:sp>
-      <p:sp>
-        <p:nvSpPr>
-          <p:cNvPr id="3" name="Content Placeholder 2"/>
-          <p:cNvSpPr>
-            <a:spLocks noGrp="1"/>
-          </p:cNvSpPr>
-          <p:nvPr>
-            <p:ph idx="1"/>
-          </p:nvPr>
-        </p:nvSpPr>
-        <p:spPr/>
-        <p:txBody>
-          <a:bodyPr/>
-          <a:lstStyle/>
-          <a:p>
-            <a:r>
-              <a:rPr lang="en-US" dirty="0"/>
-              <a:t>We want repeatable tests</a:t>
-            </a:r>
-          </a:p>
-          <a:p>
-            <a:r>
-              <a:rPr lang="en-US" dirty="0"/>
-              <a:t>We want automated tests</a:t>
-            </a:r>
-          </a:p>
-          <a:p>
-            <a:r>
-              <a:rPr lang="en-US" dirty="0"/>
-              <a:t>We want a suite of tests</a:t>
-            </a:r>
-          </a:p>
-        </p:txBody>
-      </p:sp>
-    </p:spTree>
-    <p:extLst>
-      <p:ext uri="{BB962C8B-B14F-4D97-AF65-F5344CB8AC3E}">
-        <p14:creationId xmlns:p14="http://schemas.microsoft.com/office/powerpoint/2010/main" val="2858332371"/>
-      </p:ext>
-    </p:extLst>
-  </p:cSld>
-  <p:clrMapOvr>
-    <a:masterClrMapping/>
-  </p:clrMapOvr>
-</p:sld>
-</file>
-
 <file path=ppt/slides/slide9.xml><?xml version="1.0" encoding="utf-8"?>
 <p:sld xmlns:a="http://schemas.openxmlformats.org/drawingml/2006/main" xmlns:r="http://schemas.openxmlformats.org/officeDocument/2006/relationships" xmlns:p="http://schemas.openxmlformats.org/presentationml/2006/main">
   <p:cSld>
@@ -11053,7 +12373,7 @@
           <a:p>
             <a:r>
               <a:rPr lang="en-US" dirty="0"/>
-              <a:t>Writing Tests</a:t>
+              <a:t>Building Tests</a:t>
             </a:r>
           </a:p>
         </p:txBody>
@@ -11075,32 +12395,19 @@
           <a:p>
             <a:r>
               <a:rPr lang="en-US" dirty="0"/>
-              <a:t>TDD?</a:t>
+              <a:t>We want repeatable tests</a:t>
             </a:r>
           </a:p>
           <a:p>
             <a:r>
               <a:rPr lang="en-US" dirty="0"/>
-              <a:t>During development.</a:t>
+              <a:t>We want automated tests</a:t>
             </a:r>
           </a:p>
           <a:p>
             <a:r>
               <a:rPr lang="en-US" dirty="0"/>
-              <a:t>Write after if you must.</a:t>
-            </a:r>
-          </a:p>
-          <a:p>
-            <a:pPr lvl="1"/>
-            <a:r>
-              <a:rPr lang="en-US" dirty="0"/>
-              <a:t>Good for existing code</a:t>
-            </a:r>
-          </a:p>
-          <a:p>
-            <a:r>
-              <a:rPr lang="en-US" dirty="0"/>
-              <a:t>Write as you get feedback from CI and QA testing.</a:t>
+              <a:t>We want a suite of tests</a:t>
             </a:r>
           </a:p>
         </p:txBody>
@@ -11108,7 +12415,7 @@
     </p:spTree>
     <p:extLst>
       <p:ext uri="{BB962C8B-B14F-4D97-AF65-F5344CB8AC3E}">
-        <p14:creationId xmlns:p14="http://schemas.microsoft.com/office/powerpoint/2010/main" val="1110580934"/>
+        <p14:creationId xmlns:p14="http://schemas.microsoft.com/office/powerpoint/2010/main" val="2858332371"/>
       </p:ext>
     </p:extLst>
   </p:cSld>

</xml_diff>

<commit_message>
Added DPS slide placeholder
</commit_message>
<xml_diff>
--- a/UnitTestingTSQL.pptx
+++ b/UnitTestingTSQL.pptx
@@ -5,35 +5,36 @@
     <p:sldMasterId id="2147483648" r:id="rId1"/>
   </p:sldMasterIdLst>
   <p:notesMasterIdLst>
-    <p:notesMasterId r:id="rId28"/>
+    <p:notesMasterId r:id="rId29"/>
   </p:notesMasterIdLst>
   <p:sldIdLst>
     <p:sldId id="256" r:id="rId2"/>
-    <p:sldId id="282" r:id="rId3"/>
-    <p:sldId id="283" r:id="rId4"/>
-    <p:sldId id="289" r:id="rId5"/>
-    <p:sldId id="290" r:id="rId6"/>
-    <p:sldId id="291" r:id="rId7"/>
-    <p:sldId id="292" r:id="rId8"/>
-    <p:sldId id="257" r:id="rId9"/>
-    <p:sldId id="279" r:id="rId10"/>
-    <p:sldId id="280" r:id="rId11"/>
-    <p:sldId id="293" r:id="rId12"/>
-    <p:sldId id="294" r:id="rId13"/>
-    <p:sldId id="295" r:id="rId14"/>
-    <p:sldId id="296" r:id="rId15"/>
-    <p:sldId id="261" r:id="rId16"/>
-    <p:sldId id="287" r:id="rId17"/>
-    <p:sldId id="297" r:id="rId18"/>
-    <p:sldId id="262" r:id="rId19"/>
-    <p:sldId id="284" r:id="rId20"/>
-    <p:sldId id="273" r:id="rId21"/>
-    <p:sldId id="285" r:id="rId22"/>
-    <p:sldId id="276" r:id="rId23"/>
-    <p:sldId id="278" r:id="rId24"/>
-    <p:sldId id="270" r:id="rId25"/>
-    <p:sldId id="271" r:id="rId26"/>
-    <p:sldId id="265" r:id="rId27"/>
+    <p:sldId id="298" r:id="rId3"/>
+    <p:sldId id="282" r:id="rId4"/>
+    <p:sldId id="283" r:id="rId5"/>
+    <p:sldId id="289" r:id="rId6"/>
+    <p:sldId id="290" r:id="rId7"/>
+    <p:sldId id="291" r:id="rId8"/>
+    <p:sldId id="292" r:id="rId9"/>
+    <p:sldId id="257" r:id="rId10"/>
+    <p:sldId id="279" r:id="rId11"/>
+    <p:sldId id="280" r:id="rId12"/>
+    <p:sldId id="293" r:id="rId13"/>
+    <p:sldId id="294" r:id="rId14"/>
+    <p:sldId id="295" r:id="rId15"/>
+    <p:sldId id="296" r:id="rId16"/>
+    <p:sldId id="261" r:id="rId17"/>
+    <p:sldId id="287" r:id="rId18"/>
+    <p:sldId id="297" r:id="rId19"/>
+    <p:sldId id="262" r:id="rId20"/>
+    <p:sldId id="284" r:id="rId21"/>
+    <p:sldId id="273" r:id="rId22"/>
+    <p:sldId id="285" r:id="rId23"/>
+    <p:sldId id="276" r:id="rId24"/>
+    <p:sldId id="278" r:id="rId25"/>
+    <p:sldId id="270" r:id="rId26"/>
+    <p:sldId id="271" r:id="rId27"/>
+    <p:sldId id="265" r:id="rId28"/>
   </p:sldIdLst>
   <p:sldSz cx="9144000" cy="6858000" type="screen4x3"/>
   <p:notesSz cx="6858000" cy="9144000"/>
@@ -233,7 +234,7 @@
           <a:p>
             <a:fld id="{3C31BDEC-C855-4A20-BFC3-C78B82093698}" type="datetimeFigureOut">
               <a:rPr lang="en-US" smtClean="0"/>
-              <a:t>7/21/2017</a:t>
+              <a:t>7/22/2017</a:t>
             </a:fld>
             <a:endParaRPr lang="en-US"/>
           </a:p>
@@ -657,7 +658,7 @@
           <a:p>
             <a:fld id="{737EB954-88EE-45B2-878D-41C5C083E9B9}" type="slidenum">
               <a:rPr lang="en-US" smtClean="0"/>
-              <a:t>18</a:t>
+              <a:t>19</a:t>
             </a:fld>
             <a:endParaRPr lang="en-US"/>
           </a:p>
@@ -761,7 +762,7 @@
           <a:p>
             <a:fld id="{737EB954-88EE-45B2-878D-41C5C083E9B9}" type="slidenum">
               <a:rPr lang="en-US" smtClean="0"/>
-              <a:t>19</a:t>
+              <a:t>20</a:t>
             </a:fld>
             <a:endParaRPr lang="en-US"/>
           </a:p>
@@ -875,7 +876,7 @@
           <a:p>
             <a:fld id="{737EB954-88EE-45B2-878D-41C5C083E9B9}" type="slidenum">
               <a:rPr lang="en-US" smtClean="0"/>
-              <a:t>21</a:t>
+              <a:t>22</a:t>
             </a:fld>
             <a:endParaRPr lang="en-US"/>
           </a:p>
@@ -995,7 +996,7 @@
           <a:p>
             <a:fld id="{737EB954-88EE-45B2-878D-41C5C083E9B9}" type="slidenum">
               <a:rPr lang="en-US" smtClean="0"/>
-              <a:t>26</a:t>
+              <a:t>27</a:t>
             </a:fld>
             <a:endParaRPr lang="en-US"/>
           </a:p>
@@ -1089,7 +1090,7 @@
                 </a:solidFill>
               </a:rPr>
               <a:pPr/>
-              <a:t>3</a:t>
+              <a:t>4</a:t>
             </a:fld>
             <a:endParaRPr lang="en-GB" dirty="0">
               <a:solidFill>
@@ -1182,7 +1183,7 @@
           <a:p>
             <a:fld id="{23D30045-AEBE-4117-8D8F-8499E1D0AF2B}" type="slidenum">
               <a:rPr lang="en-US" smtClean="0"/>
-              <a:t>5</a:t>
+              <a:t>6</a:t>
             </a:fld>
             <a:endParaRPr lang="en-US"/>
           </a:p>
@@ -1271,7 +1272,7 @@
           <a:p>
             <a:fld id="{23D30045-AEBE-4117-8D8F-8499E1D0AF2B}" type="slidenum">
               <a:rPr lang="en-US" smtClean="0"/>
-              <a:t>6</a:t>
+              <a:t>7</a:t>
             </a:fld>
             <a:endParaRPr lang="en-US"/>
           </a:p>
@@ -1358,7 +1359,7 @@
           <a:p>
             <a:fld id="{23D30045-AEBE-4117-8D8F-8499E1D0AF2B}" type="slidenum">
               <a:rPr lang="en-US" smtClean="0"/>
-              <a:t>7</a:t>
+              <a:t>8</a:t>
             </a:fld>
             <a:endParaRPr lang="en-US"/>
           </a:p>
@@ -1450,7 +1451,7 @@
           <a:p>
             <a:fld id="{737EB954-88EE-45B2-878D-41C5C083E9B9}" type="slidenum">
               <a:rPr lang="en-US" smtClean="0"/>
-              <a:t>8</a:t>
+              <a:t>9</a:t>
             </a:fld>
             <a:endParaRPr lang="en-US"/>
           </a:p>
@@ -1534,7 +1535,7 @@
           <a:p>
             <a:fld id="{737EB954-88EE-45B2-878D-41C5C083E9B9}" type="slidenum">
               <a:rPr lang="en-US" smtClean="0"/>
-              <a:t>13</a:t>
+              <a:t>14</a:t>
             </a:fld>
             <a:endParaRPr lang="en-US"/>
           </a:p>
@@ -1626,7 +1627,7 @@
           <a:p>
             <a:fld id="{737EB954-88EE-45B2-878D-41C5C083E9B9}" type="slidenum">
               <a:rPr lang="en-US" smtClean="0"/>
-              <a:t>15</a:t>
+              <a:t>16</a:t>
             </a:fld>
             <a:endParaRPr lang="en-US"/>
           </a:p>
@@ -1716,7 +1717,7 @@
           <a:p>
             <a:fld id="{737EB954-88EE-45B2-878D-41C5C083E9B9}" type="slidenum">
               <a:rPr lang="en-US" smtClean="0"/>
-              <a:t>16</a:t>
+              <a:t>17</a:t>
             </a:fld>
             <a:endParaRPr lang="en-US"/>
           </a:p>
@@ -1915,7 +1916,7 @@
             <a:fld id="{1D8BD707-D9CF-40AE-B4C6-C98DA3205C09}" type="datetimeFigureOut">
               <a:rPr lang="en-US" smtClean="0"/>
               <a:pPr/>
-              <a:t>7/21/2017</a:t>
+              <a:t>7/22/2017</a:t>
             </a:fld>
             <a:endParaRPr lang="en-US"/>
           </a:p>
@@ -2080,7 +2081,7 @@
             <a:fld id="{1D8BD707-D9CF-40AE-B4C6-C98DA3205C09}" type="datetimeFigureOut">
               <a:rPr lang="en-US" smtClean="0"/>
               <a:pPr/>
-              <a:t>7/21/2017</a:t>
+              <a:t>7/22/2017</a:t>
             </a:fld>
             <a:endParaRPr lang="en-US"/>
           </a:p>
@@ -2255,7 +2256,7 @@
             <a:fld id="{1D8BD707-D9CF-40AE-B4C6-C98DA3205C09}" type="datetimeFigureOut">
               <a:rPr lang="en-US" smtClean="0"/>
               <a:pPr/>
-              <a:t>7/21/2017</a:t>
+              <a:t>7/22/2017</a:t>
             </a:fld>
             <a:endParaRPr lang="en-US"/>
           </a:p>
@@ -2420,7 +2421,7 @@
             <a:fld id="{1D8BD707-D9CF-40AE-B4C6-C98DA3205C09}" type="datetimeFigureOut">
               <a:rPr lang="en-US" smtClean="0"/>
               <a:pPr/>
-              <a:t>7/21/2017</a:t>
+              <a:t>7/22/2017</a:t>
             </a:fld>
             <a:endParaRPr lang="en-US"/>
           </a:p>
@@ -2662,7 +2663,7 @@
             <a:fld id="{1D8BD707-D9CF-40AE-B4C6-C98DA3205C09}" type="datetimeFigureOut">
               <a:rPr lang="en-US" smtClean="0"/>
               <a:pPr/>
-              <a:t>7/21/2017</a:t>
+              <a:t>7/22/2017</a:t>
             </a:fld>
             <a:endParaRPr lang="en-US"/>
           </a:p>
@@ -2944,7 +2945,7 @@
             <a:fld id="{1D8BD707-D9CF-40AE-B4C6-C98DA3205C09}" type="datetimeFigureOut">
               <a:rPr lang="en-US" smtClean="0"/>
               <a:pPr/>
-              <a:t>7/21/2017</a:t>
+              <a:t>7/22/2017</a:t>
             </a:fld>
             <a:endParaRPr lang="en-US"/>
           </a:p>
@@ -3360,7 +3361,7 @@
             <a:fld id="{1D8BD707-D9CF-40AE-B4C6-C98DA3205C09}" type="datetimeFigureOut">
               <a:rPr lang="en-US" smtClean="0"/>
               <a:pPr/>
-              <a:t>7/21/2017</a:t>
+              <a:t>7/22/2017</a:t>
             </a:fld>
             <a:endParaRPr lang="en-US"/>
           </a:p>
@@ -3474,7 +3475,7 @@
             <a:fld id="{1D8BD707-D9CF-40AE-B4C6-C98DA3205C09}" type="datetimeFigureOut">
               <a:rPr lang="en-US" smtClean="0"/>
               <a:pPr/>
-              <a:t>7/21/2017</a:t>
+              <a:t>7/22/2017</a:t>
             </a:fld>
             <a:endParaRPr lang="en-US"/>
           </a:p>
@@ -3566,7 +3567,7 @@
             <a:fld id="{1D8BD707-D9CF-40AE-B4C6-C98DA3205C09}" type="datetimeFigureOut">
               <a:rPr lang="en-US" smtClean="0"/>
               <a:pPr/>
-              <a:t>7/21/2017</a:t>
+              <a:t>7/22/2017</a:t>
             </a:fld>
             <a:endParaRPr lang="en-US"/>
           </a:p>
@@ -3838,7 +3839,7 @@
             <a:fld id="{1D8BD707-D9CF-40AE-B4C6-C98DA3205C09}" type="datetimeFigureOut">
               <a:rPr lang="en-US" smtClean="0"/>
               <a:pPr/>
-              <a:t>7/21/2017</a:t>
+              <a:t>7/22/2017</a:t>
             </a:fld>
             <a:endParaRPr lang="en-US"/>
           </a:p>
@@ -4087,7 +4088,7 @@
             <a:fld id="{1D8BD707-D9CF-40AE-B4C6-C98DA3205C09}" type="datetimeFigureOut">
               <a:rPr lang="en-US" smtClean="0"/>
               <a:pPr/>
-              <a:t>7/21/2017</a:t>
+              <a:t>7/22/2017</a:t>
             </a:fld>
             <a:endParaRPr lang="en-US"/>
           </a:p>
@@ -4295,7 +4296,7 @@
             <a:fld id="{1D8BD707-D9CF-40AE-B4C6-C98DA3205C09}" type="datetimeFigureOut">
               <a:rPr lang="en-US" smtClean="0"/>
               <a:pPr/>
-              <a:t>7/21/2017</a:t>
+              <a:t>7/22/2017</a:t>
             </a:fld>
             <a:endParaRPr lang="en-US"/>
           </a:p>
@@ -5001,7 +5002,7 @@
           <a:p>
             <a:r>
               <a:rPr lang="en-US" dirty="0"/>
-              <a:t>Writing Tests</a:t>
+              <a:t>Building Tests</a:t>
             </a:r>
           </a:p>
         </p:txBody>
@@ -5023,36 +5024,19 @@
           <a:p>
             <a:r>
               <a:rPr lang="en-US" dirty="0"/>
-              <a:t>TDD?</a:t>
-            </a:r>
-          </a:p>
-          <a:p>
-            <a:r>
-              <a:rPr lang="en-US" dirty="0" err="1"/>
-              <a:t>DurinWrite</a:t>
-            </a:r>
+              <a:t>We want repeatable tests</a:t>
+            </a:r>
+          </a:p>
+          <a:p>
             <a:r>
               <a:rPr lang="en-US" dirty="0"/>
-              <a:t> after if you must.</a:t>
-            </a:r>
-          </a:p>
-          <a:p>
-            <a:pPr lvl="1"/>
+              <a:t>We want automated tests</a:t>
+            </a:r>
+          </a:p>
+          <a:p>
             <a:r>
               <a:rPr lang="en-US" dirty="0"/>
-              <a:t>Good for existing code</a:t>
-            </a:r>
-          </a:p>
-          <a:p>
-            <a:r>
-              <a:rPr lang="en-US" dirty="0"/>
-              <a:t>g development.</a:t>
-            </a:r>
-          </a:p>
-          <a:p>
-            <a:r>
-              <a:rPr lang="en-US" dirty="0"/>
-              <a:t>Write as you get feedback from CI and QA testing.</a:t>
+              <a:t>We want a suite of tests</a:t>
             </a:r>
           </a:p>
         </p:txBody>
@@ -5060,7 +5044,7 @@
     </p:spTree>
     <p:extLst>
       <p:ext uri="{BB962C8B-B14F-4D97-AF65-F5344CB8AC3E}">
-        <p14:creationId xmlns:p14="http://schemas.microsoft.com/office/powerpoint/2010/main" val="1110580934"/>
+        <p14:creationId xmlns:p14="http://schemas.microsoft.com/office/powerpoint/2010/main" val="2858332371"/>
       </p:ext>
     </p:extLst>
   </p:cSld>
@@ -5104,7 +5088,7 @@
           <a:p>
             <a:r>
               <a:rPr lang="en-US" dirty="0"/>
-              <a:t>Structure of tests</a:t>
+              <a:t>Writing Tests</a:t>
             </a:r>
           </a:p>
         </p:txBody>
@@ -5121,139 +5105,49 @@
         </p:nvSpPr>
         <p:spPr/>
         <p:txBody>
-          <a:bodyPr>
-            <a:normAutofit lnSpcReduction="10000"/>
-          </a:bodyPr>
-          <a:lstStyle/>
-          <a:p>
-            <a:pPr>
-              <a:spcAft>
-                <a:spcPts val="450"/>
-              </a:spcAft>
-            </a:pPr>
-            <a:r>
-              <a:rPr lang="en-US" sz="2400" b="1" dirty="0">
-                <a:cs typeface="Arial" panose="020B0604020202020204" pitchFamily="34" charset="0"/>
-              </a:rPr>
-              <a:t>Classes</a:t>
-            </a:r>
-          </a:p>
-          <a:p>
-            <a:pPr marL="933450" lvl="1" indent="-457200">
-              <a:buFont typeface="Arial" panose="020B0604020202020204" pitchFamily="34" charset="0"/>
-              <a:buChar char="•"/>
-            </a:pPr>
-            <a:r>
-              <a:rPr lang="en-US" sz="2400" dirty="0">
-                <a:cs typeface="Arial" panose="020B0604020202020204" pitchFamily="34" charset="0"/>
-              </a:rPr>
-              <a:t>Group by object/area being tested</a:t>
-            </a:r>
-          </a:p>
-          <a:p>
-            <a:pPr marL="933450" lvl="1" indent="-457200">
-              <a:buFont typeface="Arial" panose="020B0604020202020204" pitchFamily="34" charset="0"/>
-              <a:buChar char="•"/>
-            </a:pPr>
-            <a:r>
-              <a:rPr lang="en-US" sz="2400" dirty="0">
-                <a:cs typeface="Arial" panose="020B0604020202020204" pitchFamily="34" charset="0"/>
-              </a:rPr>
-              <a:t>Or scale (Google – S, M, L)</a:t>
-            </a:r>
-          </a:p>
-          <a:p>
-            <a:pPr marL="819150" lvl="1" indent="-342900">
-              <a:buFont typeface="Arial" panose="020B0604020202020204" pitchFamily="34" charset="0"/>
-              <a:buChar char="•"/>
-            </a:pPr>
-            <a:r>
-              <a:rPr lang="en-US" sz="2400" dirty="0">
-                <a:cs typeface="Arial" panose="020B0604020202020204" pitchFamily="34" charset="0"/>
-              </a:rPr>
-              <a:t> </a:t>
-            </a:r>
-          </a:p>
-          <a:p>
-            <a:pPr>
-              <a:spcAft>
-                <a:spcPts val="450"/>
-              </a:spcAft>
-            </a:pPr>
-            <a:r>
-              <a:rPr lang="en-US" sz="2400" b="1" dirty="0">
-                <a:cs typeface="Arial" panose="020B0604020202020204" pitchFamily="34" charset="0"/>
-              </a:rPr>
-              <a:t>Layout</a:t>
-            </a:r>
-          </a:p>
-          <a:p>
-            <a:pPr marL="933450" lvl="1" indent="-457200">
-              <a:buFont typeface="Arial" panose="020B0604020202020204" pitchFamily="34" charset="0"/>
-              <a:buChar char="•"/>
-            </a:pPr>
-            <a:r>
-              <a:rPr lang="en-US" sz="2400" dirty="0">
-                <a:cs typeface="Arial" panose="020B0604020202020204" pitchFamily="34" charset="0"/>
-              </a:rPr>
-              <a:t>Assemble</a:t>
-            </a:r>
-          </a:p>
-          <a:p>
-            <a:pPr marL="933450" lvl="1" indent="-457200">
-              <a:buFont typeface="Arial" panose="020B0604020202020204" pitchFamily="34" charset="0"/>
-              <a:buChar char="•"/>
-            </a:pPr>
-            <a:r>
-              <a:rPr lang="en-US" sz="2400" dirty="0">
-                <a:cs typeface="Arial" panose="020B0604020202020204" pitchFamily="34" charset="0"/>
-              </a:rPr>
-              <a:t>Act</a:t>
-            </a:r>
-          </a:p>
-          <a:p>
-            <a:pPr marL="933450" lvl="1" indent="-457200">
-              <a:buFont typeface="Arial" panose="020B0604020202020204" pitchFamily="34" charset="0"/>
-              <a:buChar char="•"/>
-            </a:pPr>
-            <a:r>
-              <a:rPr lang="en-US" sz="2400" dirty="0">
-                <a:cs typeface="Arial" panose="020B0604020202020204" pitchFamily="34" charset="0"/>
-              </a:rPr>
-              <a:t>Assert</a:t>
-            </a:r>
-          </a:p>
-          <a:p>
-            <a:pPr marL="933450" lvl="1" indent="-457200">
-              <a:buFont typeface="Arial" panose="020B0604020202020204" pitchFamily="34" charset="0"/>
-              <a:buChar char="•"/>
-            </a:pPr>
-            <a:endParaRPr lang="en-US" sz="2400" dirty="0">
-              <a:cs typeface="Arial" panose="020B0604020202020204" pitchFamily="34" charset="0"/>
-            </a:endParaRPr>
-          </a:p>
-          <a:p>
-            <a:pPr>
-              <a:spcAft>
-                <a:spcPts val="450"/>
-              </a:spcAft>
-            </a:pPr>
-            <a:r>
-              <a:rPr lang="en-US" sz="2400" b="1" dirty="0">
-                <a:cs typeface="Arial" panose="020B0604020202020204" pitchFamily="34" charset="0"/>
-              </a:rPr>
-              <a:t>Tests fail first</a:t>
-            </a:r>
-          </a:p>
-          <a:p>
-            <a:endParaRPr lang="en-US" dirty="0"/>
+          <a:bodyPr/>
+          <a:lstStyle/>
+          <a:p>
+            <a:r>
+              <a:rPr lang="en-US" dirty="0"/>
+              <a:t>TDD?</a:t>
+            </a:r>
+          </a:p>
+          <a:p>
+            <a:r>
+              <a:rPr lang="en-US" dirty="0" err="1"/>
+              <a:t>DurinWrite</a:t>
+            </a:r>
+            <a:r>
+              <a:rPr lang="en-US" dirty="0"/>
+              <a:t> after if you must.</a:t>
+            </a:r>
+          </a:p>
+          <a:p>
+            <a:pPr lvl="1"/>
+            <a:r>
+              <a:rPr lang="en-US" dirty="0"/>
+              <a:t>Good for existing code</a:t>
+            </a:r>
+          </a:p>
+          <a:p>
+            <a:r>
+              <a:rPr lang="en-US" dirty="0"/>
+              <a:t>g development.</a:t>
+            </a:r>
+          </a:p>
+          <a:p>
+            <a:r>
+              <a:rPr lang="en-US" dirty="0"/>
+              <a:t>Write as you get feedback from CI and QA testing.</a:t>
+            </a:r>
           </a:p>
         </p:txBody>
       </p:sp>
     </p:spTree>
     <p:extLst>
       <p:ext uri="{BB962C8B-B14F-4D97-AF65-F5344CB8AC3E}">
-        <p14:creationId xmlns:p14="http://schemas.microsoft.com/office/powerpoint/2010/main" val="3790041024"/>
+        <p14:creationId xmlns:p14="http://schemas.microsoft.com/office/powerpoint/2010/main" val="1110580934"/>
       </p:ext>
     </p:extLst>
   </p:cSld>
@@ -5297,7 +5191,7 @@
           <a:p>
             <a:r>
               <a:rPr lang="en-US" dirty="0"/>
-              <a:t>Test Data</a:t>
+              <a:t>Structure of tests</a:t>
             </a:r>
           </a:p>
         </p:txBody>
@@ -5314,32 +5208,139 @@
         </p:nvSpPr>
         <p:spPr/>
         <p:txBody>
-          <a:bodyPr/>
-          <a:lstStyle/>
-          <a:p>
-            <a:r>
-              <a:rPr lang="en-US" dirty="0"/>
-              <a:t>We don't need lots of data to write code</a:t>
-            </a:r>
-          </a:p>
-          <a:p>
-            <a:r>
-              <a:rPr lang="en-US" dirty="0"/>
-              <a:t>Ideally our tests contain data</a:t>
-            </a:r>
-          </a:p>
-          <a:p>
-            <a:r>
-              <a:rPr lang="en-US" dirty="0"/>
-              <a:t>For more extensive testing, we should have a curated set of data that all developers (and systems) use.</a:t>
-            </a:r>
+          <a:bodyPr>
+            <a:normAutofit lnSpcReduction="10000"/>
+          </a:bodyPr>
+          <a:lstStyle/>
+          <a:p>
+            <a:pPr>
+              <a:spcAft>
+                <a:spcPts val="450"/>
+              </a:spcAft>
+            </a:pPr>
+            <a:r>
+              <a:rPr lang="en-US" sz="2400" b="1" dirty="0">
+                <a:cs typeface="Arial" panose="020B0604020202020204" pitchFamily="34" charset="0"/>
+              </a:rPr>
+              <a:t>Classes</a:t>
+            </a:r>
+          </a:p>
+          <a:p>
+            <a:pPr marL="933450" lvl="1" indent="-457200">
+              <a:buFont typeface="Arial" panose="020B0604020202020204" pitchFamily="34" charset="0"/>
+              <a:buChar char="•"/>
+            </a:pPr>
+            <a:r>
+              <a:rPr lang="en-US" sz="2400" dirty="0">
+                <a:cs typeface="Arial" panose="020B0604020202020204" pitchFamily="34" charset="0"/>
+              </a:rPr>
+              <a:t>Group by object/area being tested</a:t>
+            </a:r>
+          </a:p>
+          <a:p>
+            <a:pPr marL="933450" lvl="1" indent="-457200">
+              <a:buFont typeface="Arial" panose="020B0604020202020204" pitchFamily="34" charset="0"/>
+              <a:buChar char="•"/>
+            </a:pPr>
+            <a:r>
+              <a:rPr lang="en-US" sz="2400" dirty="0">
+                <a:cs typeface="Arial" panose="020B0604020202020204" pitchFamily="34" charset="0"/>
+              </a:rPr>
+              <a:t>Or scale (Google – S, M, L)</a:t>
+            </a:r>
+          </a:p>
+          <a:p>
+            <a:pPr marL="819150" lvl="1" indent="-342900">
+              <a:buFont typeface="Arial" panose="020B0604020202020204" pitchFamily="34" charset="0"/>
+              <a:buChar char="•"/>
+            </a:pPr>
+            <a:r>
+              <a:rPr lang="en-US" sz="2400" dirty="0">
+                <a:cs typeface="Arial" panose="020B0604020202020204" pitchFamily="34" charset="0"/>
+              </a:rPr>
+              <a:t> </a:t>
+            </a:r>
+          </a:p>
+          <a:p>
+            <a:pPr>
+              <a:spcAft>
+                <a:spcPts val="450"/>
+              </a:spcAft>
+            </a:pPr>
+            <a:r>
+              <a:rPr lang="en-US" sz="2400" b="1" dirty="0">
+                <a:cs typeface="Arial" panose="020B0604020202020204" pitchFamily="34" charset="0"/>
+              </a:rPr>
+              <a:t>Layout</a:t>
+            </a:r>
+          </a:p>
+          <a:p>
+            <a:pPr marL="933450" lvl="1" indent="-457200">
+              <a:buFont typeface="Arial" panose="020B0604020202020204" pitchFamily="34" charset="0"/>
+              <a:buChar char="•"/>
+            </a:pPr>
+            <a:r>
+              <a:rPr lang="en-US" sz="2400" dirty="0">
+                <a:cs typeface="Arial" panose="020B0604020202020204" pitchFamily="34" charset="0"/>
+              </a:rPr>
+              <a:t>Assemble</a:t>
+            </a:r>
+          </a:p>
+          <a:p>
+            <a:pPr marL="933450" lvl="1" indent="-457200">
+              <a:buFont typeface="Arial" panose="020B0604020202020204" pitchFamily="34" charset="0"/>
+              <a:buChar char="•"/>
+            </a:pPr>
+            <a:r>
+              <a:rPr lang="en-US" sz="2400" dirty="0">
+                <a:cs typeface="Arial" panose="020B0604020202020204" pitchFamily="34" charset="0"/>
+              </a:rPr>
+              <a:t>Act</a:t>
+            </a:r>
+          </a:p>
+          <a:p>
+            <a:pPr marL="933450" lvl="1" indent="-457200">
+              <a:buFont typeface="Arial" panose="020B0604020202020204" pitchFamily="34" charset="0"/>
+              <a:buChar char="•"/>
+            </a:pPr>
+            <a:r>
+              <a:rPr lang="en-US" sz="2400" dirty="0">
+                <a:cs typeface="Arial" panose="020B0604020202020204" pitchFamily="34" charset="0"/>
+              </a:rPr>
+              <a:t>Assert</a:t>
+            </a:r>
+          </a:p>
+          <a:p>
+            <a:pPr marL="933450" lvl="1" indent="-457200">
+              <a:buFont typeface="Arial" panose="020B0604020202020204" pitchFamily="34" charset="0"/>
+              <a:buChar char="•"/>
+            </a:pPr>
+            <a:endParaRPr lang="en-US" sz="2400" dirty="0">
+              <a:cs typeface="Arial" panose="020B0604020202020204" pitchFamily="34" charset="0"/>
+            </a:endParaRPr>
+          </a:p>
+          <a:p>
+            <a:pPr>
+              <a:spcAft>
+                <a:spcPts val="450"/>
+              </a:spcAft>
+            </a:pPr>
+            <a:r>
+              <a:rPr lang="en-US" sz="2400" b="1" dirty="0">
+                <a:cs typeface="Arial" panose="020B0604020202020204" pitchFamily="34" charset="0"/>
+              </a:rPr>
+              <a:t>Tests fail first</a:t>
+            </a:r>
+          </a:p>
+          <a:p>
+            <a:endParaRPr lang="en-US" dirty="0"/>
           </a:p>
         </p:txBody>
       </p:sp>
     </p:spTree>
     <p:extLst>
       <p:ext uri="{BB962C8B-B14F-4D97-AF65-F5344CB8AC3E}">
-        <p14:creationId xmlns:p14="http://schemas.microsoft.com/office/powerpoint/2010/main" val="1968612938"/>
+        <p14:creationId xmlns:p14="http://schemas.microsoft.com/office/powerpoint/2010/main" val="3790041024"/>
       </p:ext>
     </p:extLst>
   </p:cSld>
@@ -5368,7 +5369,7 @@
       </p:grpSpPr>
       <p:sp>
         <p:nvSpPr>
-          <p:cNvPr id="4" name="Title 3"/>
+          <p:cNvPr id="2" name="Title 1"/>
           <p:cNvSpPr>
             <a:spLocks noGrp="1"/>
           </p:cNvSpPr>
@@ -5390,12 +5391,12 @@
       </p:sp>
       <p:sp>
         <p:nvSpPr>
-          <p:cNvPr id="5" name="Text Placeholder 4"/>
-          <p:cNvSpPr>
-            <a:spLocks noGrp="1"/>
-          </p:cNvSpPr>
-          <p:nvPr>
-            <p:ph type="body" idx="1"/>
+          <p:cNvPr id="3" name="Content Placeholder 2"/>
+          <p:cNvSpPr>
+            <a:spLocks noGrp="1"/>
+          </p:cNvSpPr>
+          <p:nvPr>
+            <p:ph idx="1"/>
           </p:nvPr>
         </p:nvSpPr>
         <p:spPr/>
@@ -5405,7 +5406,19 @@
           <a:p>
             <a:r>
               <a:rPr lang="en-US" dirty="0"/>
-              <a:t>Demo</a:t>
+              <a:t>We don't need lots of data to write code</a:t>
+            </a:r>
+          </a:p>
+          <a:p>
+            <a:r>
+              <a:rPr lang="en-US" dirty="0"/>
+              <a:t>Ideally our tests contain data</a:t>
+            </a:r>
+          </a:p>
+          <a:p>
+            <a:r>
+              <a:rPr lang="en-US" dirty="0"/>
+              <a:t>For more extensive testing, we should have a curated set of data that all developers (and systems) use.</a:t>
             </a:r>
           </a:p>
         </p:txBody>
@@ -5413,7 +5426,7 @@
     </p:spTree>
     <p:extLst>
       <p:ext uri="{BB962C8B-B14F-4D97-AF65-F5344CB8AC3E}">
-        <p14:creationId xmlns:p14="http://schemas.microsoft.com/office/powerpoint/2010/main" val="3540592545"/>
+        <p14:creationId xmlns:p14="http://schemas.microsoft.com/office/powerpoint/2010/main" val="1968612938"/>
       </p:ext>
     </p:extLst>
   </p:cSld>
@@ -5442,7 +5455,7 @@
       </p:grpSpPr>
       <p:sp>
         <p:nvSpPr>
-          <p:cNvPr id="2" name="Title 1"/>
+          <p:cNvPr id="4" name="Title 3"/>
           <p:cNvSpPr>
             <a:spLocks noGrp="1"/>
           </p:cNvSpPr>
@@ -5457,14 +5470,14 @@
           <a:p>
             <a:r>
               <a:rPr lang="en-US" dirty="0"/>
-              <a:t>Database Testing Frameworks</a:t>
-            </a:r>
-          </a:p>
-        </p:txBody>
-      </p:sp>
-      <p:sp>
-        <p:nvSpPr>
-          <p:cNvPr id="3" name="Text Placeholder 2"/>
+              <a:t>Test Data</a:t>
+            </a:r>
+          </a:p>
+        </p:txBody>
+      </p:sp>
+      <p:sp>
+        <p:nvSpPr>
+          <p:cNvPr id="5" name="Text Placeholder 4"/>
           <p:cNvSpPr>
             <a:spLocks noGrp="1"/>
           </p:cNvSpPr>
@@ -5477,14 +5490,17 @@
           <a:bodyPr/>
           <a:lstStyle/>
           <a:p>
-            <a:endParaRPr lang="en-US"/>
+            <a:r>
+              <a:rPr lang="en-US" dirty="0"/>
+              <a:t>Demo</a:t>
+            </a:r>
           </a:p>
         </p:txBody>
       </p:sp>
     </p:spTree>
     <p:extLst>
       <p:ext uri="{BB962C8B-B14F-4D97-AF65-F5344CB8AC3E}">
-        <p14:creationId xmlns:p14="http://schemas.microsoft.com/office/powerpoint/2010/main" val="3452093907"/>
+        <p14:creationId xmlns:p14="http://schemas.microsoft.com/office/powerpoint/2010/main" val="3540592545"/>
       </p:ext>
     </p:extLst>
   </p:cSld>
@@ -5527,116 +5543,35 @@
           <a:lstStyle/>
           <a:p>
             <a:r>
-              <a:rPr lang="en-US" dirty="0" err="1"/>
-              <a:t>tSQLt</a:t>
-            </a:r>
-            <a:endParaRPr lang="en-US" dirty="0"/>
-          </a:p>
-        </p:txBody>
-      </p:sp>
-      <p:sp>
-        <p:nvSpPr>
-          <p:cNvPr id="3" name="Content Placeholder 2"/>
-          <p:cNvSpPr>
-            <a:spLocks noGrp="1"/>
-          </p:cNvSpPr>
-          <p:nvPr>
-            <p:ph idx="1"/>
-          </p:nvPr>
-        </p:nvSpPr>
-        <p:spPr/>
-        <p:txBody>
-          <a:bodyPr>
-            <a:normAutofit/>
-          </a:bodyPr>
-          <a:lstStyle/>
-          <a:p>
-            <a:r>
-              <a:rPr lang="en-US" dirty="0" err="1"/>
-              <a:t>tSQLt</a:t>
-            </a:r>
-            <a:r>
               <a:rPr lang="en-US" dirty="0"/>
-              <a:t> is a free, similar to </a:t>
-            </a:r>
-            <a:r>
-              <a:rPr lang="en-US" dirty="0" err="1"/>
-              <a:t>nUnit</a:t>
-            </a:r>
-            <a:r>
-              <a:rPr lang="en-US" dirty="0"/>
-              <a:t>/</a:t>
-            </a:r>
-            <a:r>
-              <a:rPr lang="en-US" dirty="0" err="1"/>
-              <a:t>jUnit</a:t>
-            </a:r>
-            <a:endParaRPr lang="en-US" dirty="0"/>
-          </a:p>
-          <a:p>
-            <a:r>
-              <a:rPr lang="en-US" dirty="0">
-                <a:hlinkClick r:id="rId3"/>
-              </a:rPr>
-              <a:t>tSQLt.org</a:t>
-            </a:r>
-            <a:r>
-              <a:rPr lang="en-US" dirty="0"/>
-              <a:t> (requires CLR)</a:t>
-            </a:r>
-          </a:p>
-          <a:p>
-            <a:pPr lvl="1"/>
-            <a:r>
-              <a:rPr lang="en-US" dirty="0"/>
-              <a:t>Stored procedures in their own schema</a:t>
-            </a:r>
-          </a:p>
-          <a:p>
-            <a:pPr lvl="1"/>
-            <a:r>
-              <a:rPr lang="en-US" dirty="0"/>
-              <a:t>Can run setup before tests</a:t>
-            </a:r>
-          </a:p>
-          <a:p>
-            <a:pPr lvl="1"/>
-            <a:r>
-              <a:rPr lang="en-US" dirty="0"/>
-              <a:t>Can mock objects </a:t>
-            </a:r>
-          </a:p>
-          <a:p>
-            <a:pPr lvl="1"/>
-            <a:r>
-              <a:rPr lang="en-US" dirty="0"/>
-              <a:t>Can implement teardown</a:t>
-            </a:r>
-          </a:p>
-          <a:p>
-            <a:r>
-              <a:rPr lang="en-US" dirty="0">
-                <a:hlinkClick r:id="rId4"/>
-              </a:rPr>
-              <a:t>Support via Google Groups</a:t>
-            </a:r>
-            <a:endParaRPr lang="en-US" dirty="0"/>
-          </a:p>
-          <a:p>
-            <a:r>
-              <a:rPr lang="en-US" dirty="0">
-                <a:hlinkClick r:id="rId5"/>
-              </a:rPr>
-              <a:t>Articles at Simple Talk</a:t>
-            </a:r>
-            <a:endParaRPr lang="en-US" dirty="0"/>
+              <a:t>Database Testing Frameworks</a:t>
+            </a:r>
+          </a:p>
+        </p:txBody>
+      </p:sp>
+      <p:sp>
+        <p:nvSpPr>
+          <p:cNvPr id="3" name="Text Placeholder 2"/>
+          <p:cNvSpPr>
+            <a:spLocks noGrp="1"/>
+          </p:cNvSpPr>
+          <p:nvPr>
+            <p:ph type="body" idx="1"/>
+          </p:nvPr>
+        </p:nvSpPr>
+        <p:spPr/>
+        <p:txBody>
+          <a:bodyPr/>
+          <a:lstStyle/>
+          <a:p>
+            <a:endParaRPr lang="en-US"/>
           </a:p>
         </p:txBody>
       </p:sp>
     </p:spTree>
     <p:extLst>
       <p:ext uri="{BB962C8B-B14F-4D97-AF65-F5344CB8AC3E}">
-        <p14:creationId xmlns:p14="http://schemas.microsoft.com/office/powerpoint/2010/main" val="2399096538"/>
+        <p14:creationId xmlns:p14="http://schemas.microsoft.com/office/powerpoint/2010/main" val="3452093907"/>
       </p:ext>
     </p:extLst>
   </p:cSld>
@@ -5679,6 +5614,158 @@
           <a:lstStyle/>
           <a:p>
             <a:r>
+              <a:rPr lang="en-US" dirty="0" err="1"/>
+              <a:t>tSQLt</a:t>
+            </a:r>
+            <a:endParaRPr lang="en-US" dirty="0"/>
+          </a:p>
+        </p:txBody>
+      </p:sp>
+      <p:sp>
+        <p:nvSpPr>
+          <p:cNvPr id="3" name="Content Placeholder 2"/>
+          <p:cNvSpPr>
+            <a:spLocks noGrp="1"/>
+          </p:cNvSpPr>
+          <p:nvPr>
+            <p:ph idx="1"/>
+          </p:nvPr>
+        </p:nvSpPr>
+        <p:spPr/>
+        <p:txBody>
+          <a:bodyPr>
+            <a:normAutofit/>
+          </a:bodyPr>
+          <a:lstStyle/>
+          <a:p>
+            <a:r>
+              <a:rPr lang="en-US" dirty="0" err="1"/>
+              <a:t>tSQLt</a:t>
+            </a:r>
+            <a:r>
+              <a:rPr lang="en-US" dirty="0"/>
+              <a:t> is a free, similar to </a:t>
+            </a:r>
+            <a:r>
+              <a:rPr lang="en-US" dirty="0" err="1"/>
+              <a:t>nUnit</a:t>
+            </a:r>
+            <a:r>
+              <a:rPr lang="en-US" dirty="0"/>
+              <a:t>/</a:t>
+            </a:r>
+            <a:r>
+              <a:rPr lang="en-US" dirty="0" err="1"/>
+              <a:t>jUnit</a:t>
+            </a:r>
+            <a:endParaRPr lang="en-US" dirty="0"/>
+          </a:p>
+          <a:p>
+            <a:r>
+              <a:rPr lang="en-US" dirty="0">
+                <a:hlinkClick r:id="rId3"/>
+              </a:rPr>
+              <a:t>tSQLt.org</a:t>
+            </a:r>
+            <a:r>
+              <a:rPr lang="en-US" dirty="0"/>
+              <a:t> (requires CLR)</a:t>
+            </a:r>
+          </a:p>
+          <a:p>
+            <a:pPr lvl="1"/>
+            <a:r>
+              <a:rPr lang="en-US" dirty="0"/>
+              <a:t>Stored procedures in their own schema</a:t>
+            </a:r>
+          </a:p>
+          <a:p>
+            <a:pPr lvl="1"/>
+            <a:r>
+              <a:rPr lang="en-US" dirty="0"/>
+              <a:t>Can run setup before tests</a:t>
+            </a:r>
+          </a:p>
+          <a:p>
+            <a:pPr lvl="1"/>
+            <a:r>
+              <a:rPr lang="en-US" dirty="0"/>
+              <a:t>Can mock objects </a:t>
+            </a:r>
+          </a:p>
+          <a:p>
+            <a:pPr lvl="1"/>
+            <a:r>
+              <a:rPr lang="en-US" dirty="0"/>
+              <a:t>Can implement teardown</a:t>
+            </a:r>
+          </a:p>
+          <a:p>
+            <a:r>
+              <a:rPr lang="en-US" dirty="0">
+                <a:hlinkClick r:id="rId4"/>
+              </a:rPr>
+              <a:t>Support via Google Groups</a:t>
+            </a:r>
+            <a:endParaRPr lang="en-US" dirty="0"/>
+          </a:p>
+          <a:p>
+            <a:r>
+              <a:rPr lang="en-US" dirty="0">
+                <a:hlinkClick r:id="rId5"/>
+              </a:rPr>
+              <a:t>Articles at Simple Talk</a:t>
+            </a:r>
+            <a:endParaRPr lang="en-US" dirty="0"/>
+          </a:p>
+        </p:txBody>
+      </p:sp>
+    </p:spTree>
+    <p:extLst>
+      <p:ext uri="{BB962C8B-B14F-4D97-AF65-F5344CB8AC3E}">
+        <p14:creationId xmlns:p14="http://schemas.microsoft.com/office/powerpoint/2010/main" val="2399096538"/>
+      </p:ext>
+    </p:extLst>
+  </p:cSld>
+  <p:clrMapOvr>
+    <a:masterClrMapping/>
+  </p:clrMapOvr>
+</p:sld>
+</file>
+
+<file path=ppt/slides/slide17.xml><?xml version="1.0" encoding="utf-8"?>
+<p:sld xmlns:a="http://schemas.openxmlformats.org/drawingml/2006/main" xmlns:r="http://schemas.openxmlformats.org/officeDocument/2006/relationships" xmlns:p="http://schemas.openxmlformats.org/presentationml/2006/main">
+  <p:cSld>
+    <p:spTree>
+      <p:nvGrpSpPr>
+        <p:cNvPr id="1" name=""/>
+        <p:cNvGrpSpPr/>
+        <p:nvPr/>
+      </p:nvGrpSpPr>
+      <p:grpSpPr>
+        <a:xfrm>
+          <a:off x="0" y="0"/>
+          <a:ext cx="0" cy="0"/>
+          <a:chOff x="0" y="0"/>
+          <a:chExt cx="0" cy="0"/>
+        </a:xfrm>
+      </p:grpSpPr>
+      <p:sp>
+        <p:nvSpPr>
+          <p:cNvPr id="2" name="Title 1"/>
+          <p:cNvSpPr>
+            <a:spLocks noGrp="1"/>
+          </p:cNvSpPr>
+          <p:nvPr>
+            <p:ph type="title"/>
+          </p:nvPr>
+        </p:nvSpPr>
+        <p:spPr/>
+        <p:txBody>
+          <a:bodyPr/>
+          <a:lstStyle/>
+          <a:p>
+            <a:r>
               <a:rPr lang="en-US" dirty="0"/>
               <a:t>Microsoft Unit Testing Framework</a:t>
             </a:r>
@@ -5741,7 +5828,7 @@
 </p:sld>
 </file>
 
-<file path=ppt/slides/slide17.xml><?xml version="1.0" encoding="utf-8"?>
+<file path=ppt/slides/slide18.xml><?xml version="1.0" encoding="utf-8"?>
 <p:sld xmlns:a="http://schemas.openxmlformats.org/drawingml/2006/main" xmlns:r="http://schemas.openxmlformats.org/officeDocument/2006/relationships" xmlns:p="http://schemas.openxmlformats.org/presentationml/2006/main">
   <p:cSld>
     <p:spTree>
@@ -5800,103 +5887,6 @@
 </p:sld>
 </file>
 
-<file path=ppt/slides/slide18.xml><?xml version="1.0" encoding="utf-8"?>
-<p:sld xmlns:a="http://schemas.openxmlformats.org/drawingml/2006/main" xmlns:r="http://schemas.openxmlformats.org/officeDocument/2006/relationships" xmlns:p="http://schemas.openxmlformats.org/presentationml/2006/main">
-  <p:cSld>
-    <p:spTree>
-      <p:nvGrpSpPr>
-        <p:cNvPr id="1" name=""/>
-        <p:cNvGrpSpPr/>
-        <p:nvPr/>
-      </p:nvGrpSpPr>
-      <p:grpSpPr>
-        <a:xfrm>
-          <a:off x="0" y="0"/>
-          <a:ext cx="0" cy="0"/>
-          <a:chOff x="0" y="0"/>
-          <a:chExt cx="0" cy="0"/>
-        </a:xfrm>
-      </p:grpSpPr>
-      <p:sp>
-        <p:nvSpPr>
-          <p:cNvPr id="2" name="Title 1"/>
-          <p:cNvSpPr>
-            <a:spLocks noGrp="1"/>
-          </p:cNvSpPr>
-          <p:nvPr>
-            <p:ph type="title"/>
-          </p:nvPr>
-        </p:nvSpPr>
-        <p:spPr/>
-        <p:txBody>
-          <a:bodyPr/>
-          <a:lstStyle/>
-          <a:p>
-            <a:r>
-              <a:rPr lang="en-US" dirty="0"/>
-              <a:t>Standards Tests</a:t>
-            </a:r>
-          </a:p>
-        </p:txBody>
-      </p:sp>
-      <p:sp>
-        <p:nvSpPr>
-          <p:cNvPr id="3" name="Content Placeholder 2"/>
-          <p:cNvSpPr>
-            <a:spLocks noGrp="1"/>
-          </p:cNvSpPr>
-          <p:nvPr>
-            <p:ph idx="1"/>
-          </p:nvPr>
-        </p:nvSpPr>
-        <p:spPr/>
-        <p:txBody>
-          <a:bodyPr/>
-          <a:lstStyle/>
-          <a:p>
-            <a:r>
-              <a:rPr lang="en-US" dirty="0"/>
-              <a:t>Ensure that the standards you care about are followed.</a:t>
-            </a:r>
-          </a:p>
-          <a:p>
-            <a:r>
-              <a:rPr lang="en-US" dirty="0" err="1"/>
-              <a:t>SQLCop</a:t>
-            </a:r>
-            <a:r>
-              <a:rPr lang="en-US" dirty="0"/>
-              <a:t> – </a:t>
-            </a:r>
-            <a:r>
-              <a:rPr lang="en-US" dirty="0">
-                <a:hlinkClick r:id="rId3"/>
-              </a:rPr>
-              <a:t>sqlcop.lessthandot.com</a:t>
-            </a:r>
-            <a:endParaRPr lang="en-US" dirty="0"/>
-          </a:p>
-          <a:p>
-            <a:r>
-              <a:rPr lang="en-US" dirty="0"/>
-              <a:t>Easy to write your own.</a:t>
-            </a:r>
-          </a:p>
-        </p:txBody>
-      </p:sp>
-    </p:spTree>
-    <p:extLst>
-      <p:ext uri="{BB962C8B-B14F-4D97-AF65-F5344CB8AC3E}">
-        <p14:creationId xmlns:p14="http://schemas.microsoft.com/office/powerpoint/2010/main" val="1619672544"/>
-      </p:ext>
-    </p:extLst>
-  </p:cSld>
-  <p:clrMapOvr>
-    <a:masterClrMapping/>
-  </p:clrMapOvr>
-</p:sld>
-</file>
-
 <file path=ppt/slides/slide19.xml><?xml version="1.0" encoding="utf-8"?>
 <p:sld xmlns:a="http://schemas.openxmlformats.org/drawingml/2006/main" xmlns:r="http://schemas.openxmlformats.org/officeDocument/2006/relationships" xmlns:p="http://schemas.openxmlformats.org/presentationml/2006/main">
   <p:cSld>
@@ -5916,7 +5906,7 @@
       </p:grpSpPr>
       <p:sp>
         <p:nvSpPr>
-          <p:cNvPr id="4" name="Title 3"/>
+          <p:cNvPr id="2" name="Title 1"/>
           <p:cNvSpPr>
             <a:spLocks noGrp="1"/>
           </p:cNvSpPr>
@@ -5931,19 +5921,19 @@
           <a:p>
             <a:r>
               <a:rPr lang="en-US" dirty="0"/>
-              <a:t>Catching bad CODE</a:t>
-            </a:r>
-          </a:p>
-        </p:txBody>
-      </p:sp>
-      <p:sp>
-        <p:nvSpPr>
-          <p:cNvPr id="5" name="Text Placeholder 4"/>
-          <p:cNvSpPr>
-            <a:spLocks noGrp="1"/>
-          </p:cNvSpPr>
-          <p:nvPr>
-            <p:ph type="body" idx="1"/>
+              <a:t>Standards Tests</a:t>
+            </a:r>
+          </a:p>
+        </p:txBody>
+      </p:sp>
+      <p:sp>
+        <p:nvSpPr>
+          <p:cNvPr id="3" name="Content Placeholder 2"/>
+          <p:cNvSpPr>
+            <a:spLocks noGrp="1"/>
+          </p:cNvSpPr>
+          <p:nvPr>
+            <p:ph idx="1"/>
           </p:nvPr>
         </p:nvSpPr>
         <p:spPr/>
@@ -5953,7 +5943,30 @@
           <a:p>
             <a:r>
               <a:rPr lang="en-US" dirty="0"/>
-              <a:t>Demo</a:t>
+              <a:t>Ensure that the standards you care about are followed.</a:t>
+            </a:r>
+          </a:p>
+          <a:p>
+            <a:r>
+              <a:rPr lang="en-US" dirty="0" err="1"/>
+              <a:t>SQLCop</a:t>
+            </a:r>
+            <a:r>
+              <a:rPr lang="en-US" dirty="0"/>
+              <a:t> – </a:t>
+            </a:r>
+            <a:r>
+              <a:rPr lang="en-US" dirty="0">
+                <a:hlinkClick r:id="rId3"/>
+              </a:rPr>
+              <a:t>sqlcop.lessthandot.com</a:t>
+            </a:r>
+            <a:endParaRPr lang="en-US" dirty="0"/>
+          </a:p>
+          <a:p>
+            <a:r>
+              <a:rPr lang="en-US" dirty="0"/>
+              <a:t>Easy to write your own.</a:t>
             </a:r>
           </a:p>
         </p:txBody>
@@ -5961,7 +5974,7 @@
     </p:spTree>
     <p:extLst>
       <p:ext uri="{BB962C8B-B14F-4D97-AF65-F5344CB8AC3E}">
-        <p14:creationId xmlns:p14="http://schemas.microsoft.com/office/powerpoint/2010/main" val="420280027"/>
+        <p14:creationId xmlns:p14="http://schemas.microsoft.com/office/powerpoint/2010/main" val="1619672544"/>
       </p:ext>
     </p:extLst>
   </p:cSld>
@@ -5990,12 +6003,12 @@
       </p:grpSpPr>
       <p:sp>
         <p:nvSpPr>
-          <p:cNvPr id="2" name="Title 1"/>
-          <p:cNvSpPr>
-            <a:spLocks noGrp="1"/>
-          </p:cNvSpPr>
-          <p:nvPr>
-            <p:ph type="title"/>
+          <p:cNvPr id="4" name="Title 3"/>
+          <p:cNvSpPr>
+            <a:spLocks noGrp="1"/>
+          </p:cNvSpPr>
+          <p:nvPr>
+            <p:ph type="ctrTitle"/>
           </p:nvPr>
         </p:nvSpPr>
         <p:spPr/>
@@ -6005,60 +6018,34 @@
           <a:p>
             <a:r>
               <a:rPr lang="en-US" dirty="0"/>
-              <a:t>Agenda</a:t>
-            </a:r>
-          </a:p>
-        </p:txBody>
-      </p:sp>
-      <p:sp>
-        <p:nvSpPr>
-          <p:cNvPr id="3" name="Content Placeholder 2"/>
-          <p:cNvSpPr>
-            <a:spLocks noGrp="1"/>
-          </p:cNvSpPr>
-          <p:nvPr>
-            <p:ph idx="1"/>
-          </p:nvPr>
-        </p:nvSpPr>
-        <p:spPr/>
-        <p:txBody>
-          <a:bodyPr/>
-          <a:lstStyle/>
-          <a:p>
-            <a:r>
-              <a:rPr lang="en-US" dirty="0"/>
-              <a:t>Who Am I?</a:t>
-            </a:r>
-          </a:p>
-          <a:p>
-            <a:r>
-              <a:rPr lang="en-US" dirty="0"/>
-              <a:t>Testing Software</a:t>
-            </a:r>
-          </a:p>
-          <a:p>
-            <a:r>
-              <a:rPr lang="en-US" dirty="0"/>
-              <a:t>Database </a:t>
-            </a:r>
-            <a:r>
-              <a:rPr lang="en-US"/>
-              <a:t>Testing Frameworks</a:t>
-            </a:r>
-            <a:endParaRPr lang="en-US" dirty="0"/>
-          </a:p>
-          <a:p>
-            <a:r>
-              <a:rPr lang="en-US" dirty="0"/>
-              <a:t>Test Examples</a:t>
-            </a:r>
+              <a:t>Data Platform Summit 2017</a:t>
+            </a:r>
+          </a:p>
+        </p:txBody>
+      </p:sp>
+      <p:sp>
+        <p:nvSpPr>
+          <p:cNvPr id="5" name="Subtitle 4"/>
+          <p:cNvSpPr>
+            <a:spLocks noGrp="1"/>
+          </p:cNvSpPr>
+          <p:nvPr>
+            <p:ph type="subTitle" idx="1"/>
+          </p:nvPr>
+        </p:nvSpPr>
+        <p:spPr/>
+        <p:txBody>
+          <a:bodyPr/>
+          <a:lstStyle/>
+          <a:p>
+            <a:endParaRPr lang="en-US"/>
           </a:p>
         </p:txBody>
       </p:sp>
     </p:spTree>
     <p:extLst>
       <p:ext uri="{BB962C8B-B14F-4D97-AF65-F5344CB8AC3E}">
-        <p14:creationId xmlns:p14="http://schemas.microsoft.com/office/powerpoint/2010/main" val="718457474"/>
+        <p14:creationId xmlns:p14="http://schemas.microsoft.com/office/powerpoint/2010/main" val="577387459"/>
       </p:ext>
     </p:extLst>
   </p:cSld>
@@ -6087,7 +6074,7 @@
       </p:grpSpPr>
       <p:sp>
         <p:nvSpPr>
-          <p:cNvPr id="2" name="Title 1"/>
+          <p:cNvPr id="4" name="Title 3"/>
           <p:cNvSpPr>
             <a:spLocks noGrp="1"/>
           </p:cNvSpPr>
@@ -6102,19 +6089,19 @@
           <a:p>
             <a:r>
               <a:rPr lang="en-US" dirty="0"/>
-              <a:t>Logic Tests</a:t>
-            </a:r>
-          </a:p>
-        </p:txBody>
-      </p:sp>
-      <p:sp>
-        <p:nvSpPr>
-          <p:cNvPr id="3" name="Content Placeholder 2"/>
-          <p:cNvSpPr>
-            <a:spLocks noGrp="1"/>
-          </p:cNvSpPr>
-          <p:nvPr>
-            <p:ph idx="1"/>
+              <a:t>Catching bad CODE</a:t>
+            </a:r>
+          </a:p>
+        </p:txBody>
+      </p:sp>
+      <p:sp>
+        <p:nvSpPr>
+          <p:cNvPr id="5" name="Text Placeholder 4"/>
+          <p:cNvSpPr>
+            <a:spLocks noGrp="1"/>
+          </p:cNvSpPr>
+          <p:nvPr>
+            <p:ph type="body" idx="1"/>
           </p:nvPr>
         </p:nvSpPr>
         <p:spPr/>
@@ -6124,13 +6111,7 @@
           <a:p>
             <a:r>
               <a:rPr lang="en-US" dirty="0"/>
-              <a:t>These are unit tests designed to find issues with a particular specific function.</a:t>
-            </a:r>
-          </a:p>
-          <a:p>
-            <a:r>
-              <a:rPr lang="en-US" dirty="0"/>
-              <a:t>This are especially useful when refactoring code as requirements may not be clear</a:t>
+              <a:t>Demo</a:t>
             </a:r>
           </a:p>
         </p:txBody>
@@ -6138,7 +6119,7 @@
     </p:spTree>
     <p:extLst>
       <p:ext uri="{BB962C8B-B14F-4D97-AF65-F5344CB8AC3E}">
-        <p14:creationId xmlns:p14="http://schemas.microsoft.com/office/powerpoint/2010/main" val="2549004961"/>
+        <p14:creationId xmlns:p14="http://schemas.microsoft.com/office/powerpoint/2010/main" val="420280027"/>
       </p:ext>
     </p:extLst>
   </p:cSld>
@@ -6167,7 +6148,7 @@
       </p:grpSpPr>
       <p:sp>
         <p:nvSpPr>
-          <p:cNvPr id="4" name="Title 3"/>
+          <p:cNvPr id="2" name="Title 1"/>
           <p:cNvSpPr>
             <a:spLocks noGrp="1"/>
           </p:cNvSpPr>
@@ -6182,19 +6163,19 @@
           <a:p>
             <a:r>
               <a:rPr lang="en-US" dirty="0"/>
-              <a:t>Testing Code Logic</a:t>
-            </a:r>
-          </a:p>
-        </p:txBody>
-      </p:sp>
-      <p:sp>
-        <p:nvSpPr>
-          <p:cNvPr id="5" name="Text Placeholder 4"/>
-          <p:cNvSpPr>
-            <a:spLocks noGrp="1"/>
-          </p:cNvSpPr>
-          <p:nvPr>
-            <p:ph type="body" idx="1"/>
+              <a:t>Logic Tests</a:t>
+            </a:r>
+          </a:p>
+        </p:txBody>
+      </p:sp>
+      <p:sp>
+        <p:nvSpPr>
+          <p:cNvPr id="3" name="Content Placeholder 2"/>
+          <p:cNvSpPr>
+            <a:spLocks noGrp="1"/>
+          </p:cNvSpPr>
+          <p:nvPr>
+            <p:ph idx="1"/>
           </p:nvPr>
         </p:nvSpPr>
         <p:spPr/>
@@ -6204,7 +6185,13 @@
           <a:p>
             <a:r>
               <a:rPr lang="en-US" dirty="0"/>
-              <a:t>Demo</a:t>
+              <a:t>These are unit tests designed to find issues with a particular specific function.</a:t>
+            </a:r>
+          </a:p>
+          <a:p>
+            <a:r>
+              <a:rPr lang="en-US" dirty="0"/>
+              <a:t>This are especially useful when refactoring code as requirements may not be clear</a:t>
             </a:r>
           </a:p>
         </p:txBody>
@@ -6212,7 +6199,7 @@
     </p:spTree>
     <p:extLst>
       <p:ext uri="{BB962C8B-B14F-4D97-AF65-F5344CB8AC3E}">
-        <p14:creationId xmlns:p14="http://schemas.microsoft.com/office/powerpoint/2010/main" val="3075909317"/>
+        <p14:creationId xmlns:p14="http://schemas.microsoft.com/office/powerpoint/2010/main" val="2549004961"/>
       </p:ext>
     </p:extLst>
   </p:cSld>
@@ -6241,7 +6228,7 @@
       </p:grpSpPr>
       <p:sp>
         <p:nvSpPr>
-          <p:cNvPr id="2" name="Title 1"/>
+          <p:cNvPr id="4" name="Title 3"/>
           <p:cNvSpPr>
             <a:spLocks noGrp="1"/>
           </p:cNvSpPr>
@@ -6256,19 +6243,19 @@
           <a:p>
             <a:r>
               <a:rPr lang="en-US" dirty="0"/>
-              <a:t>Having a Test Suite</a:t>
-            </a:r>
-          </a:p>
-        </p:txBody>
-      </p:sp>
-      <p:sp>
-        <p:nvSpPr>
-          <p:cNvPr id="3" name="Content Placeholder 2"/>
-          <p:cNvSpPr>
-            <a:spLocks noGrp="1"/>
-          </p:cNvSpPr>
-          <p:nvPr>
-            <p:ph idx="1"/>
+              <a:t>Testing Code Logic</a:t>
+            </a:r>
+          </a:p>
+        </p:txBody>
+      </p:sp>
+      <p:sp>
+        <p:nvSpPr>
+          <p:cNvPr id="5" name="Text Placeholder 4"/>
+          <p:cNvSpPr>
+            <a:spLocks noGrp="1"/>
+          </p:cNvSpPr>
+          <p:nvPr>
+            <p:ph type="body" idx="1"/>
           </p:nvPr>
         </p:nvSpPr>
         <p:spPr/>
@@ -6278,19 +6265,7 @@
           <a:p>
             <a:r>
               <a:rPr lang="en-US" dirty="0"/>
-              <a:t>By continuing to grow your test suite with each change, developers spread the load</a:t>
-            </a:r>
-          </a:p>
-          <a:p>
-            <a:r>
-              <a:rPr lang="en-US" dirty="0"/>
-              <a:t>By having a large suite, we have better code coverage.</a:t>
-            </a:r>
-          </a:p>
-          <a:p>
-            <a:r>
-              <a:rPr lang="en-US" dirty="0"/>
-              <a:t>We can easily regression test.</a:t>
+              <a:t>Demo</a:t>
             </a:r>
           </a:p>
         </p:txBody>
@@ -6298,7 +6273,7 @@
     </p:spTree>
     <p:extLst>
       <p:ext uri="{BB962C8B-B14F-4D97-AF65-F5344CB8AC3E}">
-        <p14:creationId xmlns:p14="http://schemas.microsoft.com/office/powerpoint/2010/main" val="2479422556"/>
+        <p14:creationId xmlns:p14="http://schemas.microsoft.com/office/powerpoint/2010/main" val="3075909317"/>
       </p:ext>
     </p:extLst>
   </p:cSld>
@@ -6342,6 +6317,92 @@
           <a:p>
             <a:r>
               <a:rPr lang="en-US" dirty="0"/>
+              <a:t>Having a Test Suite</a:t>
+            </a:r>
+          </a:p>
+        </p:txBody>
+      </p:sp>
+      <p:sp>
+        <p:nvSpPr>
+          <p:cNvPr id="3" name="Content Placeholder 2"/>
+          <p:cNvSpPr>
+            <a:spLocks noGrp="1"/>
+          </p:cNvSpPr>
+          <p:nvPr>
+            <p:ph idx="1"/>
+          </p:nvPr>
+        </p:nvSpPr>
+        <p:spPr/>
+        <p:txBody>
+          <a:bodyPr/>
+          <a:lstStyle/>
+          <a:p>
+            <a:r>
+              <a:rPr lang="en-US" dirty="0"/>
+              <a:t>By continuing to grow your test suite with each change, developers spread the load</a:t>
+            </a:r>
+          </a:p>
+          <a:p>
+            <a:r>
+              <a:rPr lang="en-US" dirty="0"/>
+              <a:t>By having a large suite, we have better code coverage.</a:t>
+            </a:r>
+          </a:p>
+          <a:p>
+            <a:r>
+              <a:rPr lang="en-US" dirty="0"/>
+              <a:t>We can easily regression test.</a:t>
+            </a:r>
+          </a:p>
+        </p:txBody>
+      </p:sp>
+    </p:spTree>
+    <p:extLst>
+      <p:ext uri="{BB962C8B-B14F-4D97-AF65-F5344CB8AC3E}">
+        <p14:creationId xmlns:p14="http://schemas.microsoft.com/office/powerpoint/2010/main" val="2479422556"/>
+      </p:ext>
+    </p:extLst>
+  </p:cSld>
+  <p:clrMapOvr>
+    <a:masterClrMapping/>
+  </p:clrMapOvr>
+</p:sld>
+</file>
+
+<file path=ppt/slides/slide24.xml><?xml version="1.0" encoding="utf-8"?>
+<p:sld xmlns:a="http://schemas.openxmlformats.org/drawingml/2006/main" xmlns:r="http://schemas.openxmlformats.org/officeDocument/2006/relationships" xmlns:p="http://schemas.openxmlformats.org/presentationml/2006/main">
+  <p:cSld>
+    <p:spTree>
+      <p:nvGrpSpPr>
+        <p:cNvPr id="1" name=""/>
+        <p:cNvGrpSpPr/>
+        <p:nvPr/>
+      </p:nvGrpSpPr>
+      <p:grpSpPr>
+        <a:xfrm>
+          <a:off x="0" y="0"/>
+          <a:ext cx="0" cy="0"/>
+          <a:chOff x="0" y="0"/>
+          <a:chExt cx="0" cy="0"/>
+        </a:xfrm>
+      </p:grpSpPr>
+      <p:sp>
+        <p:nvSpPr>
+          <p:cNvPr id="2" name="Title 1"/>
+          <p:cNvSpPr>
+            <a:spLocks noGrp="1"/>
+          </p:cNvSpPr>
+          <p:nvPr>
+            <p:ph type="title"/>
+          </p:nvPr>
+        </p:nvSpPr>
+        <p:spPr/>
+        <p:txBody>
+          <a:bodyPr/>
+          <a:lstStyle/>
+          <a:p>
+            <a:r>
+              <a:rPr lang="en-US" dirty="0"/>
               <a:t>Summary</a:t>
             </a:r>
           </a:p>
@@ -6408,7 +6469,7 @@
 </p:sld>
 </file>
 
-<file path=ppt/slides/slide24.xml><?xml version="1.0" encoding="utf-8"?>
+<file path=ppt/slides/slide25.xml><?xml version="1.0" encoding="utf-8"?>
 <p:sld xmlns:a="http://schemas.openxmlformats.org/drawingml/2006/main" xmlns:r="http://schemas.openxmlformats.org/officeDocument/2006/relationships" xmlns:p="http://schemas.openxmlformats.org/presentationml/2006/main">
   <p:cSld>
     <p:spTree>
@@ -7001,104 +7062,6 @@
 </p:sld>
 </file>
 
-<file path=ppt/slides/slide25.xml><?xml version="1.0" encoding="utf-8"?>
-<p:sld xmlns:a="http://schemas.openxmlformats.org/drawingml/2006/main" xmlns:r="http://schemas.openxmlformats.org/officeDocument/2006/relationships" xmlns:p="http://schemas.openxmlformats.org/presentationml/2006/main">
-  <p:cSld>
-    <p:spTree>
-      <p:nvGrpSpPr>
-        <p:cNvPr id="1" name=""/>
-        <p:cNvGrpSpPr/>
-        <p:nvPr/>
-      </p:nvGrpSpPr>
-      <p:grpSpPr>
-        <a:xfrm>
-          <a:off x="0" y="0"/>
-          <a:ext cx="0" cy="0"/>
-          <a:chOff x="0" y="0"/>
-          <a:chExt cx="0" cy="0"/>
-        </a:xfrm>
-      </p:grpSpPr>
-      <p:sp>
-        <p:nvSpPr>
-          <p:cNvPr id="2" name="Title 1"/>
-          <p:cNvSpPr>
-            <a:spLocks noGrp="1"/>
-          </p:cNvSpPr>
-          <p:nvPr>
-            <p:ph type="title"/>
-          </p:nvPr>
-        </p:nvSpPr>
-        <p:spPr/>
-        <p:txBody>
-          <a:bodyPr/>
-          <a:lstStyle/>
-          <a:p>
-            <a:r>
-              <a:rPr lang="en-US" dirty="0"/>
-              <a:t>References</a:t>
-            </a:r>
-          </a:p>
-        </p:txBody>
-      </p:sp>
-      <p:sp>
-        <p:nvSpPr>
-          <p:cNvPr id="3" name="Content Placeholder 2"/>
-          <p:cNvSpPr>
-            <a:spLocks noGrp="1"/>
-          </p:cNvSpPr>
-          <p:nvPr>
-            <p:ph idx="1"/>
-          </p:nvPr>
-        </p:nvSpPr>
-        <p:spPr/>
-        <p:txBody>
-          <a:bodyPr/>
-          <a:lstStyle/>
-          <a:p>
-            <a:r>
-              <a:rPr lang="en-US" dirty="0"/>
-              <a:t>Continuous Integration – http://en.wikipedia.org/wiki/Continuous_integration</a:t>
-            </a:r>
-          </a:p>
-          <a:p>
-            <a:r>
-              <a:rPr lang="en-US" dirty="0"/>
-              <a:t>Getting Started Testing Databases with </a:t>
-            </a:r>
-            <a:r>
-              <a:rPr lang="en-US" dirty="0" err="1"/>
-              <a:t>tSQLt</a:t>
-            </a:r>
-            <a:r>
-              <a:rPr lang="en-US" dirty="0"/>
-              <a:t> - </a:t>
-            </a:r>
-            <a:r>
-              <a:rPr lang="en-US" dirty="0">
-                <a:hlinkClick r:id="rId2"/>
-              </a:rPr>
-              <a:t>https://www.simple-talk.com/sql/t-sql-programming/getting-started-testing-databases-with-tsqlt/</a:t>
-            </a:r>
-            <a:endParaRPr lang="en-US" dirty="0"/>
-          </a:p>
-          <a:p>
-            <a:endParaRPr lang="en-US" dirty="0"/>
-          </a:p>
-        </p:txBody>
-      </p:sp>
-    </p:spTree>
-    <p:extLst>
-      <p:ext uri="{BB962C8B-B14F-4D97-AF65-F5344CB8AC3E}">
-        <p14:creationId xmlns:p14="http://schemas.microsoft.com/office/powerpoint/2010/main" val="2962012683"/>
-      </p:ext>
-    </p:extLst>
-  </p:cSld>
-  <p:clrMapOvr>
-    <a:masterClrMapping/>
-  </p:clrMapOvr>
-</p:sld>
-</file>
-
 <file path=ppt/slides/slide26.xml><?xml version="1.0" encoding="utf-8"?>
 <p:sld xmlns:a="http://schemas.openxmlformats.org/drawingml/2006/main" xmlns:r="http://schemas.openxmlformats.org/officeDocument/2006/relationships" xmlns:p="http://schemas.openxmlformats.org/presentationml/2006/main">
   <p:cSld>
@@ -7133,6 +7096,104 @@
           <a:p>
             <a:r>
               <a:rPr lang="en-US" dirty="0"/>
+              <a:t>References</a:t>
+            </a:r>
+          </a:p>
+        </p:txBody>
+      </p:sp>
+      <p:sp>
+        <p:nvSpPr>
+          <p:cNvPr id="3" name="Content Placeholder 2"/>
+          <p:cNvSpPr>
+            <a:spLocks noGrp="1"/>
+          </p:cNvSpPr>
+          <p:nvPr>
+            <p:ph idx="1"/>
+          </p:nvPr>
+        </p:nvSpPr>
+        <p:spPr/>
+        <p:txBody>
+          <a:bodyPr/>
+          <a:lstStyle/>
+          <a:p>
+            <a:r>
+              <a:rPr lang="en-US" dirty="0"/>
+              <a:t>Continuous Integration – http://en.wikipedia.org/wiki/Continuous_integration</a:t>
+            </a:r>
+          </a:p>
+          <a:p>
+            <a:r>
+              <a:rPr lang="en-US" dirty="0"/>
+              <a:t>Getting Started Testing Databases with </a:t>
+            </a:r>
+            <a:r>
+              <a:rPr lang="en-US" dirty="0" err="1"/>
+              <a:t>tSQLt</a:t>
+            </a:r>
+            <a:r>
+              <a:rPr lang="en-US" dirty="0"/>
+              <a:t> - </a:t>
+            </a:r>
+            <a:r>
+              <a:rPr lang="en-US" dirty="0">
+                <a:hlinkClick r:id="rId2"/>
+              </a:rPr>
+              <a:t>https://www.simple-talk.com/sql/t-sql-programming/getting-started-testing-databases-with-tsqlt/</a:t>
+            </a:r>
+            <a:endParaRPr lang="en-US" dirty="0"/>
+          </a:p>
+          <a:p>
+            <a:endParaRPr lang="en-US" dirty="0"/>
+          </a:p>
+        </p:txBody>
+      </p:sp>
+    </p:spTree>
+    <p:extLst>
+      <p:ext uri="{BB962C8B-B14F-4D97-AF65-F5344CB8AC3E}">
+        <p14:creationId xmlns:p14="http://schemas.microsoft.com/office/powerpoint/2010/main" val="2962012683"/>
+      </p:ext>
+    </p:extLst>
+  </p:cSld>
+  <p:clrMapOvr>
+    <a:masterClrMapping/>
+  </p:clrMapOvr>
+</p:sld>
+</file>
+
+<file path=ppt/slides/slide27.xml><?xml version="1.0" encoding="utf-8"?>
+<p:sld xmlns:a="http://schemas.openxmlformats.org/drawingml/2006/main" xmlns:r="http://schemas.openxmlformats.org/officeDocument/2006/relationships" xmlns:p="http://schemas.openxmlformats.org/presentationml/2006/main">
+  <p:cSld>
+    <p:spTree>
+      <p:nvGrpSpPr>
+        <p:cNvPr id="1" name=""/>
+        <p:cNvGrpSpPr/>
+        <p:nvPr/>
+      </p:nvGrpSpPr>
+      <p:grpSpPr>
+        <a:xfrm>
+          <a:off x="0" y="0"/>
+          <a:ext cx="0" cy="0"/>
+          <a:chOff x="0" y="0"/>
+          <a:chExt cx="0" cy="0"/>
+        </a:xfrm>
+      </p:grpSpPr>
+      <p:sp>
+        <p:nvSpPr>
+          <p:cNvPr id="2" name="Title 1"/>
+          <p:cNvSpPr>
+            <a:spLocks noGrp="1"/>
+          </p:cNvSpPr>
+          <p:nvPr>
+            <p:ph type="title"/>
+          </p:nvPr>
+        </p:nvSpPr>
+        <p:spPr/>
+        <p:txBody>
+          <a:bodyPr/>
+          <a:lstStyle/>
+          <a:p>
+            <a:r>
+              <a:rPr lang="en-US" dirty="0"/>
               <a:t>Images</a:t>
             </a:r>
           </a:p>
@@ -7197,6 +7258,103 @@
 </file>
 
 <file path=ppt/slides/slide3.xml><?xml version="1.0" encoding="utf-8"?>
+<p:sld xmlns:a="http://schemas.openxmlformats.org/drawingml/2006/main" xmlns:r="http://schemas.openxmlformats.org/officeDocument/2006/relationships" xmlns:p="http://schemas.openxmlformats.org/presentationml/2006/main">
+  <p:cSld>
+    <p:spTree>
+      <p:nvGrpSpPr>
+        <p:cNvPr id="1" name=""/>
+        <p:cNvGrpSpPr/>
+        <p:nvPr/>
+      </p:nvGrpSpPr>
+      <p:grpSpPr>
+        <a:xfrm>
+          <a:off x="0" y="0"/>
+          <a:ext cx="0" cy="0"/>
+          <a:chOff x="0" y="0"/>
+          <a:chExt cx="0" cy="0"/>
+        </a:xfrm>
+      </p:grpSpPr>
+      <p:sp>
+        <p:nvSpPr>
+          <p:cNvPr id="2" name="Title 1"/>
+          <p:cNvSpPr>
+            <a:spLocks noGrp="1"/>
+          </p:cNvSpPr>
+          <p:nvPr>
+            <p:ph type="title"/>
+          </p:nvPr>
+        </p:nvSpPr>
+        <p:spPr/>
+        <p:txBody>
+          <a:bodyPr/>
+          <a:lstStyle/>
+          <a:p>
+            <a:r>
+              <a:rPr lang="en-US" dirty="0"/>
+              <a:t>Agenda</a:t>
+            </a:r>
+          </a:p>
+        </p:txBody>
+      </p:sp>
+      <p:sp>
+        <p:nvSpPr>
+          <p:cNvPr id="3" name="Content Placeholder 2"/>
+          <p:cNvSpPr>
+            <a:spLocks noGrp="1"/>
+          </p:cNvSpPr>
+          <p:nvPr>
+            <p:ph idx="1"/>
+          </p:nvPr>
+        </p:nvSpPr>
+        <p:spPr/>
+        <p:txBody>
+          <a:bodyPr/>
+          <a:lstStyle/>
+          <a:p>
+            <a:r>
+              <a:rPr lang="en-US" dirty="0"/>
+              <a:t>Who Am I?</a:t>
+            </a:r>
+          </a:p>
+          <a:p>
+            <a:r>
+              <a:rPr lang="en-US" dirty="0"/>
+              <a:t>Testing Software</a:t>
+            </a:r>
+          </a:p>
+          <a:p>
+            <a:r>
+              <a:rPr lang="en-US" dirty="0"/>
+              <a:t>Database </a:t>
+            </a:r>
+            <a:r>
+              <a:rPr lang="en-US"/>
+              <a:t>Testing Frameworks</a:t>
+            </a:r>
+            <a:endParaRPr lang="en-US" dirty="0"/>
+          </a:p>
+          <a:p>
+            <a:r>
+              <a:rPr lang="en-US" dirty="0"/>
+              <a:t>Test Examples</a:t>
+            </a:r>
+          </a:p>
+        </p:txBody>
+      </p:sp>
+    </p:spTree>
+    <p:extLst>
+      <p:ext uri="{BB962C8B-B14F-4D97-AF65-F5344CB8AC3E}">
+        <p14:creationId xmlns:p14="http://schemas.microsoft.com/office/powerpoint/2010/main" val="718457474"/>
+      </p:ext>
+    </p:extLst>
+  </p:cSld>
+  <p:clrMapOvr>
+    <a:masterClrMapping/>
+  </p:clrMapOvr>
+</p:sld>
+</file>
+
+<file path=ppt/slides/slide4.xml><?xml version="1.0" encoding="utf-8"?>
 <p:sld xmlns:a="http://schemas.openxmlformats.org/drawingml/2006/main" xmlns:r="http://schemas.openxmlformats.org/officeDocument/2006/relationships" xmlns:p="http://schemas.openxmlformats.org/presentationml/2006/main">
   <p:cSld>
     <p:spTree>
@@ -7699,7 +7857,7 @@
 </p:sld>
 </file>
 
-<file path=ppt/slides/slide4.xml><?xml version="1.0" encoding="utf-8"?>
+<file path=ppt/slides/slide5.xml><?xml version="1.0" encoding="utf-8"?>
 <p:sld xmlns:a="http://schemas.openxmlformats.org/drawingml/2006/main" xmlns:r="http://schemas.openxmlformats.org/officeDocument/2006/relationships" xmlns:p="http://schemas.openxmlformats.org/presentationml/2006/main">
   <p:cSld>
     <p:spTree>
@@ -8336,103 +8494,6 @@
 </p:sld>
 </file>
 
-<file path=ppt/slides/slide5.xml><?xml version="1.0" encoding="utf-8"?>
-<p:sld xmlns:a="http://schemas.openxmlformats.org/drawingml/2006/main" xmlns:r="http://schemas.openxmlformats.org/officeDocument/2006/relationships" xmlns:p="http://schemas.openxmlformats.org/presentationml/2006/main">
-  <p:cSld>
-    <p:spTree>
-      <p:nvGrpSpPr>
-        <p:cNvPr id="1" name=""/>
-        <p:cNvGrpSpPr/>
-        <p:nvPr/>
-      </p:nvGrpSpPr>
-      <p:grpSpPr>
-        <a:xfrm>
-          <a:off x="0" y="0"/>
-          <a:ext cx="0" cy="0"/>
-          <a:chOff x="0" y="0"/>
-          <a:chExt cx="0" cy="0"/>
-        </a:xfrm>
-      </p:grpSpPr>
-      <p:sp>
-        <p:nvSpPr>
-          <p:cNvPr id="2" name="Title 1"/>
-          <p:cNvSpPr>
-            <a:spLocks noGrp="1"/>
-          </p:cNvSpPr>
-          <p:nvPr>
-            <p:ph type="title"/>
-          </p:nvPr>
-        </p:nvSpPr>
-        <p:spPr/>
-        <p:txBody>
-          <a:bodyPr/>
-          <a:lstStyle/>
-          <a:p>
-            <a:r>
-              <a:rPr lang="en-US" dirty="0"/>
-              <a:t>Unit Testing</a:t>
-            </a:r>
-          </a:p>
-        </p:txBody>
-      </p:sp>
-      <p:sp>
-        <p:nvSpPr>
-          <p:cNvPr id="5" name="TextBox 4"/>
-          <p:cNvSpPr txBox="1"/>
-          <p:nvPr/>
-        </p:nvSpPr>
-        <p:spPr>
-          <a:xfrm>
-            <a:off x="405244" y="1987811"/>
-            <a:ext cx="7886700" cy="3877985"/>
-          </a:xfrm>
-          <a:prstGeom prst="rect">
-            <a:avLst/>
-          </a:prstGeom>
-          <a:noFill/>
-        </p:spPr>
-        <p:txBody>
-          <a:bodyPr wrap="square" rtlCol="0">
-            <a:spAutoFit/>
-          </a:bodyPr>
-          <a:lstStyle/>
-          <a:p>
-            <a:r>
-              <a:rPr lang="en-US" sz="3600" dirty="0"/>
-              <a:t>“The primary goal of unit testing is to take the smallest piece of testable software in the application, isolate it from the remainder of the code, and determine whether it behaves exactly as you expect.“</a:t>
-            </a:r>
-          </a:p>
-          <a:p>
-            <a:endParaRPr lang="en-US" dirty="0"/>
-          </a:p>
-          <a:p>
-            <a:r>
-              <a:rPr lang="en-US" sz="1200" dirty="0"/>
-              <a:t>From </a:t>
-            </a:r>
-            <a:r>
-              <a:rPr lang="en-US" sz="1200" dirty="0">
-                <a:hlinkClick r:id="rId3"/>
-              </a:rPr>
-              <a:t>https://msdn.microsoft.com/en-us/library/aa292197%28v=vs.71%29.aspx</a:t>
-            </a:r>
-            <a:endParaRPr lang="en-US" sz="1200" dirty="0"/>
-          </a:p>
-        </p:txBody>
-      </p:sp>
-    </p:spTree>
-    <p:extLst>
-      <p:ext uri="{BB962C8B-B14F-4D97-AF65-F5344CB8AC3E}">
-        <p14:creationId xmlns:p14="http://schemas.microsoft.com/office/powerpoint/2010/main" val="2912118878"/>
-      </p:ext>
-    </p:extLst>
-  </p:cSld>
-  <p:clrMapOvr>
-    <a:masterClrMapping/>
-  </p:clrMapOvr>
-</p:sld>
-</file>
-
 <file path=ppt/slides/slide6.xml><?xml version="1.0" encoding="utf-8"?>
 <p:sld xmlns:a="http://schemas.openxmlformats.org/drawingml/2006/main" xmlns:r="http://schemas.openxmlformats.org/officeDocument/2006/relationships" xmlns:p="http://schemas.openxmlformats.org/presentationml/2006/main">
   <p:cSld>
@@ -8474,6 +8535,103 @@
       </p:sp>
       <p:sp>
         <p:nvSpPr>
+          <p:cNvPr id="5" name="TextBox 4"/>
+          <p:cNvSpPr txBox="1"/>
+          <p:nvPr/>
+        </p:nvSpPr>
+        <p:spPr>
+          <a:xfrm>
+            <a:off x="405244" y="1987811"/>
+            <a:ext cx="7886700" cy="3877985"/>
+          </a:xfrm>
+          <a:prstGeom prst="rect">
+            <a:avLst/>
+          </a:prstGeom>
+          <a:noFill/>
+        </p:spPr>
+        <p:txBody>
+          <a:bodyPr wrap="square" rtlCol="0">
+            <a:spAutoFit/>
+          </a:bodyPr>
+          <a:lstStyle/>
+          <a:p>
+            <a:r>
+              <a:rPr lang="en-US" sz="3600" dirty="0"/>
+              <a:t>“The primary goal of unit testing is to take the smallest piece of testable software in the application, isolate it from the remainder of the code, and determine whether it behaves exactly as you expect.“</a:t>
+            </a:r>
+          </a:p>
+          <a:p>
+            <a:endParaRPr lang="en-US" dirty="0"/>
+          </a:p>
+          <a:p>
+            <a:r>
+              <a:rPr lang="en-US" sz="1200" dirty="0"/>
+              <a:t>From </a:t>
+            </a:r>
+            <a:r>
+              <a:rPr lang="en-US" sz="1200" dirty="0">
+                <a:hlinkClick r:id="rId3"/>
+              </a:rPr>
+              <a:t>https://msdn.microsoft.com/en-us/library/aa292197%28v=vs.71%29.aspx</a:t>
+            </a:r>
+            <a:endParaRPr lang="en-US" sz="1200" dirty="0"/>
+          </a:p>
+        </p:txBody>
+      </p:sp>
+    </p:spTree>
+    <p:extLst>
+      <p:ext uri="{BB962C8B-B14F-4D97-AF65-F5344CB8AC3E}">
+        <p14:creationId xmlns:p14="http://schemas.microsoft.com/office/powerpoint/2010/main" val="2912118878"/>
+      </p:ext>
+    </p:extLst>
+  </p:cSld>
+  <p:clrMapOvr>
+    <a:masterClrMapping/>
+  </p:clrMapOvr>
+</p:sld>
+</file>
+
+<file path=ppt/slides/slide7.xml><?xml version="1.0" encoding="utf-8"?>
+<p:sld xmlns:a="http://schemas.openxmlformats.org/drawingml/2006/main" xmlns:r="http://schemas.openxmlformats.org/officeDocument/2006/relationships" xmlns:p="http://schemas.openxmlformats.org/presentationml/2006/main">
+  <p:cSld>
+    <p:spTree>
+      <p:nvGrpSpPr>
+        <p:cNvPr id="1" name=""/>
+        <p:cNvGrpSpPr/>
+        <p:nvPr/>
+      </p:nvGrpSpPr>
+      <p:grpSpPr>
+        <a:xfrm>
+          <a:off x="0" y="0"/>
+          <a:ext cx="0" cy="0"/>
+          <a:chOff x="0" y="0"/>
+          <a:chExt cx="0" cy="0"/>
+        </a:xfrm>
+      </p:grpSpPr>
+      <p:sp>
+        <p:nvSpPr>
+          <p:cNvPr id="2" name="Title 1"/>
+          <p:cNvSpPr>
+            <a:spLocks noGrp="1"/>
+          </p:cNvSpPr>
+          <p:nvPr>
+            <p:ph type="title"/>
+          </p:nvPr>
+        </p:nvSpPr>
+        <p:spPr/>
+        <p:txBody>
+          <a:bodyPr/>
+          <a:lstStyle/>
+          <a:p>
+            <a:r>
+              <a:rPr lang="en-US" dirty="0"/>
+              <a:t>Unit Testing</a:t>
+            </a:r>
+          </a:p>
+        </p:txBody>
+      </p:sp>
+      <p:sp>
+        <p:nvSpPr>
           <p:cNvPr id="12" name="TextBox 11"/>
           <p:cNvSpPr txBox="1"/>
           <p:nvPr/>
@@ -8534,7 +8692,7 @@
 </p:sld>
 </file>
 
-<file path=ppt/slides/slide7.xml><?xml version="1.0" encoding="utf-8"?>
+<file path=ppt/slides/slide8.xml><?xml version="1.0" encoding="utf-8"?>
 <p:sld xmlns:a="http://schemas.openxmlformats.org/drawingml/2006/main" xmlns:r="http://schemas.openxmlformats.org/officeDocument/2006/relationships" xmlns:p="http://schemas.openxmlformats.org/presentationml/2006/main">
   <p:cSld>
     <p:spTree>
@@ -8615,7 +8773,7 @@
 </p:sld>
 </file>
 
-<file path=ppt/slides/slide8.xml><?xml version="1.0" encoding="utf-8"?>
+<file path=ppt/slides/slide9.xml><?xml version="1.0" encoding="utf-8"?>
 <p:sld xmlns:a="http://schemas.openxmlformats.org/drawingml/2006/main" xmlns:r="http://schemas.openxmlformats.org/officeDocument/2006/relationships" xmlns:p="http://schemas.openxmlformats.org/presentationml/2006/main">
   <p:cSld>
     <p:spTree>
@@ -8687,92 +8845,6 @@
     <p:extLst>
       <p:ext uri="{BB962C8B-B14F-4D97-AF65-F5344CB8AC3E}">
         <p14:creationId xmlns:p14="http://schemas.microsoft.com/office/powerpoint/2010/main" val="4110603329"/>
-      </p:ext>
-    </p:extLst>
-  </p:cSld>
-  <p:clrMapOvr>
-    <a:masterClrMapping/>
-  </p:clrMapOvr>
-</p:sld>
-</file>
-
-<file path=ppt/slides/slide9.xml><?xml version="1.0" encoding="utf-8"?>
-<p:sld xmlns:a="http://schemas.openxmlformats.org/drawingml/2006/main" xmlns:r="http://schemas.openxmlformats.org/officeDocument/2006/relationships" xmlns:p="http://schemas.openxmlformats.org/presentationml/2006/main">
-  <p:cSld>
-    <p:spTree>
-      <p:nvGrpSpPr>
-        <p:cNvPr id="1" name=""/>
-        <p:cNvGrpSpPr/>
-        <p:nvPr/>
-      </p:nvGrpSpPr>
-      <p:grpSpPr>
-        <a:xfrm>
-          <a:off x="0" y="0"/>
-          <a:ext cx="0" cy="0"/>
-          <a:chOff x="0" y="0"/>
-          <a:chExt cx="0" cy="0"/>
-        </a:xfrm>
-      </p:grpSpPr>
-      <p:sp>
-        <p:nvSpPr>
-          <p:cNvPr id="2" name="Title 1"/>
-          <p:cNvSpPr>
-            <a:spLocks noGrp="1"/>
-          </p:cNvSpPr>
-          <p:nvPr>
-            <p:ph type="title"/>
-          </p:nvPr>
-        </p:nvSpPr>
-        <p:spPr/>
-        <p:txBody>
-          <a:bodyPr/>
-          <a:lstStyle/>
-          <a:p>
-            <a:r>
-              <a:rPr lang="en-US" dirty="0"/>
-              <a:t>Building Tests</a:t>
-            </a:r>
-          </a:p>
-        </p:txBody>
-      </p:sp>
-      <p:sp>
-        <p:nvSpPr>
-          <p:cNvPr id="3" name="Content Placeholder 2"/>
-          <p:cNvSpPr>
-            <a:spLocks noGrp="1"/>
-          </p:cNvSpPr>
-          <p:nvPr>
-            <p:ph idx="1"/>
-          </p:nvPr>
-        </p:nvSpPr>
-        <p:spPr/>
-        <p:txBody>
-          <a:bodyPr/>
-          <a:lstStyle/>
-          <a:p>
-            <a:r>
-              <a:rPr lang="en-US" dirty="0"/>
-              <a:t>We want repeatable tests</a:t>
-            </a:r>
-          </a:p>
-          <a:p>
-            <a:r>
-              <a:rPr lang="en-US" dirty="0"/>
-              <a:t>We want automated tests</a:t>
-            </a:r>
-          </a:p>
-          <a:p>
-            <a:r>
-              <a:rPr lang="en-US" dirty="0"/>
-              <a:t>We want a suite of tests</a:t>
-            </a:r>
-          </a:p>
-        </p:txBody>
-      </p:sp>
-    </p:spTree>
-    <p:extLst>
-      <p:ext uri="{BB962C8B-B14F-4D97-AF65-F5344CB8AC3E}">
-        <p14:creationId xmlns:p14="http://schemas.microsoft.com/office/powerpoint/2010/main" val="2858332371"/>
       </p:ext>
     </p:extLst>
   </p:cSld>

</xml_diff>

<commit_message>
misc editing changes for anaheim
</commit_message>
<xml_diff>
--- a/UnitTestingTSQL.pptx
+++ b/UnitTestingTSQL.pptx
@@ -6,7 +6,7 @@
     <p:sldMasterId id="2147483692" r:id="rId2"/>
   </p:sldMasterIdLst>
   <p:notesMasterIdLst>
-    <p:notesMasterId r:id="rId30"/>
+    <p:notesMasterId r:id="rId31"/>
   </p:notesMasterIdLst>
   <p:sldIdLst>
     <p:sldId id="300" r:id="rId3"/>
@@ -21,8 +21,8 @@
     <p:sldId id="280" r:id="rId12"/>
     <p:sldId id="293" r:id="rId13"/>
     <p:sldId id="294" r:id="rId14"/>
-    <p:sldId id="295" r:id="rId15"/>
-    <p:sldId id="296" r:id="rId16"/>
+    <p:sldId id="301" r:id="rId15"/>
+    <p:sldId id="295" r:id="rId16"/>
     <p:sldId id="298" r:id="rId17"/>
     <p:sldId id="261" r:id="rId18"/>
     <p:sldId id="287" r:id="rId19"/>
@@ -30,12 +30,13 @@
     <p:sldId id="262" r:id="rId21"/>
     <p:sldId id="284" r:id="rId22"/>
     <p:sldId id="273" r:id="rId23"/>
-    <p:sldId id="285" r:id="rId24"/>
-    <p:sldId id="276" r:id="rId25"/>
-    <p:sldId id="278" r:id="rId26"/>
-    <p:sldId id="270" r:id="rId27"/>
-    <p:sldId id="271" r:id="rId28"/>
-    <p:sldId id="265" r:id="rId29"/>
+    <p:sldId id="302" r:id="rId24"/>
+    <p:sldId id="285" r:id="rId25"/>
+    <p:sldId id="276" r:id="rId26"/>
+    <p:sldId id="278" r:id="rId27"/>
+    <p:sldId id="270" r:id="rId28"/>
+    <p:sldId id="271" r:id="rId29"/>
+    <p:sldId id="265" r:id="rId30"/>
   </p:sldIdLst>
   <p:sldSz cx="9144000" cy="6858000" type="screen4x3"/>
   <p:notesSz cx="6858000" cy="9144000"/>
@@ -995,7 +996,7 @@
           <a:p>
             <a:fld id="{737EB954-88EE-45B2-878D-41C5C083E9B9}" type="slidenum">
               <a:rPr lang="en-US" smtClean="0"/>
-              <a:t>22</a:t>
+              <a:t>23</a:t>
             </a:fld>
             <a:endParaRPr lang="en-US"/>
           </a:p>
@@ -1115,7 +1116,7 @@
           <a:p>
             <a:fld id="{737EB954-88EE-45B2-878D-41C5C083E9B9}" type="slidenum">
               <a:rPr lang="en-US" smtClean="0"/>
-              <a:t>27</a:t>
+              <a:t>28</a:t>
             </a:fld>
             <a:endParaRPr lang="en-US"/>
           </a:p>
@@ -1654,7 +1655,7 @@
           <a:p>
             <a:fld id="{737EB954-88EE-45B2-878D-41C5C083E9B9}" type="slidenum">
               <a:rPr lang="en-US" smtClean="0"/>
-              <a:t>13</a:t>
+              <a:t>14</a:t>
             </a:fld>
             <a:endParaRPr lang="en-US"/>
           </a:p>
@@ -8480,7 +8481,12 @@
             <p:ph idx="1"/>
           </p:nvPr>
         </p:nvSpPr>
-        <p:spPr/>
+        <p:spPr>
+          <a:xfrm>
+            <a:off x="457200" y="1600201"/>
+            <a:ext cx="8229600" cy="4724399"/>
+          </a:xfrm>
+        </p:spPr>
         <p:txBody>
           <a:bodyPr/>
           <a:lstStyle/>
@@ -8493,7 +8499,7 @@
           <a:p>
             <a:r>
               <a:rPr lang="en-US" dirty="0"/>
-              <a:t>Write after if wish before coding</a:t>
+              <a:t>Write before coding</a:t>
             </a:r>
           </a:p>
           <a:p>
@@ -8511,9 +8517,16 @@
             </a:r>
           </a:p>
           <a:p>
+            <a:pPr lvl="1"/>
             <a:r>
               <a:rPr lang="en-US" dirty="0"/>
-              <a:t>Write as you get feedback from CI and QA testing.</a:t>
+              <a:t>Can write after</a:t>
+            </a:r>
+          </a:p>
+          <a:p>
+            <a:r>
+              <a:rPr lang="en-US" dirty="0"/>
+              <a:t>Write as you get feedback from CI and QA</a:t>
             </a:r>
           </a:p>
           <a:p>
@@ -8843,7 +8856,7 @@
       </p:grpSpPr>
       <p:sp>
         <p:nvSpPr>
-          <p:cNvPr id="4" name="Title 3"/>
+          <p:cNvPr id="2" name="Title 1"/>
           <p:cNvSpPr>
             <a:spLocks noGrp="1"/>
           </p:cNvSpPr>
@@ -8858,19 +8871,19 @@
           <a:p>
             <a:r>
               <a:rPr lang="en-US" dirty="0"/>
-              <a:t>Test Data</a:t>
-            </a:r>
-          </a:p>
-        </p:txBody>
-      </p:sp>
-      <p:sp>
-        <p:nvSpPr>
-          <p:cNvPr id="5" name="Text Placeholder 4"/>
-          <p:cNvSpPr>
-            <a:spLocks noGrp="1"/>
-          </p:cNvSpPr>
-          <p:nvPr>
-            <p:ph type="body" idx="1"/>
+              <a:t>Test Data Options</a:t>
+            </a:r>
+          </a:p>
+        </p:txBody>
+      </p:sp>
+      <p:sp>
+        <p:nvSpPr>
+          <p:cNvPr id="3" name="Content Placeholder 2"/>
+          <p:cNvSpPr>
+            <a:spLocks noGrp="1"/>
+          </p:cNvSpPr>
+          <p:nvPr>
+            <p:ph idx="1"/>
           </p:nvPr>
         </p:nvSpPr>
         <p:spPr/>
@@ -8880,7 +8893,19 @@
           <a:p>
             <a:r>
               <a:rPr lang="en-US" dirty="0"/>
-              <a:t>Storing and Loading Test Data</a:t>
+              <a:t>Restore/Clone database</a:t>
+            </a:r>
+          </a:p>
+          <a:p>
+            <a:r>
+              <a:rPr lang="en-US" dirty="0"/>
+              <a:t>Load from flat files</a:t>
+            </a:r>
+          </a:p>
+          <a:p>
+            <a:r>
+              <a:rPr lang="en-US" dirty="0"/>
+              <a:t>Load with insert statements</a:t>
             </a:r>
           </a:p>
         </p:txBody>
@@ -8888,7 +8913,7 @@
     </p:spTree>
     <p:extLst>
       <p:ext uri="{BB962C8B-B14F-4D97-AF65-F5344CB8AC3E}">
-        <p14:creationId xmlns:p14="http://schemas.microsoft.com/office/powerpoint/2010/main" val="3540592545"/>
+        <p14:creationId xmlns:p14="http://schemas.microsoft.com/office/powerpoint/2010/main" val="1207927901"/>
       </p:ext>
     </p:extLst>
   </p:cSld>
@@ -8917,7 +8942,7 @@
       </p:grpSpPr>
       <p:sp>
         <p:nvSpPr>
-          <p:cNvPr id="2" name="Title 1"/>
+          <p:cNvPr id="4" name="Title 3"/>
           <p:cNvSpPr>
             <a:spLocks noGrp="1"/>
           </p:cNvSpPr>
@@ -8932,14 +8957,14 @@
           <a:p>
             <a:r>
               <a:rPr lang="en-US" dirty="0"/>
-              <a:t>Database Testing Frameworks</a:t>
-            </a:r>
-          </a:p>
-        </p:txBody>
-      </p:sp>
-      <p:sp>
-        <p:nvSpPr>
-          <p:cNvPr id="4" name="Text Placeholder 3"/>
+              <a:t>Test Data</a:t>
+            </a:r>
+          </a:p>
+        </p:txBody>
+      </p:sp>
+      <p:sp>
+        <p:nvSpPr>
+          <p:cNvPr id="5" name="Text Placeholder 4"/>
           <p:cNvSpPr>
             <a:spLocks noGrp="1"/>
           </p:cNvSpPr>
@@ -8954,7 +8979,7 @@
           <a:p>
             <a:r>
               <a:rPr lang="en-US" dirty="0"/>
-              <a:t>Options for SQL Server</a:t>
+              <a:t>Storing and Loading Test Data</a:t>
             </a:r>
           </a:p>
         </p:txBody>
@@ -8962,7 +8987,7 @@
     </p:spTree>
     <p:extLst>
       <p:ext uri="{BB962C8B-B14F-4D97-AF65-F5344CB8AC3E}">
-        <p14:creationId xmlns:p14="http://schemas.microsoft.com/office/powerpoint/2010/main" val="3452093907"/>
+        <p14:creationId xmlns:p14="http://schemas.microsoft.com/office/powerpoint/2010/main" val="3540592545"/>
       </p:ext>
     </p:extLst>
   </p:cSld>
@@ -9027,93 +9052,87 @@
           <a:lstStyle/>
           <a:p>
             <a:r>
-              <a:rPr lang="en-US" dirty="0"/>
+              <a:rPr lang="en-US" sz="2000" dirty="0"/>
               <a:t>There are a number of frameworks for databases</a:t>
             </a:r>
           </a:p>
           <a:p>
             <a:r>
-              <a:rPr lang="en-US" dirty="0"/>
+              <a:rPr lang="en-US" sz="2000" dirty="0"/>
               <a:t>Some are base on other unit testing frameworks, like Junit</a:t>
             </a:r>
           </a:p>
           <a:p>
             <a:r>
-              <a:rPr lang="en-US" dirty="0"/>
-              <a:t>These handle the specific nature of database requests</a:t>
-            </a:r>
-          </a:p>
-          <a:p>
-            <a:r>
-              <a:rPr lang="en-US" dirty="0"/>
+              <a:rPr lang="en-US" sz="2000" dirty="0"/>
               <a:t>For SQL Server</a:t>
             </a:r>
           </a:p>
           <a:p>
             <a:pPr lvl="1"/>
             <a:r>
-              <a:rPr lang="en-US" dirty="0" err="1"/>
+              <a:rPr lang="en-US" sz="1800" dirty="0" err="1"/>
               <a:t>tSQLt</a:t>
             </a:r>
-            <a:endParaRPr lang="en-US" dirty="0"/>
+            <a:endParaRPr lang="en-US" sz="1800" dirty="0"/>
           </a:p>
           <a:p>
             <a:pPr lvl="1"/>
             <a:r>
-              <a:rPr lang="en-US" dirty="0"/>
+              <a:rPr lang="en-US" sz="1800" dirty="0"/>
               <a:t>MS Unit Testing Framework</a:t>
             </a:r>
           </a:p>
           <a:p>
             <a:pPr lvl="1"/>
             <a:r>
-              <a:rPr lang="en-US" dirty="0" err="1"/>
+              <a:rPr lang="en-US" sz="1800" dirty="0" err="1"/>
               <a:t>DBTest</a:t>
             </a:r>
-            <a:endParaRPr lang="en-US" dirty="0"/>
+            <a:endParaRPr lang="en-US" sz="1800" dirty="0"/>
           </a:p>
           <a:p>
             <a:pPr lvl="1"/>
             <a:r>
-              <a:rPr lang="en-US" dirty="0" err="1"/>
+              <a:rPr lang="en-US" sz="1800" dirty="0" err="1"/>
               <a:t>TSQLUnit</a:t>
             </a:r>
-            <a:endParaRPr lang="en-US" dirty="0"/>
+            <a:endParaRPr lang="en-US" sz="1800" dirty="0"/>
           </a:p>
           <a:p>
             <a:pPr lvl="1"/>
             <a:r>
-              <a:rPr lang="en-US" dirty="0" err="1"/>
+              <a:rPr lang="en-US" sz="1800" dirty="0" err="1"/>
               <a:t>DBFit</a:t>
             </a:r>
-            <a:endParaRPr lang="en-US" dirty="0"/>
+            <a:endParaRPr lang="en-US" sz="1800" dirty="0"/>
           </a:p>
           <a:p>
             <a:pPr lvl="1"/>
             <a:r>
-              <a:rPr lang="en-US" dirty="0"/>
+              <a:rPr lang="en-US" sz="1800" dirty="0"/>
               <a:t>SS-Unit</a:t>
             </a:r>
           </a:p>
           <a:p>
             <a:pPr lvl="1"/>
             <a:r>
-              <a:rPr lang="en-US" dirty="0"/>
+              <a:rPr lang="en-US" sz="1800" dirty="0"/>
               <a:t>T.S.T</a:t>
             </a:r>
           </a:p>
           <a:p>
             <a:pPr lvl="1"/>
             <a:r>
-              <a:rPr lang="en-US" dirty="0" err="1"/>
+              <a:rPr lang="en-US" sz="1800" dirty="0" err="1"/>
               <a:t>dbForge</a:t>
             </a:r>
-            <a:endParaRPr lang="en-US" dirty="0"/>
+            <a:endParaRPr lang="en-US" sz="1800" dirty="0"/>
           </a:p>
           <a:p>
             <a:pPr lvl="1"/>
             <a:r>
-              <a:rPr lang="en-US" dirty="0"/>
+              <a:rPr lang="en-US" sz="1800" dirty="0"/>
               <a:t>others</a:t>
             </a:r>
           </a:p>
@@ -9761,32 +9780,27 @@
           <a:lstStyle/>
           <a:p>
             <a:r>
-              <a:rPr lang="en-US" dirty="0"/>
+              <a:rPr lang="en-US" sz="2800" dirty="0"/>
               <a:t>These are unit tests designed to find issues with a particular specific function.</a:t>
             </a:r>
           </a:p>
           <a:p>
             <a:r>
-              <a:rPr lang="en-US" dirty="0"/>
+              <a:rPr lang="en-US" sz="2800" dirty="0"/>
               <a:t>This are especially useful when writing code as requirements may not be clear</a:t>
             </a:r>
           </a:p>
           <a:p>
             <a:r>
-              <a:rPr lang="en-US" dirty="0"/>
+              <a:rPr lang="en-US" sz="2800" dirty="0"/>
               <a:t>Using a test ensures we document the results we expect, and have no ambiguity</a:t>
             </a:r>
           </a:p>
           <a:p>
             <a:r>
-              <a:rPr lang="en-US" dirty="0"/>
-              <a:t>This also helps prevent </a:t>
-            </a:r>
-            <a:r>
-              <a:rPr lang="en-US"/>
-              <a:t>regressions when altering code</a:t>
-            </a:r>
-            <a:endParaRPr lang="en-US" dirty="0"/>
+              <a:rPr lang="en-US" sz="2800" dirty="0"/>
+              <a:t>This also helps prevent regressions when altering code</a:t>
+            </a:r>
           </a:p>
         </p:txBody>
       </p:sp>
@@ -9822,7 +9836,7 @@
       </p:grpSpPr>
       <p:sp>
         <p:nvSpPr>
-          <p:cNvPr id="4" name="Title 3"/>
+          <p:cNvPr id="2" name="Title 1"/>
           <p:cNvSpPr>
             <a:spLocks noGrp="1"/>
           </p:cNvSpPr>
@@ -9836,20 +9850,21 @@
           <a:lstStyle/>
           <a:p>
             <a:r>
-              <a:rPr lang="en-US" dirty="0"/>
-              <a:t>Testing Code Logic</a:t>
-            </a:r>
-          </a:p>
-        </p:txBody>
-      </p:sp>
-      <p:sp>
-        <p:nvSpPr>
-          <p:cNvPr id="5" name="Text Placeholder 4"/>
-          <p:cNvSpPr>
-            <a:spLocks noGrp="1"/>
-          </p:cNvSpPr>
-          <p:nvPr>
-            <p:ph type="body" idx="1"/>
+              <a:rPr lang="en-US"/>
+              <a:t> Checking </a:t>
+            </a:r>
+            <a:endParaRPr lang="en-US" dirty="0"/>
+          </a:p>
+        </p:txBody>
+      </p:sp>
+      <p:sp>
+        <p:nvSpPr>
+          <p:cNvPr id="3" name="Content Placeholder 2"/>
+          <p:cNvSpPr>
+            <a:spLocks noGrp="1"/>
+          </p:cNvSpPr>
+          <p:nvPr>
+            <p:ph idx="1"/>
           </p:nvPr>
         </p:nvSpPr>
         <p:spPr/>
@@ -9858,8 +9873,26 @@
           <a:lstStyle/>
           <a:p>
             <a:r>
-              <a:rPr lang="en-US" dirty="0"/>
-              <a:t>Functional Unit Tests</a:t>
+              <a:rPr lang="en-US" sz="2800" dirty="0"/>
+              <a:t>These are unit tests designed to find issues with a particular specific function.</a:t>
+            </a:r>
+          </a:p>
+          <a:p>
+            <a:r>
+              <a:rPr lang="en-US" sz="2800" dirty="0"/>
+              <a:t>This are especially useful when writing code as requirements may not be clear</a:t>
+            </a:r>
+          </a:p>
+          <a:p>
+            <a:r>
+              <a:rPr lang="en-US" sz="2800" dirty="0"/>
+              <a:t>Using a test ensures we document the results we expect, and have no ambiguity</a:t>
+            </a:r>
+          </a:p>
+          <a:p>
+            <a:r>
+              <a:rPr lang="en-US" sz="2800" dirty="0"/>
+              <a:t>This also helps prevent regressions when altering code</a:t>
             </a:r>
           </a:p>
         </p:txBody>
@@ -9867,7 +9900,7 @@
     </p:spTree>
     <p:extLst>
       <p:ext uri="{BB962C8B-B14F-4D97-AF65-F5344CB8AC3E}">
-        <p14:creationId xmlns:p14="http://schemas.microsoft.com/office/powerpoint/2010/main" val="3075909317"/>
+        <p14:creationId xmlns:p14="http://schemas.microsoft.com/office/powerpoint/2010/main" val="974780207"/>
       </p:ext>
     </p:extLst>
   </p:cSld>
@@ -9896,7 +9929,7 @@
       </p:grpSpPr>
       <p:sp>
         <p:nvSpPr>
-          <p:cNvPr id="2" name="Title 1"/>
+          <p:cNvPr id="4" name="Title 3"/>
           <p:cNvSpPr>
             <a:spLocks noGrp="1"/>
           </p:cNvSpPr>
@@ -9911,19 +9944,19 @@
           <a:p>
             <a:r>
               <a:rPr lang="en-US" dirty="0"/>
-              <a:t>Having a Test Suite</a:t>
-            </a:r>
-          </a:p>
-        </p:txBody>
-      </p:sp>
-      <p:sp>
-        <p:nvSpPr>
-          <p:cNvPr id="3" name="Content Placeholder 2"/>
-          <p:cNvSpPr>
-            <a:spLocks noGrp="1"/>
-          </p:cNvSpPr>
-          <p:nvPr>
-            <p:ph idx="1"/>
+              <a:t>Testing Code Logic</a:t>
+            </a:r>
+          </a:p>
+        </p:txBody>
+      </p:sp>
+      <p:sp>
+        <p:nvSpPr>
+          <p:cNvPr id="5" name="Text Placeholder 4"/>
+          <p:cNvSpPr>
+            <a:spLocks noGrp="1"/>
+          </p:cNvSpPr>
+          <p:nvPr>
+            <p:ph type="body" idx="1"/>
           </p:nvPr>
         </p:nvSpPr>
         <p:spPr/>
@@ -9933,19 +9966,7 @@
           <a:p>
             <a:r>
               <a:rPr lang="en-US" dirty="0"/>
-              <a:t>By continuing to grow your test suite with each change, developers spread the load</a:t>
-            </a:r>
-          </a:p>
-          <a:p>
-            <a:r>
-              <a:rPr lang="en-US" dirty="0"/>
-              <a:t>By having a large suite, we have better code coverage.</a:t>
-            </a:r>
-          </a:p>
-          <a:p>
-            <a:r>
-              <a:rPr lang="en-US" dirty="0"/>
-              <a:t>We can easily regression test.</a:t>
+              <a:t>Functional Unit Tests</a:t>
             </a:r>
           </a:p>
         </p:txBody>
@@ -9953,7 +9974,7 @@
     </p:spTree>
     <p:extLst>
       <p:ext uri="{BB962C8B-B14F-4D97-AF65-F5344CB8AC3E}">
-        <p14:creationId xmlns:p14="http://schemas.microsoft.com/office/powerpoint/2010/main" val="2479422556"/>
+        <p14:creationId xmlns:p14="http://schemas.microsoft.com/office/powerpoint/2010/main" val="3075909317"/>
       </p:ext>
     </p:extLst>
   </p:cSld>
@@ -9997,6 +10018,92 @@
           <a:p>
             <a:r>
               <a:rPr lang="en-US" dirty="0"/>
+              <a:t>Having a Test Suite</a:t>
+            </a:r>
+          </a:p>
+        </p:txBody>
+      </p:sp>
+      <p:sp>
+        <p:nvSpPr>
+          <p:cNvPr id="3" name="Content Placeholder 2"/>
+          <p:cNvSpPr>
+            <a:spLocks noGrp="1"/>
+          </p:cNvSpPr>
+          <p:nvPr>
+            <p:ph idx="1"/>
+          </p:nvPr>
+        </p:nvSpPr>
+        <p:spPr/>
+        <p:txBody>
+          <a:bodyPr/>
+          <a:lstStyle/>
+          <a:p>
+            <a:r>
+              <a:rPr lang="en-US" dirty="0"/>
+              <a:t>By continuing to grow your test suite with each change, developers spread the load</a:t>
+            </a:r>
+          </a:p>
+          <a:p>
+            <a:r>
+              <a:rPr lang="en-US" dirty="0"/>
+              <a:t>By having a large suite, we have better code coverage.</a:t>
+            </a:r>
+          </a:p>
+          <a:p>
+            <a:r>
+              <a:rPr lang="en-US" dirty="0"/>
+              <a:t>We can easily regression test.</a:t>
+            </a:r>
+          </a:p>
+        </p:txBody>
+      </p:sp>
+    </p:spTree>
+    <p:extLst>
+      <p:ext uri="{BB962C8B-B14F-4D97-AF65-F5344CB8AC3E}">
+        <p14:creationId xmlns:p14="http://schemas.microsoft.com/office/powerpoint/2010/main" val="2479422556"/>
+      </p:ext>
+    </p:extLst>
+  </p:cSld>
+  <p:clrMapOvr>
+    <a:masterClrMapping/>
+  </p:clrMapOvr>
+</p:sld>
+</file>
+
+<file path=ppt/slides/slide25.xml><?xml version="1.0" encoding="utf-8"?>
+<p:sld xmlns:a="http://schemas.openxmlformats.org/drawingml/2006/main" xmlns:r="http://schemas.openxmlformats.org/officeDocument/2006/relationships" xmlns:p="http://schemas.openxmlformats.org/presentationml/2006/main">
+  <p:cSld>
+    <p:spTree>
+      <p:nvGrpSpPr>
+        <p:cNvPr id="1" name=""/>
+        <p:cNvGrpSpPr/>
+        <p:nvPr/>
+      </p:nvGrpSpPr>
+      <p:grpSpPr>
+        <a:xfrm>
+          <a:off x="0" y="0"/>
+          <a:ext cx="0" cy="0"/>
+          <a:chOff x="0" y="0"/>
+          <a:chExt cx="0" cy="0"/>
+        </a:xfrm>
+      </p:grpSpPr>
+      <p:sp>
+        <p:nvSpPr>
+          <p:cNvPr id="2" name="Title 1"/>
+          <p:cNvSpPr>
+            <a:spLocks noGrp="1"/>
+          </p:cNvSpPr>
+          <p:nvPr>
+            <p:ph type="title"/>
+          </p:nvPr>
+        </p:nvSpPr>
+        <p:spPr/>
+        <p:txBody>
+          <a:bodyPr/>
+          <a:lstStyle/>
+          <a:p>
+            <a:r>
+              <a:rPr lang="en-US" dirty="0"/>
               <a:t>Summary</a:t>
             </a:r>
           </a:p>
@@ -10063,7 +10170,7 @@
 </p:sld>
 </file>
 
-<file path=ppt/slides/slide25.xml><?xml version="1.0" encoding="utf-8"?>
+<file path=ppt/slides/slide26.xml><?xml version="1.0" encoding="utf-8"?>
 <p:sld xmlns:a="http://schemas.openxmlformats.org/drawingml/2006/main" xmlns:r="http://schemas.openxmlformats.org/officeDocument/2006/relationships" xmlns:p="http://schemas.openxmlformats.org/presentationml/2006/main">
   <p:cSld>
     <p:spTree>
@@ -10656,7 +10763,7 @@
 </p:sld>
 </file>
 
-<file path=ppt/slides/slide26.xml><?xml version="1.0" encoding="utf-8"?>
+<file path=ppt/slides/slide27.xml><?xml version="1.0" encoding="utf-8"?>
 <p:sld xmlns:a="http://schemas.openxmlformats.org/drawingml/2006/main" xmlns:r="http://schemas.openxmlformats.org/officeDocument/2006/relationships" xmlns:p="http://schemas.openxmlformats.org/presentationml/2006/main">
   <p:cSld>
     <p:spTree>
@@ -10754,7 +10861,7 @@
 </p:sld>
 </file>
 
-<file path=ppt/slides/slide27.xml><?xml version="1.0" encoding="utf-8"?>
+<file path=ppt/slides/slide28.xml><?xml version="1.0" encoding="utf-8"?>
 <p:sld xmlns:a="http://schemas.openxmlformats.org/drawingml/2006/main" xmlns:r="http://schemas.openxmlformats.org/officeDocument/2006/relationships" xmlns:p="http://schemas.openxmlformats.org/presentationml/2006/main">
   <p:cSld>
     <p:spTree>
@@ -11614,7 +11721,7 @@
         </p:nvSpPr>
         <p:spPr>
           <a:xfrm>
-            <a:off x="3644199" y="1369248"/>
+            <a:off x="584922" y="1609419"/>
             <a:ext cx="2438400" cy="2062103"/>
           </a:xfrm>
           <a:prstGeom prst="mathMultiply">

</xml_diff>

<commit_message>
Updates to demo slides to mark time better for pacing
</commit_message>
<xml_diff>
--- a/UnitTestingTSQL.pptx
+++ b/UnitTestingTSQL.pptx
@@ -6,7 +6,7 @@
     <p:sldMasterId id="2147483692" r:id="rId2"/>
   </p:sldMasterIdLst>
   <p:notesMasterIdLst>
-    <p:notesMasterId r:id="rId31"/>
+    <p:notesMasterId r:id="rId35"/>
   </p:notesMasterIdLst>
   <p:sldIdLst>
     <p:sldId id="300" r:id="rId3"/>
@@ -32,11 +32,15 @@
     <p:sldId id="273" r:id="rId23"/>
     <p:sldId id="302" r:id="rId24"/>
     <p:sldId id="285" r:id="rId25"/>
-    <p:sldId id="276" r:id="rId26"/>
-    <p:sldId id="278" r:id="rId27"/>
-    <p:sldId id="270" r:id="rId28"/>
-    <p:sldId id="271" r:id="rId29"/>
-    <p:sldId id="265" r:id="rId30"/>
+    <p:sldId id="304" r:id="rId26"/>
+    <p:sldId id="303" r:id="rId27"/>
+    <p:sldId id="305" r:id="rId28"/>
+    <p:sldId id="306" r:id="rId29"/>
+    <p:sldId id="276" r:id="rId30"/>
+    <p:sldId id="278" r:id="rId31"/>
+    <p:sldId id="270" r:id="rId32"/>
+    <p:sldId id="271" r:id="rId33"/>
+    <p:sldId id="265" r:id="rId34"/>
   </p:sldIdLst>
   <p:sldSz cx="9144000" cy="6858000" type="screen4x3"/>
   <p:notesSz cx="6858000" cy="9144000"/>
@@ -1061,6 +1065,234 @@
           <a:p>
             <a:r>
               <a:rPr lang="en-US" dirty="0"/>
+              <a:t>Write proc for insert and select of images</a:t>
+            </a:r>
+          </a:p>
+          <a:p>
+            <a:r>
+              <a:rPr lang="en-US" dirty="0"/>
+              <a:t>Create new test for insert, don’t fill stub</a:t>
+            </a:r>
+          </a:p>
+          <a:p>
+            <a:r>
+              <a:rPr lang="en-US" dirty="0"/>
+              <a:t>Create new test for select and edit</a:t>
+            </a:r>
+          </a:p>
+          <a:p>
+            <a:r>
+              <a:rPr lang="en-US" dirty="0"/>
+              <a:t>Run tests, get caught naming issues, as well as one procedure works, one fails. We get the failure in the test we didn’t edit.</a:t>
+            </a:r>
+          </a:p>
+          <a:p>
+            <a:r>
+              <a:rPr lang="en-US" dirty="0"/>
+              <a:t>Correct issues in both procedures</a:t>
+            </a:r>
+          </a:p>
+          <a:p>
+            <a:endParaRPr lang="en-US" dirty="0"/>
+          </a:p>
+        </p:txBody>
+      </p:sp>
+      <p:sp>
+        <p:nvSpPr>
+          <p:cNvPr id="4" name="Slide Number Placeholder 3"/>
+          <p:cNvSpPr>
+            <a:spLocks noGrp="1"/>
+          </p:cNvSpPr>
+          <p:nvPr>
+            <p:ph type="sldNum" sz="quarter" idx="10"/>
+          </p:nvPr>
+        </p:nvSpPr>
+        <p:spPr/>
+        <p:txBody>
+          <a:bodyPr/>
+          <a:lstStyle/>
+          <a:p>
+            <a:fld id="{737EB954-88EE-45B2-878D-41C5C083E9B9}" type="slidenum">
+              <a:rPr lang="en-US" smtClean="0"/>
+              <a:t>25</a:t>
+            </a:fld>
+            <a:endParaRPr lang="en-US"/>
+          </a:p>
+        </p:txBody>
+      </p:sp>
+    </p:spTree>
+    <p:extLst>
+      <p:ext uri="{BB962C8B-B14F-4D97-AF65-F5344CB8AC3E}">
+        <p14:creationId xmlns:p14="http://schemas.microsoft.com/office/powerpoint/2010/main" val="1614498760"/>
+      </p:ext>
+    </p:extLst>
+  </p:cSld>
+  <p:clrMapOvr>
+    <a:masterClrMapping/>
+  </p:clrMapOvr>
+</p:notes>
+</file>
+
+<file path=ppt/notesSlides/notesSlide14.xml><?xml version="1.0" encoding="utf-8"?>
+<p:notes xmlns:a="http://schemas.openxmlformats.org/drawingml/2006/main" xmlns:r="http://schemas.openxmlformats.org/officeDocument/2006/relationships" xmlns:p="http://schemas.openxmlformats.org/presentationml/2006/main">
+  <p:cSld>
+    <p:spTree>
+      <p:nvGrpSpPr>
+        <p:cNvPr id="1" name=""/>
+        <p:cNvGrpSpPr/>
+        <p:nvPr/>
+      </p:nvGrpSpPr>
+      <p:grpSpPr>
+        <a:xfrm>
+          <a:off x="0" y="0"/>
+          <a:ext cx="0" cy="0"/>
+          <a:chOff x="0" y="0"/>
+          <a:chExt cx="0" cy="0"/>
+        </a:xfrm>
+      </p:grpSpPr>
+      <p:sp>
+        <p:nvSpPr>
+          <p:cNvPr id="2" name="Slide Image Placeholder 1"/>
+          <p:cNvSpPr>
+            <a:spLocks noGrp="1" noRot="1" noChangeAspect="1"/>
+          </p:cNvSpPr>
+          <p:nvPr>
+            <p:ph type="sldImg"/>
+          </p:nvPr>
+        </p:nvSpPr>
+        <p:spPr/>
+      </p:sp>
+      <p:sp>
+        <p:nvSpPr>
+          <p:cNvPr id="3" name="Notes Placeholder 2"/>
+          <p:cNvSpPr>
+            <a:spLocks noGrp="1"/>
+          </p:cNvSpPr>
+          <p:nvPr>
+            <p:ph type="body" idx="1"/>
+          </p:nvPr>
+        </p:nvSpPr>
+        <p:spPr/>
+        <p:txBody>
+          <a:bodyPr/>
+          <a:lstStyle/>
+          <a:p>
+            <a:r>
+              <a:rPr lang="en-US" dirty="0"/>
+              <a:t>Write proc for insert and select of images</a:t>
+            </a:r>
+          </a:p>
+          <a:p>
+            <a:r>
+              <a:rPr lang="en-US" dirty="0"/>
+              <a:t>Create new test for insert, don’t fill stub</a:t>
+            </a:r>
+          </a:p>
+          <a:p>
+            <a:r>
+              <a:rPr lang="en-US" dirty="0"/>
+              <a:t>Create new test for select and edit</a:t>
+            </a:r>
+          </a:p>
+          <a:p>
+            <a:r>
+              <a:rPr lang="en-US" dirty="0"/>
+              <a:t>Run tests, get caught naming issues, as well as one procedure works, one fails. We get the failure in the test we didn’t edit.</a:t>
+            </a:r>
+          </a:p>
+          <a:p>
+            <a:r>
+              <a:rPr lang="en-US" dirty="0"/>
+              <a:t>Correct issues in both procedures</a:t>
+            </a:r>
+          </a:p>
+          <a:p>
+            <a:endParaRPr lang="en-US" dirty="0"/>
+          </a:p>
+        </p:txBody>
+      </p:sp>
+      <p:sp>
+        <p:nvSpPr>
+          <p:cNvPr id="4" name="Slide Number Placeholder 3"/>
+          <p:cNvSpPr>
+            <a:spLocks noGrp="1"/>
+          </p:cNvSpPr>
+          <p:nvPr>
+            <p:ph type="sldNum" sz="quarter" idx="10"/>
+          </p:nvPr>
+        </p:nvSpPr>
+        <p:spPr/>
+        <p:txBody>
+          <a:bodyPr/>
+          <a:lstStyle/>
+          <a:p>
+            <a:fld id="{737EB954-88EE-45B2-878D-41C5C083E9B9}" type="slidenum">
+              <a:rPr lang="en-US" smtClean="0"/>
+              <a:t>27</a:t>
+            </a:fld>
+            <a:endParaRPr lang="en-US"/>
+          </a:p>
+        </p:txBody>
+      </p:sp>
+    </p:spTree>
+    <p:extLst>
+      <p:ext uri="{BB962C8B-B14F-4D97-AF65-F5344CB8AC3E}">
+        <p14:creationId xmlns:p14="http://schemas.microsoft.com/office/powerpoint/2010/main" val="1161020715"/>
+      </p:ext>
+    </p:extLst>
+  </p:cSld>
+  <p:clrMapOvr>
+    <a:masterClrMapping/>
+  </p:clrMapOvr>
+</p:notes>
+</file>
+
+<file path=ppt/notesSlides/notesSlide15.xml><?xml version="1.0" encoding="utf-8"?>
+<p:notes xmlns:a="http://schemas.openxmlformats.org/drawingml/2006/main" xmlns:r="http://schemas.openxmlformats.org/officeDocument/2006/relationships" xmlns:p="http://schemas.openxmlformats.org/presentationml/2006/main">
+  <p:cSld>
+    <p:spTree>
+      <p:nvGrpSpPr>
+        <p:cNvPr id="1" name=""/>
+        <p:cNvGrpSpPr/>
+        <p:nvPr/>
+      </p:nvGrpSpPr>
+      <p:grpSpPr>
+        <a:xfrm>
+          <a:off x="0" y="0"/>
+          <a:ext cx="0" cy="0"/>
+          <a:chOff x="0" y="0"/>
+          <a:chExt cx="0" cy="0"/>
+        </a:xfrm>
+      </p:grpSpPr>
+      <p:sp>
+        <p:nvSpPr>
+          <p:cNvPr id="2" name="Slide Image Placeholder 1"/>
+          <p:cNvSpPr>
+            <a:spLocks noGrp="1" noRot="1" noChangeAspect="1"/>
+          </p:cNvSpPr>
+          <p:nvPr>
+            <p:ph type="sldImg"/>
+          </p:nvPr>
+        </p:nvSpPr>
+        <p:spPr/>
+      </p:sp>
+      <p:sp>
+        <p:nvSpPr>
+          <p:cNvPr id="3" name="Notes Placeholder 2"/>
+          <p:cNvSpPr>
+            <a:spLocks noGrp="1"/>
+          </p:cNvSpPr>
+          <p:nvPr>
+            <p:ph type="body" idx="1"/>
+          </p:nvPr>
+        </p:nvSpPr>
+        <p:spPr/>
+        <p:txBody>
+          <a:bodyPr/>
+          <a:lstStyle/>
+          <a:p>
+            <a:r>
+              <a:rPr lang="en-US" dirty="0"/>
               <a:t>CD pipeline</a:t>
             </a:r>
             <a:r>
@@ -1116,7 +1348,7 @@
           <a:p>
             <a:fld id="{737EB954-88EE-45B2-878D-41C5C083E9B9}" type="slidenum">
               <a:rPr lang="en-US" smtClean="0"/>
-              <a:t>28</a:t>
+              <a:t>32</a:t>
             </a:fld>
             <a:endParaRPr lang="en-US"/>
           </a:p>
@@ -9850,10 +10082,9 @@
           <a:lstStyle/>
           <a:p>
             <a:r>
-              <a:rPr lang="en-US"/>
-              <a:t> Checking </a:t>
-            </a:r>
-            <a:endParaRPr lang="en-US" dirty="0"/>
+              <a:rPr lang="en-US" dirty="0"/>
+              <a:t> Checking Joins </a:t>
+            </a:r>
           </a:p>
         </p:txBody>
       </p:sp>
@@ -9874,25 +10105,19 @@
           <a:p>
             <a:r>
               <a:rPr lang="en-US" sz="2800" dirty="0"/>
-              <a:t>These are unit tests designed to find issues with a particular specific function.</a:t>
+              <a:t>Joins can pull data together in different ways</a:t>
             </a:r>
           </a:p>
           <a:p>
             <a:r>
               <a:rPr lang="en-US" sz="2800" dirty="0"/>
-              <a:t>This are especially useful when writing code as requirements may not be clear</a:t>
+              <a:t>Refactoring can cause problems</a:t>
             </a:r>
           </a:p>
           <a:p>
             <a:r>
               <a:rPr lang="en-US" sz="2800" dirty="0"/>
-              <a:t>Using a test ensures we document the results we expect, and have no ambiguity</a:t>
-            </a:r>
-          </a:p>
-          <a:p>
-            <a:r>
-              <a:rPr lang="en-US" sz="2800" dirty="0"/>
-              <a:t>This also helps prevent regressions when altering code</a:t>
+              <a:t>Writing code for important, complex, or problematic queries is helpful to prevent regressions</a:t>
             </a:r>
           </a:p>
         </p:txBody>
@@ -9944,29 +10169,29 @@
           <a:p>
             <a:r>
               <a:rPr lang="en-US" dirty="0"/>
+              <a:t>Checking Joins</a:t>
+            </a:r>
+          </a:p>
+        </p:txBody>
+      </p:sp>
+      <p:sp>
+        <p:nvSpPr>
+          <p:cNvPr id="5" name="Text Placeholder 4"/>
+          <p:cNvSpPr>
+            <a:spLocks noGrp="1"/>
+          </p:cNvSpPr>
+          <p:nvPr>
+            <p:ph type="body" idx="1"/>
+          </p:nvPr>
+        </p:nvSpPr>
+        <p:spPr/>
+        <p:txBody>
+          <a:bodyPr/>
+          <a:lstStyle/>
+          <a:p>
+            <a:r>
+              <a:rPr lang="en-US" dirty="0"/>
               <a:t>Testing Code Logic</a:t>
-            </a:r>
-          </a:p>
-        </p:txBody>
-      </p:sp>
-      <p:sp>
-        <p:nvSpPr>
-          <p:cNvPr id="5" name="Text Placeholder 4"/>
-          <p:cNvSpPr>
-            <a:spLocks noGrp="1"/>
-          </p:cNvSpPr>
-          <p:nvPr>
-            <p:ph type="body" idx="1"/>
-          </p:nvPr>
-        </p:nvSpPr>
-        <p:spPr/>
-        <p:txBody>
-          <a:bodyPr/>
-          <a:lstStyle/>
-          <a:p>
-            <a:r>
-              <a:rPr lang="en-US" dirty="0"/>
-              <a:t>Functional Unit Tests</a:t>
             </a:r>
           </a:p>
         </p:txBody>
@@ -10018,7 +10243,7 @@
           <a:p>
             <a:r>
               <a:rPr lang="en-US" dirty="0"/>
-              <a:t>Having a Test Suite</a:t>
+              <a:t> Checking Calculations </a:t>
             </a:r>
           </a:p>
         </p:txBody>
@@ -10039,20 +10264,20 @@
           <a:lstStyle/>
           <a:p>
             <a:r>
-              <a:rPr lang="en-US" dirty="0"/>
-              <a:t>By continuing to grow your test suite with each change, developers spread the load</a:t>
-            </a:r>
-          </a:p>
-          <a:p>
-            <a:r>
-              <a:rPr lang="en-US" dirty="0"/>
-              <a:t>By having a large suite, we have better code coverage.</a:t>
-            </a:r>
-          </a:p>
-          <a:p>
-            <a:r>
-              <a:rPr lang="en-US" dirty="0"/>
-              <a:t>We can easily regression test.</a:t>
+              <a:rPr lang="en-US" sz="2800" dirty="0"/>
+              <a:t>There are times we perform calculations in SQL</a:t>
+            </a:r>
+          </a:p>
+          <a:p>
+            <a:r>
+              <a:rPr lang="en-US" sz="2800" dirty="0"/>
+              <a:t>This is business logic that needs validation</a:t>
+            </a:r>
+          </a:p>
+          <a:p>
+            <a:r>
+              <a:rPr lang="en-US" sz="2800" dirty="0"/>
+              <a:t>Tests help ensure that the correct formula is used</a:t>
             </a:r>
           </a:p>
         </p:txBody>
@@ -10060,7 +10285,7 @@
     </p:spTree>
     <p:extLst>
       <p:ext uri="{BB962C8B-B14F-4D97-AF65-F5344CB8AC3E}">
-        <p14:creationId xmlns:p14="http://schemas.microsoft.com/office/powerpoint/2010/main" val="2479422556"/>
+        <p14:creationId xmlns:p14="http://schemas.microsoft.com/office/powerpoint/2010/main" val="2123700443"/>
       </p:ext>
     </p:extLst>
   </p:cSld>
@@ -10089,6 +10314,325 @@
       </p:grpSpPr>
       <p:sp>
         <p:nvSpPr>
+          <p:cNvPr id="4" name="Title 3"/>
+          <p:cNvSpPr>
+            <a:spLocks noGrp="1"/>
+          </p:cNvSpPr>
+          <p:nvPr>
+            <p:ph type="title"/>
+          </p:nvPr>
+        </p:nvSpPr>
+        <p:spPr/>
+        <p:txBody>
+          <a:bodyPr/>
+          <a:lstStyle/>
+          <a:p>
+            <a:r>
+              <a:rPr lang="en-US" dirty="0"/>
+              <a:t>Testing </a:t>
+            </a:r>
+            <a:r>
+              <a:rPr lang="en-US" dirty="0" err="1"/>
+              <a:t>CalcuLations</a:t>
+            </a:r>
+            <a:endParaRPr lang="en-US" dirty="0"/>
+          </a:p>
+        </p:txBody>
+      </p:sp>
+      <p:sp>
+        <p:nvSpPr>
+          <p:cNvPr id="5" name="Text Placeholder 4"/>
+          <p:cNvSpPr>
+            <a:spLocks noGrp="1"/>
+          </p:cNvSpPr>
+          <p:nvPr>
+            <p:ph type="body" idx="1"/>
+          </p:nvPr>
+        </p:nvSpPr>
+        <p:spPr/>
+        <p:txBody>
+          <a:bodyPr/>
+          <a:lstStyle/>
+          <a:p>
+            <a:r>
+              <a:rPr lang="en-US" dirty="0"/>
+              <a:t>Testing Code</a:t>
+            </a:r>
+          </a:p>
+        </p:txBody>
+      </p:sp>
+    </p:spTree>
+    <p:extLst>
+      <p:ext uri="{BB962C8B-B14F-4D97-AF65-F5344CB8AC3E}">
+        <p14:creationId xmlns:p14="http://schemas.microsoft.com/office/powerpoint/2010/main" val="1532090233"/>
+      </p:ext>
+    </p:extLst>
+  </p:cSld>
+  <p:clrMapOvr>
+    <a:masterClrMapping/>
+  </p:clrMapOvr>
+</p:sld>
+</file>
+
+<file path=ppt/slides/slide26.xml><?xml version="1.0" encoding="utf-8"?>
+<p:sld xmlns:a="http://schemas.openxmlformats.org/drawingml/2006/main" xmlns:r="http://schemas.openxmlformats.org/officeDocument/2006/relationships" xmlns:p="http://schemas.openxmlformats.org/presentationml/2006/main">
+  <p:cSld>
+    <p:spTree>
+      <p:nvGrpSpPr>
+        <p:cNvPr id="1" name=""/>
+        <p:cNvGrpSpPr/>
+        <p:nvPr/>
+      </p:nvGrpSpPr>
+      <p:grpSpPr>
+        <a:xfrm>
+          <a:off x="0" y="0"/>
+          <a:ext cx="0" cy="0"/>
+          <a:chOff x="0" y="0"/>
+          <a:chExt cx="0" cy="0"/>
+        </a:xfrm>
+      </p:grpSpPr>
+      <p:sp>
+        <p:nvSpPr>
+          <p:cNvPr id="2" name="Title 1"/>
+          <p:cNvSpPr>
+            <a:spLocks noGrp="1"/>
+          </p:cNvSpPr>
+          <p:nvPr>
+            <p:ph type="title"/>
+          </p:nvPr>
+        </p:nvSpPr>
+        <p:spPr/>
+        <p:txBody>
+          <a:bodyPr/>
+          <a:lstStyle/>
+          <a:p>
+            <a:r>
+              <a:rPr lang="en-US" dirty="0"/>
+              <a:t>Checking Boundaries</a:t>
+            </a:r>
+          </a:p>
+        </p:txBody>
+      </p:sp>
+      <p:sp>
+        <p:nvSpPr>
+          <p:cNvPr id="3" name="Content Placeholder 2"/>
+          <p:cNvSpPr>
+            <a:spLocks noGrp="1"/>
+          </p:cNvSpPr>
+          <p:nvPr>
+            <p:ph idx="1"/>
+          </p:nvPr>
+        </p:nvSpPr>
+        <p:spPr/>
+        <p:txBody>
+          <a:bodyPr/>
+          <a:lstStyle/>
+          <a:p>
+            <a:r>
+              <a:rPr lang="en-US" sz="2800" dirty="0"/>
+              <a:t>We often use CASE/SWITCH/IF logic</a:t>
+            </a:r>
+          </a:p>
+          <a:p>
+            <a:r>
+              <a:rPr lang="en-US" sz="2800" dirty="0"/>
+              <a:t>These can result in missing boundary conditions</a:t>
+            </a:r>
+          </a:p>
+        </p:txBody>
+      </p:sp>
+    </p:spTree>
+    <p:extLst>
+      <p:ext uri="{BB962C8B-B14F-4D97-AF65-F5344CB8AC3E}">
+        <p14:creationId xmlns:p14="http://schemas.microsoft.com/office/powerpoint/2010/main" val="987462211"/>
+      </p:ext>
+    </p:extLst>
+  </p:cSld>
+  <p:clrMapOvr>
+    <a:masterClrMapping/>
+  </p:clrMapOvr>
+</p:sld>
+</file>
+
+<file path=ppt/slides/slide27.xml><?xml version="1.0" encoding="utf-8"?>
+<p:sld xmlns:a="http://schemas.openxmlformats.org/drawingml/2006/main" xmlns:r="http://schemas.openxmlformats.org/officeDocument/2006/relationships" xmlns:p="http://schemas.openxmlformats.org/presentationml/2006/main">
+  <p:cSld>
+    <p:spTree>
+      <p:nvGrpSpPr>
+        <p:cNvPr id="1" name=""/>
+        <p:cNvGrpSpPr/>
+        <p:nvPr/>
+      </p:nvGrpSpPr>
+      <p:grpSpPr>
+        <a:xfrm>
+          <a:off x="0" y="0"/>
+          <a:ext cx="0" cy="0"/>
+          <a:chOff x="0" y="0"/>
+          <a:chExt cx="0" cy="0"/>
+        </a:xfrm>
+      </p:grpSpPr>
+      <p:sp>
+        <p:nvSpPr>
+          <p:cNvPr id="4" name="Title 3"/>
+          <p:cNvSpPr>
+            <a:spLocks noGrp="1"/>
+          </p:cNvSpPr>
+          <p:nvPr>
+            <p:ph type="title"/>
+          </p:nvPr>
+        </p:nvSpPr>
+        <p:spPr/>
+        <p:txBody>
+          <a:bodyPr/>
+          <a:lstStyle/>
+          <a:p>
+            <a:r>
+              <a:rPr lang="en-US" dirty="0"/>
+              <a:t>Checking Boundaries</a:t>
+            </a:r>
+          </a:p>
+        </p:txBody>
+      </p:sp>
+      <p:sp>
+        <p:nvSpPr>
+          <p:cNvPr id="5" name="Text Placeholder 4"/>
+          <p:cNvSpPr>
+            <a:spLocks noGrp="1"/>
+          </p:cNvSpPr>
+          <p:nvPr>
+            <p:ph type="body" idx="1"/>
+          </p:nvPr>
+        </p:nvSpPr>
+        <p:spPr/>
+        <p:txBody>
+          <a:bodyPr/>
+          <a:lstStyle/>
+          <a:p>
+            <a:r>
+              <a:rPr lang="en-US" dirty="0"/>
+              <a:t>Testing Code</a:t>
+            </a:r>
+          </a:p>
+        </p:txBody>
+      </p:sp>
+    </p:spTree>
+    <p:extLst>
+      <p:ext uri="{BB962C8B-B14F-4D97-AF65-F5344CB8AC3E}">
+        <p14:creationId xmlns:p14="http://schemas.microsoft.com/office/powerpoint/2010/main" val="1443834001"/>
+      </p:ext>
+    </p:extLst>
+  </p:cSld>
+  <p:clrMapOvr>
+    <a:masterClrMapping/>
+  </p:clrMapOvr>
+</p:sld>
+</file>
+
+<file path=ppt/slides/slide28.xml><?xml version="1.0" encoding="utf-8"?>
+<p:sld xmlns:a="http://schemas.openxmlformats.org/drawingml/2006/main" xmlns:r="http://schemas.openxmlformats.org/officeDocument/2006/relationships" xmlns:p="http://schemas.openxmlformats.org/presentationml/2006/main">
+  <p:cSld>
+    <p:spTree>
+      <p:nvGrpSpPr>
+        <p:cNvPr id="1" name=""/>
+        <p:cNvGrpSpPr/>
+        <p:nvPr/>
+      </p:nvGrpSpPr>
+      <p:grpSpPr>
+        <a:xfrm>
+          <a:off x="0" y="0"/>
+          <a:ext cx="0" cy="0"/>
+          <a:chOff x="0" y="0"/>
+          <a:chExt cx="0" cy="0"/>
+        </a:xfrm>
+      </p:grpSpPr>
+      <p:sp>
+        <p:nvSpPr>
+          <p:cNvPr id="2" name="Title 1"/>
+          <p:cNvSpPr>
+            <a:spLocks noGrp="1"/>
+          </p:cNvSpPr>
+          <p:nvPr>
+            <p:ph type="title"/>
+          </p:nvPr>
+        </p:nvSpPr>
+        <p:spPr/>
+        <p:txBody>
+          <a:bodyPr/>
+          <a:lstStyle/>
+          <a:p>
+            <a:r>
+              <a:rPr lang="en-US" dirty="0"/>
+              <a:t>Having a Test Suite</a:t>
+            </a:r>
+          </a:p>
+        </p:txBody>
+      </p:sp>
+      <p:sp>
+        <p:nvSpPr>
+          <p:cNvPr id="3" name="Content Placeholder 2"/>
+          <p:cNvSpPr>
+            <a:spLocks noGrp="1"/>
+          </p:cNvSpPr>
+          <p:nvPr>
+            <p:ph idx="1"/>
+          </p:nvPr>
+        </p:nvSpPr>
+        <p:spPr/>
+        <p:txBody>
+          <a:bodyPr/>
+          <a:lstStyle/>
+          <a:p>
+            <a:r>
+              <a:rPr lang="en-US" dirty="0"/>
+              <a:t>By continuing to grow your test suite with each change, developers spread the load</a:t>
+            </a:r>
+          </a:p>
+          <a:p>
+            <a:r>
+              <a:rPr lang="en-US" dirty="0"/>
+              <a:t>By having a large suite, we have better code coverage.</a:t>
+            </a:r>
+          </a:p>
+          <a:p>
+            <a:r>
+              <a:rPr lang="en-US" dirty="0"/>
+              <a:t>We can easily regression test.</a:t>
+            </a:r>
+          </a:p>
+        </p:txBody>
+      </p:sp>
+    </p:spTree>
+    <p:extLst>
+      <p:ext uri="{BB962C8B-B14F-4D97-AF65-F5344CB8AC3E}">
+        <p14:creationId xmlns:p14="http://schemas.microsoft.com/office/powerpoint/2010/main" val="2479422556"/>
+      </p:ext>
+    </p:extLst>
+  </p:cSld>
+  <p:clrMapOvr>
+    <a:masterClrMapping/>
+  </p:clrMapOvr>
+</p:sld>
+</file>
+
+<file path=ppt/slides/slide29.xml><?xml version="1.0" encoding="utf-8"?>
+<p:sld xmlns:a="http://schemas.openxmlformats.org/drawingml/2006/main" xmlns:r="http://schemas.openxmlformats.org/officeDocument/2006/relationships" xmlns:p="http://schemas.openxmlformats.org/presentationml/2006/main">
+  <p:cSld>
+    <p:spTree>
+      <p:nvGrpSpPr>
+        <p:cNvPr id="1" name=""/>
+        <p:cNvGrpSpPr/>
+        <p:nvPr/>
+      </p:nvGrpSpPr>
+      <p:grpSpPr>
+        <a:xfrm>
+          <a:off x="0" y="0"/>
+          <a:ext cx="0" cy="0"/>
+          <a:chOff x="0" y="0"/>
+          <a:chExt cx="0" cy="0"/>
+        </a:xfrm>
+      </p:grpSpPr>
+      <p:sp>
+        <p:nvSpPr>
           <p:cNvPr id="2" name="Title 1"/>
           <p:cNvSpPr>
             <a:spLocks noGrp="1"/>
@@ -10170,7 +10714,510 @@
 </p:sld>
 </file>
 
-<file path=ppt/slides/slide26.xml><?xml version="1.0" encoding="utf-8"?>
+<file path=ppt/slides/slide3.xml><?xml version="1.0" encoding="utf-8"?>
+<p:sld xmlns:a="http://schemas.openxmlformats.org/drawingml/2006/main" xmlns:r="http://schemas.openxmlformats.org/officeDocument/2006/relationships" xmlns:p="http://schemas.openxmlformats.org/presentationml/2006/main">
+  <p:cSld>
+    <p:spTree>
+      <p:nvGrpSpPr>
+        <p:cNvPr id="1" name=""/>
+        <p:cNvGrpSpPr/>
+        <p:nvPr/>
+      </p:nvGrpSpPr>
+      <p:grpSpPr>
+        <a:xfrm>
+          <a:off x="0" y="0"/>
+          <a:ext cx="0" cy="0"/>
+          <a:chOff x="0" y="0"/>
+          <a:chExt cx="0" cy="0"/>
+        </a:xfrm>
+      </p:grpSpPr>
+      <p:sp>
+        <p:nvSpPr>
+          <p:cNvPr id="2" name="Title 1"/>
+          <p:cNvSpPr>
+            <a:spLocks noGrp="1"/>
+          </p:cNvSpPr>
+          <p:nvPr>
+            <p:ph type="title"/>
+          </p:nvPr>
+        </p:nvSpPr>
+        <p:spPr>
+          <a:prstGeom prst="rect">
+            <a:avLst/>
+          </a:prstGeom>
+        </p:spPr>
+        <p:txBody>
+          <a:bodyPr>
+            <a:normAutofit/>
+          </a:bodyPr>
+          <a:lstStyle/>
+          <a:p>
+            <a:r>
+              <a:rPr lang="en-US" sz="3600" dirty="0"/>
+              <a:t>Who am I?</a:t>
+            </a:r>
+          </a:p>
+        </p:txBody>
+      </p:sp>
+      <p:sp>
+        <p:nvSpPr>
+          <p:cNvPr id="18" name="Rectangle 17"/>
+          <p:cNvSpPr/>
+          <p:nvPr/>
+        </p:nvSpPr>
+        <p:spPr>
+          <a:xfrm>
+            <a:off x="4225931" y="2916568"/>
+            <a:ext cx="3973501" cy="507831"/>
+          </a:xfrm>
+          <a:prstGeom prst="rect">
+            <a:avLst/>
+          </a:prstGeom>
+        </p:spPr>
+        <p:txBody>
+          <a:bodyPr wrap="square">
+            <a:spAutoFit/>
+          </a:bodyPr>
+          <a:lstStyle/>
+          <a:p>
+            <a:pPr>
+              <a:spcAft>
+                <a:spcPts val="2700"/>
+              </a:spcAft>
+            </a:pPr>
+            <a:r>
+              <a:rPr lang="en-US" sz="2700" dirty="0">
+                <a:solidFill>
+                  <a:schemeClr val="tx1">
+                    <a:lumMod val="50000"/>
+                    <a:lumOff val="50000"/>
+                  </a:schemeClr>
+                </a:solidFill>
+                <a:latin typeface="Microsoft Sans Serif" panose="020B0604020202020204" pitchFamily="34" charset="0"/>
+              </a:rPr>
+              <a:t>www.voiceofthedba.com</a:t>
+            </a:r>
+          </a:p>
+        </p:txBody>
+      </p:sp>
+      <p:sp>
+        <p:nvSpPr>
+          <p:cNvPr id="19" name="Rectangle 18"/>
+          <p:cNvSpPr/>
+          <p:nvPr/>
+        </p:nvSpPr>
+        <p:spPr>
+          <a:xfrm>
+            <a:off x="4225929" y="3617043"/>
+            <a:ext cx="4460872" cy="461665"/>
+          </a:xfrm>
+          <a:prstGeom prst="rect">
+            <a:avLst/>
+          </a:prstGeom>
+        </p:spPr>
+        <p:txBody>
+          <a:bodyPr wrap="square">
+            <a:spAutoFit/>
+          </a:bodyPr>
+          <a:lstStyle/>
+          <a:p>
+            <a:pPr>
+              <a:spcAft>
+                <a:spcPts val="2700"/>
+              </a:spcAft>
+            </a:pPr>
+            <a:r>
+              <a:rPr lang="en-US" sz="2400" dirty="0" err="1">
+                <a:solidFill>
+                  <a:schemeClr val="tx1">
+                    <a:lumMod val="50000"/>
+                    <a:lumOff val="50000"/>
+                  </a:schemeClr>
+                </a:solidFill>
+                <a:latin typeface="Microsoft Sans Serif" panose="020B0604020202020204" pitchFamily="34" charset="0"/>
+              </a:rPr>
+              <a:t>sjones@sqlservercentral.com</a:t>
+            </a:r>
+            <a:endParaRPr lang="en-US" sz="2400" dirty="0">
+              <a:solidFill>
+                <a:schemeClr val="tx1">
+                  <a:lumMod val="50000"/>
+                  <a:lumOff val="50000"/>
+                </a:schemeClr>
+              </a:solidFill>
+              <a:latin typeface="Microsoft Sans Serif" panose="020B0604020202020204" pitchFamily="34" charset="0"/>
+            </a:endParaRPr>
+          </a:p>
+        </p:txBody>
+      </p:sp>
+      <p:sp>
+        <p:nvSpPr>
+          <p:cNvPr id="20" name="Rectangle 19"/>
+          <p:cNvSpPr/>
+          <p:nvPr/>
+        </p:nvSpPr>
+        <p:spPr>
+          <a:xfrm>
+            <a:off x="4225929" y="4300454"/>
+            <a:ext cx="3560770" cy="507831"/>
+          </a:xfrm>
+          <a:prstGeom prst="rect">
+            <a:avLst/>
+          </a:prstGeom>
+        </p:spPr>
+        <p:txBody>
+          <a:bodyPr wrap="square">
+            <a:spAutoFit/>
+          </a:bodyPr>
+          <a:lstStyle/>
+          <a:p>
+            <a:pPr>
+              <a:spcAft>
+                <a:spcPts val="2700"/>
+              </a:spcAft>
+            </a:pPr>
+            <a:r>
+              <a:rPr lang="en-US" sz="2700" dirty="0">
+                <a:solidFill>
+                  <a:schemeClr val="tx1">
+                    <a:lumMod val="50000"/>
+                    <a:lumOff val="50000"/>
+                  </a:schemeClr>
+                </a:solidFill>
+                <a:latin typeface="Microsoft Sans Serif" panose="020B0604020202020204" pitchFamily="34" charset="0"/>
+              </a:rPr>
+              <a:t>@way0utwest</a:t>
+            </a:r>
+          </a:p>
+        </p:txBody>
+      </p:sp>
+      <p:sp>
+        <p:nvSpPr>
+          <p:cNvPr id="21" name="TextBox 20"/>
+          <p:cNvSpPr txBox="1"/>
+          <p:nvPr/>
+        </p:nvSpPr>
+        <p:spPr>
+          <a:xfrm>
+            <a:off x="3547726" y="1379469"/>
+            <a:ext cx="5310524" cy="1138773"/>
+          </a:xfrm>
+          <a:prstGeom prst="rect">
+            <a:avLst/>
+          </a:prstGeom>
+          <a:noFill/>
+        </p:spPr>
+        <p:txBody>
+          <a:bodyPr wrap="square" rtlCol="0">
+            <a:spAutoFit/>
+          </a:bodyPr>
+          <a:lstStyle/>
+          <a:p>
+            <a:r>
+              <a:rPr lang="en-US" sz="2800" b="1" dirty="0">
+                <a:solidFill>
+                  <a:srgbClr val="CC0000"/>
+                </a:solidFill>
+                <a:latin typeface="Arial"/>
+                <a:cs typeface="Arial"/>
+              </a:rPr>
+              <a:t>Steve Jones</a:t>
+            </a:r>
+          </a:p>
+          <a:p>
+            <a:r>
+              <a:rPr lang="en-US" sz="2000" b="1" dirty="0" err="1">
+                <a:solidFill>
+                  <a:srgbClr val="CC0000"/>
+                </a:solidFill>
+                <a:latin typeface="Arial"/>
+                <a:cs typeface="Arial"/>
+              </a:rPr>
+              <a:t>SQLServerCentral</a:t>
+            </a:r>
+            <a:r>
+              <a:rPr lang="en-US" sz="2000" b="1" dirty="0">
+                <a:solidFill>
+                  <a:srgbClr val="CC0000"/>
+                </a:solidFill>
+                <a:latin typeface="Arial"/>
+                <a:cs typeface="Arial"/>
+              </a:rPr>
+              <a:t> founder</a:t>
+            </a:r>
+          </a:p>
+          <a:p>
+            <a:r>
+              <a:rPr lang="en-US" sz="2000" b="1" dirty="0" err="1">
+                <a:solidFill>
+                  <a:srgbClr val="CC0000"/>
+                </a:solidFill>
+                <a:latin typeface="Arial"/>
+                <a:cs typeface="Arial"/>
+              </a:rPr>
+              <a:t>Redgate</a:t>
+            </a:r>
+            <a:r>
+              <a:rPr lang="en-US" sz="2000" b="1" dirty="0">
+                <a:solidFill>
+                  <a:srgbClr val="CC0000"/>
+                </a:solidFill>
+                <a:latin typeface="Arial"/>
+                <a:cs typeface="Arial"/>
+              </a:rPr>
+              <a:t> Software Evangelist</a:t>
+            </a:r>
+          </a:p>
+        </p:txBody>
+      </p:sp>
+      <p:pic>
+        <p:nvPicPr>
+          <p:cNvPr id="22" name="Picture 21"/>
+          <p:cNvPicPr>
+            <a:picLocks noChangeAspect="1"/>
+          </p:cNvPicPr>
+          <p:nvPr/>
+        </p:nvPicPr>
+        <p:blipFill>
+          <a:blip r:embed="rId3"/>
+          <a:stretch>
+            <a:fillRect/>
+          </a:stretch>
+        </p:blipFill>
+        <p:spPr>
+          <a:xfrm>
+            <a:off x="3655052" y="2946524"/>
+            <a:ext cx="434779" cy="478257"/>
+          </a:xfrm>
+          <a:prstGeom prst="rect">
+            <a:avLst/>
+          </a:prstGeom>
+        </p:spPr>
+      </p:pic>
+      <p:pic>
+        <p:nvPicPr>
+          <p:cNvPr id="23" name="Picture 22"/>
+          <p:cNvPicPr>
+            <a:picLocks noChangeAspect="1"/>
+          </p:cNvPicPr>
+          <p:nvPr/>
+        </p:nvPicPr>
+        <p:blipFill>
+          <a:blip r:embed="rId4"/>
+          <a:stretch>
+            <a:fillRect/>
+          </a:stretch>
+        </p:blipFill>
+        <p:spPr>
+          <a:xfrm>
+            <a:off x="3655052" y="3712291"/>
+            <a:ext cx="463485" cy="379214"/>
+          </a:xfrm>
+          <a:prstGeom prst="rect">
+            <a:avLst/>
+          </a:prstGeom>
+        </p:spPr>
+      </p:pic>
+      <p:pic>
+        <p:nvPicPr>
+          <p:cNvPr id="24" name="Picture 23"/>
+          <p:cNvPicPr>
+            <a:picLocks noChangeAspect="1"/>
+          </p:cNvPicPr>
+          <p:nvPr/>
+        </p:nvPicPr>
+        <p:blipFill>
+          <a:blip r:embed="rId5"/>
+          <a:stretch>
+            <a:fillRect/>
+          </a:stretch>
+        </p:blipFill>
+        <p:spPr>
+          <a:xfrm>
+            <a:off x="3655050" y="4338552"/>
+            <a:ext cx="504842" cy="462772"/>
+          </a:xfrm>
+          <a:prstGeom prst="rect">
+            <a:avLst/>
+          </a:prstGeom>
+        </p:spPr>
+      </p:pic>
+      <p:pic>
+        <p:nvPicPr>
+          <p:cNvPr id="3" name="Picture 2"/>
+          <p:cNvPicPr>
+            <a:picLocks noChangeAspect="1"/>
+          </p:cNvPicPr>
+          <p:nvPr/>
+        </p:nvPicPr>
+        <p:blipFill>
+          <a:blip r:embed="rId6" cstate="print">
+            <a:extLst>
+              <a:ext uri="{28A0092B-C50C-407E-A947-70E740481C1C}">
+                <a14:useLocalDpi xmlns:a14="http://schemas.microsoft.com/office/drawing/2010/main" val="0"/>
+              </a:ext>
+            </a:extLst>
+          </a:blip>
+          <a:stretch>
+            <a:fillRect/>
+          </a:stretch>
+        </p:blipFill>
+        <p:spPr>
+          <a:xfrm>
+            <a:off x="3655050" y="4971400"/>
+            <a:ext cx="495926" cy="495926"/>
+          </a:xfrm>
+          <a:prstGeom prst="rect">
+            <a:avLst/>
+          </a:prstGeom>
+        </p:spPr>
+      </p:pic>
+      <p:sp>
+        <p:nvSpPr>
+          <p:cNvPr id="4" name="TextBox 3"/>
+          <p:cNvSpPr txBox="1"/>
+          <p:nvPr/>
+        </p:nvSpPr>
+        <p:spPr>
+          <a:xfrm>
+            <a:off x="4225931" y="4971401"/>
+            <a:ext cx="3006223" cy="507831"/>
+          </a:xfrm>
+          <a:prstGeom prst="rect">
+            <a:avLst/>
+          </a:prstGeom>
+          <a:noFill/>
+        </p:spPr>
+        <p:txBody>
+          <a:bodyPr wrap="square" rtlCol="0">
+            <a:spAutoFit/>
+          </a:bodyPr>
+          <a:lstStyle/>
+          <a:p>
+            <a:pPr>
+              <a:spcAft>
+                <a:spcPts val="2700"/>
+              </a:spcAft>
+            </a:pPr>
+            <a:r>
+              <a:rPr lang="en-US" sz="2700" dirty="0">
+                <a:solidFill>
+                  <a:schemeClr val="tx1">
+                    <a:lumMod val="50000"/>
+                    <a:lumOff val="50000"/>
+                  </a:schemeClr>
+                </a:solidFill>
+                <a:latin typeface="Microsoft Sans Serif" panose="020B0604020202020204" pitchFamily="34" charset="0"/>
+              </a:rPr>
+              <a:t>/in/way0utwest</a:t>
+            </a:r>
+          </a:p>
+        </p:txBody>
+      </p:sp>
+      <p:pic>
+        <p:nvPicPr>
+          <p:cNvPr id="13" name="Picture 12"/>
+          <p:cNvPicPr>
+            <a:picLocks noChangeAspect="1"/>
+          </p:cNvPicPr>
+          <p:nvPr/>
+        </p:nvPicPr>
+        <p:blipFill>
+          <a:blip r:embed="rId7">
+            <a:extLst>
+              <a:ext uri="{28A0092B-C50C-407E-A947-70E740481C1C}">
+                <a14:useLocalDpi xmlns:a14="http://schemas.microsoft.com/office/drawing/2010/main" val="0"/>
+              </a:ext>
+            </a:extLst>
+          </a:blip>
+          <a:stretch>
+            <a:fillRect/>
+          </a:stretch>
+        </p:blipFill>
+        <p:spPr>
+          <a:xfrm>
+            <a:off x="7232154" y="4808285"/>
+            <a:ext cx="1511111" cy="533333"/>
+          </a:xfrm>
+          <a:prstGeom prst="rect">
+            <a:avLst/>
+          </a:prstGeom>
+        </p:spPr>
+      </p:pic>
+      <p:pic>
+        <p:nvPicPr>
+          <p:cNvPr id="14" name="Picture 13"/>
+          <p:cNvPicPr>
+            <a:picLocks noChangeAspect="1"/>
+          </p:cNvPicPr>
+          <p:nvPr/>
+        </p:nvPicPr>
+        <p:blipFill>
+          <a:blip r:embed="rId8">
+            <a:extLst>
+              <a:ext uri="{28A0092B-C50C-407E-A947-70E740481C1C}">
+                <a14:useLocalDpi xmlns:a14="http://schemas.microsoft.com/office/drawing/2010/main" val="0"/>
+              </a:ext>
+            </a:extLst>
+          </a:blip>
+          <a:stretch>
+            <a:fillRect/>
+          </a:stretch>
+        </p:blipFill>
+        <p:spPr>
+          <a:xfrm>
+            <a:off x="786119" y="4631413"/>
+            <a:ext cx="2191683" cy="776221"/>
+          </a:xfrm>
+          <a:prstGeom prst="rect">
+            <a:avLst/>
+          </a:prstGeom>
+        </p:spPr>
+      </p:pic>
+      <p:pic>
+        <p:nvPicPr>
+          <p:cNvPr id="5" name="Picture 4"/>
+          <p:cNvPicPr>
+            <a:picLocks noChangeAspect="1"/>
+          </p:cNvPicPr>
+          <p:nvPr/>
+        </p:nvPicPr>
+        <p:blipFill>
+          <a:blip r:embed="rId9">
+            <a:extLst>
+              <a:ext uri="{28A0092B-C50C-407E-A947-70E740481C1C}">
+                <a14:useLocalDpi xmlns:a14="http://schemas.microsoft.com/office/drawing/2010/main" val="0"/>
+              </a:ext>
+            </a:extLst>
+          </a:blip>
+          <a:stretch>
+            <a:fillRect/>
+          </a:stretch>
+        </p:blipFill>
+        <p:spPr>
+          <a:xfrm>
+            <a:off x="1073692" y="2260653"/>
+            <a:ext cx="1428572" cy="1850000"/>
+          </a:xfrm>
+          <a:prstGeom prst="rect">
+            <a:avLst/>
+          </a:prstGeom>
+        </p:spPr>
+      </p:pic>
+    </p:spTree>
+    <p:extLst>
+      <p:ext uri="{BB962C8B-B14F-4D97-AF65-F5344CB8AC3E}">
+        <p14:creationId xmlns:p14="http://schemas.microsoft.com/office/powerpoint/2010/main" val="699138362"/>
+      </p:ext>
+    </p:extLst>
+  </p:cSld>
+  <p:clrMapOvr>
+    <a:masterClrMapping/>
+  </p:clrMapOvr>
+</p:sld>
+</file>
+
+<file path=ppt/slides/slide30.xml><?xml version="1.0" encoding="utf-8"?>
 <p:sld xmlns:a="http://schemas.openxmlformats.org/drawingml/2006/main" xmlns:r="http://schemas.openxmlformats.org/officeDocument/2006/relationships" xmlns:p="http://schemas.openxmlformats.org/presentationml/2006/main">
   <p:cSld>
     <p:spTree>
@@ -10763,7 +11810,7 @@
 </p:sld>
 </file>
 
-<file path=ppt/slides/slide27.xml><?xml version="1.0" encoding="utf-8"?>
+<file path=ppt/slides/slide31.xml><?xml version="1.0" encoding="utf-8"?>
 <p:sld xmlns:a="http://schemas.openxmlformats.org/drawingml/2006/main" xmlns:r="http://schemas.openxmlformats.org/officeDocument/2006/relationships" xmlns:p="http://schemas.openxmlformats.org/presentationml/2006/main">
   <p:cSld>
     <p:spTree>
@@ -10861,7 +11908,7 @@
 </p:sld>
 </file>
 
-<file path=ppt/slides/slide28.xml><?xml version="1.0" encoding="utf-8"?>
+<file path=ppt/slides/slide32.xml><?xml version="1.0" encoding="utf-8"?>
 <p:sld xmlns:a="http://schemas.openxmlformats.org/drawingml/2006/main" xmlns:r="http://schemas.openxmlformats.org/officeDocument/2006/relationships" xmlns:p="http://schemas.openxmlformats.org/presentationml/2006/main">
   <p:cSld>
     <p:spTree>
@@ -10949,509 +11996,6 @@
     <p:extLst>
       <p:ext uri="{BB962C8B-B14F-4D97-AF65-F5344CB8AC3E}">
         <p14:creationId xmlns:p14="http://schemas.microsoft.com/office/powerpoint/2010/main" val="2354176993"/>
-      </p:ext>
-    </p:extLst>
-  </p:cSld>
-  <p:clrMapOvr>
-    <a:masterClrMapping/>
-  </p:clrMapOvr>
-</p:sld>
-</file>
-
-<file path=ppt/slides/slide3.xml><?xml version="1.0" encoding="utf-8"?>
-<p:sld xmlns:a="http://schemas.openxmlformats.org/drawingml/2006/main" xmlns:r="http://schemas.openxmlformats.org/officeDocument/2006/relationships" xmlns:p="http://schemas.openxmlformats.org/presentationml/2006/main">
-  <p:cSld>
-    <p:spTree>
-      <p:nvGrpSpPr>
-        <p:cNvPr id="1" name=""/>
-        <p:cNvGrpSpPr/>
-        <p:nvPr/>
-      </p:nvGrpSpPr>
-      <p:grpSpPr>
-        <a:xfrm>
-          <a:off x="0" y="0"/>
-          <a:ext cx="0" cy="0"/>
-          <a:chOff x="0" y="0"/>
-          <a:chExt cx="0" cy="0"/>
-        </a:xfrm>
-      </p:grpSpPr>
-      <p:sp>
-        <p:nvSpPr>
-          <p:cNvPr id="2" name="Title 1"/>
-          <p:cNvSpPr>
-            <a:spLocks noGrp="1"/>
-          </p:cNvSpPr>
-          <p:nvPr>
-            <p:ph type="title"/>
-          </p:nvPr>
-        </p:nvSpPr>
-        <p:spPr>
-          <a:prstGeom prst="rect">
-            <a:avLst/>
-          </a:prstGeom>
-        </p:spPr>
-        <p:txBody>
-          <a:bodyPr>
-            <a:normAutofit/>
-          </a:bodyPr>
-          <a:lstStyle/>
-          <a:p>
-            <a:r>
-              <a:rPr lang="en-US" sz="3600" dirty="0"/>
-              <a:t>Who am I?</a:t>
-            </a:r>
-          </a:p>
-        </p:txBody>
-      </p:sp>
-      <p:sp>
-        <p:nvSpPr>
-          <p:cNvPr id="18" name="Rectangle 17"/>
-          <p:cNvSpPr/>
-          <p:nvPr/>
-        </p:nvSpPr>
-        <p:spPr>
-          <a:xfrm>
-            <a:off x="4225931" y="2916568"/>
-            <a:ext cx="3973501" cy="507831"/>
-          </a:xfrm>
-          <a:prstGeom prst="rect">
-            <a:avLst/>
-          </a:prstGeom>
-        </p:spPr>
-        <p:txBody>
-          <a:bodyPr wrap="square">
-            <a:spAutoFit/>
-          </a:bodyPr>
-          <a:lstStyle/>
-          <a:p>
-            <a:pPr>
-              <a:spcAft>
-                <a:spcPts val="2700"/>
-              </a:spcAft>
-            </a:pPr>
-            <a:r>
-              <a:rPr lang="en-US" sz="2700" dirty="0">
-                <a:solidFill>
-                  <a:schemeClr val="tx1">
-                    <a:lumMod val="50000"/>
-                    <a:lumOff val="50000"/>
-                  </a:schemeClr>
-                </a:solidFill>
-                <a:latin typeface="Microsoft Sans Serif" panose="020B0604020202020204" pitchFamily="34" charset="0"/>
-              </a:rPr>
-              <a:t>www.voiceofthedba.com</a:t>
-            </a:r>
-          </a:p>
-        </p:txBody>
-      </p:sp>
-      <p:sp>
-        <p:nvSpPr>
-          <p:cNvPr id="19" name="Rectangle 18"/>
-          <p:cNvSpPr/>
-          <p:nvPr/>
-        </p:nvSpPr>
-        <p:spPr>
-          <a:xfrm>
-            <a:off x="4225929" y="3617043"/>
-            <a:ext cx="4460872" cy="461665"/>
-          </a:xfrm>
-          <a:prstGeom prst="rect">
-            <a:avLst/>
-          </a:prstGeom>
-        </p:spPr>
-        <p:txBody>
-          <a:bodyPr wrap="square">
-            <a:spAutoFit/>
-          </a:bodyPr>
-          <a:lstStyle/>
-          <a:p>
-            <a:pPr>
-              <a:spcAft>
-                <a:spcPts val="2700"/>
-              </a:spcAft>
-            </a:pPr>
-            <a:r>
-              <a:rPr lang="en-US" sz="2400" dirty="0" err="1">
-                <a:solidFill>
-                  <a:schemeClr val="tx1">
-                    <a:lumMod val="50000"/>
-                    <a:lumOff val="50000"/>
-                  </a:schemeClr>
-                </a:solidFill>
-                <a:latin typeface="Microsoft Sans Serif" panose="020B0604020202020204" pitchFamily="34" charset="0"/>
-              </a:rPr>
-              <a:t>sjones@sqlservercentral.com</a:t>
-            </a:r>
-            <a:endParaRPr lang="en-US" sz="2400" dirty="0">
-              <a:solidFill>
-                <a:schemeClr val="tx1">
-                  <a:lumMod val="50000"/>
-                  <a:lumOff val="50000"/>
-                </a:schemeClr>
-              </a:solidFill>
-              <a:latin typeface="Microsoft Sans Serif" panose="020B0604020202020204" pitchFamily="34" charset="0"/>
-            </a:endParaRPr>
-          </a:p>
-        </p:txBody>
-      </p:sp>
-      <p:sp>
-        <p:nvSpPr>
-          <p:cNvPr id="20" name="Rectangle 19"/>
-          <p:cNvSpPr/>
-          <p:nvPr/>
-        </p:nvSpPr>
-        <p:spPr>
-          <a:xfrm>
-            <a:off x="4225929" y="4300454"/>
-            <a:ext cx="3560770" cy="507831"/>
-          </a:xfrm>
-          <a:prstGeom prst="rect">
-            <a:avLst/>
-          </a:prstGeom>
-        </p:spPr>
-        <p:txBody>
-          <a:bodyPr wrap="square">
-            <a:spAutoFit/>
-          </a:bodyPr>
-          <a:lstStyle/>
-          <a:p>
-            <a:pPr>
-              <a:spcAft>
-                <a:spcPts val="2700"/>
-              </a:spcAft>
-            </a:pPr>
-            <a:r>
-              <a:rPr lang="en-US" sz="2700" dirty="0">
-                <a:solidFill>
-                  <a:schemeClr val="tx1">
-                    <a:lumMod val="50000"/>
-                    <a:lumOff val="50000"/>
-                  </a:schemeClr>
-                </a:solidFill>
-                <a:latin typeface="Microsoft Sans Serif" panose="020B0604020202020204" pitchFamily="34" charset="0"/>
-              </a:rPr>
-              <a:t>@way0utwest</a:t>
-            </a:r>
-          </a:p>
-        </p:txBody>
-      </p:sp>
-      <p:sp>
-        <p:nvSpPr>
-          <p:cNvPr id="21" name="TextBox 20"/>
-          <p:cNvSpPr txBox="1"/>
-          <p:nvPr/>
-        </p:nvSpPr>
-        <p:spPr>
-          <a:xfrm>
-            <a:off x="3547726" y="1379469"/>
-            <a:ext cx="5310524" cy="1138773"/>
-          </a:xfrm>
-          <a:prstGeom prst="rect">
-            <a:avLst/>
-          </a:prstGeom>
-          <a:noFill/>
-        </p:spPr>
-        <p:txBody>
-          <a:bodyPr wrap="square" rtlCol="0">
-            <a:spAutoFit/>
-          </a:bodyPr>
-          <a:lstStyle/>
-          <a:p>
-            <a:r>
-              <a:rPr lang="en-US" sz="2800" b="1" dirty="0">
-                <a:solidFill>
-                  <a:srgbClr val="CC0000"/>
-                </a:solidFill>
-                <a:latin typeface="Arial"/>
-                <a:cs typeface="Arial"/>
-              </a:rPr>
-              <a:t>Steve Jones</a:t>
-            </a:r>
-          </a:p>
-          <a:p>
-            <a:r>
-              <a:rPr lang="en-US" sz="2000" b="1" dirty="0" err="1">
-                <a:solidFill>
-                  <a:srgbClr val="CC0000"/>
-                </a:solidFill>
-                <a:latin typeface="Arial"/>
-                <a:cs typeface="Arial"/>
-              </a:rPr>
-              <a:t>SQLServerCentral</a:t>
-            </a:r>
-            <a:r>
-              <a:rPr lang="en-US" sz="2000" b="1" dirty="0">
-                <a:solidFill>
-                  <a:srgbClr val="CC0000"/>
-                </a:solidFill>
-                <a:latin typeface="Arial"/>
-                <a:cs typeface="Arial"/>
-              </a:rPr>
-              <a:t> founder</a:t>
-            </a:r>
-          </a:p>
-          <a:p>
-            <a:r>
-              <a:rPr lang="en-US" sz="2000" b="1" dirty="0" err="1">
-                <a:solidFill>
-                  <a:srgbClr val="CC0000"/>
-                </a:solidFill>
-                <a:latin typeface="Arial"/>
-                <a:cs typeface="Arial"/>
-              </a:rPr>
-              <a:t>Redgate</a:t>
-            </a:r>
-            <a:r>
-              <a:rPr lang="en-US" sz="2000" b="1" dirty="0">
-                <a:solidFill>
-                  <a:srgbClr val="CC0000"/>
-                </a:solidFill>
-                <a:latin typeface="Arial"/>
-                <a:cs typeface="Arial"/>
-              </a:rPr>
-              <a:t> Software Evangelist</a:t>
-            </a:r>
-          </a:p>
-        </p:txBody>
-      </p:sp>
-      <p:pic>
-        <p:nvPicPr>
-          <p:cNvPr id="22" name="Picture 21"/>
-          <p:cNvPicPr>
-            <a:picLocks noChangeAspect="1"/>
-          </p:cNvPicPr>
-          <p:nvPr/>
-        </p:nvPicPr>
-        <p:blipFill>
-          <a:blip r:embed="rId3"/>
-          <a:stretch>
-            <a:fillRect/>
-          </a:stretch>
-        </p:blipFill>
-        <p:spPr>
-          <a:xfrm>
-            <a:off x="3655052" y="2946524"/>
-            <a:ext cx="434779" cy="478257"/>
-          </a:xfrm>
-          <a:prstGeom prst="rect">
-            <a:avLst/>
-          </a:prstGeom>
-        </p:spPr>
-      </p:pic>
-      <p:pic>
-        <p:nvPicPr>
-          <p:cNvPr id="23" name="Picture 22"/>
-          <p:cNvPicPr>
-            <a:picLocks noChangeAspect="1"/>
-          </p:cNvPicPr>
-          <p:nvPr/>
-        </p:nvPicPr>
-        <p:blipFill>
-          <a:blip r:embed="rId4"/>
-          <a:stretch>
-            <a:fillRect/>
-          </a:stretch>
-        </p:blipFill>
-        <p:spPr>
-          <a:xfrm>
-            <a:off x="3655052" y="3712291"/>
-            <a:ext cx="463485" cy="379214"/>
-          </a:xfrm>
-          <a:prstGeom prst="rect">
-            <a:avLst/>
-          </a:prstGeom>
-        </p:spPr>
-      </p:pic>
-      <p:pic>
-        <p:nvPicPr>
-          <p:cNvPr id="24" name="Picture 23"/>
-          <p:cNvPicPr>
-            <a:picLocks noChangeAspect="1"/>
-          </p:cNvPicPr>
-          <p:nvPr/>
-        </p:nvPicPr>
-        <p:blipFill>
-          <a:blip r:embed="rId5"/>
-          <a:stretch>
-            <a:fillRect/>
-          </a:stretch>
-        </p:blipFill>
-        <p:spPr>
-          <a:xfrm>
-            <a:off x="3655050" y="4338552"/>
-            <a:ext cx="504842" cy="462772"/>
-          </a:xfrm>
-          <a:prstGeom prst="rect">
-            <a:avLst/>
-          </a:prstGeom>
-        </p:spPr>
-      </p:pic>
-      <p:pic>
-        <p:nvPicPr>
-          <p:cNvPr id="3" name="Picture 2"/>
-          <p:cNvPicPr>
-            <a:picLocks noChangeAspect="1"/>
-          </p:cNvPicPr>
-          <p:nvPr/>
-        </p:nvPicPr>
-        <p:blipFill>
-          <a:blip r:embed="rId6" cstate="print">
-            <a:extLst>
-              <a:ext uri="{28A0092B-C50C-407E-A947-70E740481C1C}">
-                <a14:useLocalDpi xmlns:a14="http://schemas.microsoft.com/office/drawing/2010/main" val="0"/>
-              </a:ext>
-            </a:extLst>
-          </a:blip>
-          <a:stretch>
-            <a:fillRect/>
-          </a:stretch>
-        </p:blipFill>
-        <p:spPr>
-          <a:xfrm>
-            <a:off x="3655050" y="4971400"/>
-            <a:ext cx="495926" cy="495926"/>
-          </a:xfrm>
-          <a:prstGeom prst="rect">
-            <a:avLst/>
-          </a:prstGeom>
-        </p:spPr>
-      </p:pic>
-      <p:sp>
-        <p:nvSpPr>
-          <p:cNvPr id="4" name="TextBox 3"/>
-          <p:cNvSpPr txBox="1"/>
-          <p:nvPr/>
-        </p:nvSpPr>
-        <p:spPr>
-          <a:xfrm>
-            <a:off x="4225931" y="4971401"/>
-            <a:ext cx="3006223" cy="507831"/>
-          </a:xfrm>
-          <a:prstGeom prst="rect">
-            <a:avLst/>
-          </a:prstGeom>
-          <a:noFill/>
-        </p:spPr>
-        <p:txBody>
-          <a:bodyPr wrap="square" rtlCol="0">
-            <a:spAutoFit/>
-          </a:bodyPr>
-          <a:lstStyle/>
-          <a:p>
-            <a:pPr>
-              <a:spcAft>
-                <a:spcPts val="2700"/>
-              </a:spcAft>
-            </a:pPr>
-            <a:r>
-              <a:rPr lang="en-US" sz="2700" dirty="0">
-                <a:solidFill>
-                  <a:schemeClr val="tx1">
-                    <a:lumMod val="50000"/>
-                    <a:lumOff val="50000"/>
-                  </a:schemeClr>
-                </a:solidFill>
-                <a:latin typeface="Microsoft Sans Serif" panose="020B0604020202020204" pitchFamily="34" charset="0"/>
-              </a:rPr>
-              <a:t>/in/way0utwest</a:t>
-            </a:r>
-          </a:p>
-        </p:txBody>
-      </p:sp>
-      <p:pic>
-        <p:nvPicPr>
-          <p:cNvPr id="13" name="Picture 12"/>
-          <p:cNvPicPr>
-            <a:picLocks noChangeAspect="1"/>
-          </p:cNvPicPr>
-          <p:nvPr/>
-        </p:nvPicPr>
-        <p:blipFill>
-          <a:blip r:embed="rId7">
-            <a:extLst>
-              <a:ext uri="{28A0092B-C50C-407E-A947-70E740481C1C}">
-                <a14:useLocalDpi xmlns:a14="http://schemas.microsoft.com/office/drawing/2010/main" val="0"/>
-              </a:ext>
-            </a:extLst>
-          </a:blip>
-          <a:stretch>
-            <a:fillRect/>
-          </a:stretch>
-        </p:blipFill>
-        <p:spPr>
-          <a:xfrm>
-            <a:off x="7232154" y="4808285"/>
-            <a:ext cx="1511111" cy="533333"/>
-          </a:xfrm>
-          <a:prstGeom prst="rect">
-            <a:avLst/>
-          </a:prstGeom>
-        </p:spPr>
-      </p:pic>
-      <p:pic>
-        <p:nvPicPr>
-          <p:cNvPr id="14" name="Picture 13"/>
-          <p:cNvPicPr>
-            <a:picLocks noChangeAspect="1"/>
-          </p:cNvPicPr>
-          <p:nvPr/>
-        </p:nvPicPr>
-        <p:blipFill>
-          <a:blip r:embed="rId8">
-            <a:extLst>
-              <a:ext uri="{28A0092B-C50C-407E-A947-70E740481C1C}">
-                <a14:useLocalDpi xmlns:a14="http://schemas.microsoft.com/office/drawing/2010/main" val="0"/>
-              </a:ext>
-            </a:extLst>
-          </a:blip>
-          <a:stretch>
-            <a:fillRect/>
-          </a:stretch>
-        </p:blipFill>
-        <p:spPr>
-          <a:xfrm>
-            <a:off x="786119" y="4631413"/>
-            <a:ext cx="2191683" cy="776221"/>
-          </a:xfrm>
-          <a:prstGeom prst="rect">
-            <a:avLst/>
-          </a:prstGeom>
-        </p:spPr>
-      </p:pic>
-      <p:pic>
-        <p:nvPicPr>
-          <p:cNvPr id="5" name="Picture 4"/>
-          <p:cNvPicPr>
-            <a:picLocks noChangeAspect="1"/>
-          </p:cNvPicPr>
-          <p:nvPr/>
-        </p:nvPicPr>
-        <p:blipFill>
-          <a:blip r:embed="rId9">
-            <a:extLst>
-              <a:ext uri="{28A0092B-C50C-407E-A947-70E740481C1C}">
-                <a14:useLocalDpi xmlns:a14="http://schemas.microsoft.com/office/drawing/2010/main" val="0"/>
-              </a:ext>
-            </a:extLst>
-          </a:blip>
-          <a:stretch>
-            <a:fillRect/>
-          </a:stretch>
-        </p:blipFill>
-        <p:spPr>
-          <a:xfrm>
-            <a:off x="1073692" y="2260653"/>
-            <a:ext cx="1428572" cy="1850000"/>
-          </a:xfrm>
-          <a:prstGeom prst="rect">
-            <a:avLst/>
-          </a:prstGeom>
-        </p:spPr>
-      </p:pic>
-    </p:spTree>
-    <p:extLst>
-      <p:ext uri="{BB962C8B-B14F-4D97-AF65-F5344CB8AC3E}">
-        <p14:creationId xmlns:p14="http://schemas.microsoft.com/office/powerpoint/2010/main" val="699138362"/>
       </p:ext>
     </p:extLst>
   </p:cSld>

</xml_diff>

<commit_message>
New slides for demos, added the 0-1-some pattern in case there is time
</commit_message>
<xml_diff>
--- a/UnitTestingTSQL.pptx
+++ b/UnitTestingTSQL.pptx
@@ -6,7 +6,7 @@
     <p:sldMasterId id="2147483692" r:id="rId2"/>
   </p:sldMasterIdLst>
   <p:notesMasterIdLst>
-    <p:notesMasterId r:id="rId35"/>
+    <p:notesMasterId r:id="rId40"/>
   </p:notesMasterIdLst>
   <p:sldIdLst>
     <p:sldId id="300" r:id="rId3"/>
@@ -36,11 +36,16 @@
     <p:sldId id="303" r:id="rId27"/>
     <p:sldId id="305" r:id="rId28"/>
     <p:sldId id="306" r:id="rId29"/>
-    <p:sldId id="276" r:id="rId30"/>
-    <p:sldId id="278" r:id="rId31"/>
-    <p:sldId id="270" r:id="rId32"/>
-    <p:sldId id="271" r:id="rId33"/>
-    <p:sldId id="265" r:id="rId34"/>
+    <p:sldId id="307" r:id="rId30"/>
+    <p:sldId id="308" r:id="rId31"/>
+    <p:sldId id="309" r:id="rId32"/>
+    <p:sldId id="310" r:id="rId33"/>
+    <p:sldId id="276" r:id="rId34"/>
+    <p:sldId id="311" r:id="rId35"/>
+    <p:sldId id="278" r:id="rId36"/>
+    <p:sldId id="270" r:id="rId37"/>
+    <p:sldId id="271" r:id="rId38"/>
+    <p:sldId id="265" r:id="rId39"/>
   </p:sldIdLst>
   <p:sldSz cx="9144000" cy="6858000" type="screen4x3"/>
   <p:notesSz cx="6858000" cy="9144000"/>
@@ -188,6 +193,10 @@
 </p:presentation>
 </file>
 
+<file path=ppt/revisionInfo.xml><?xml version="1.0" encoding="utf-8"?>
+<p1510:revInfo xmlns:a="http://schemas.openxmlformats.org/drawingml/2006/main" xmlns:r="http://schemas.openxmlformats.org/officeDocument/2006/relationships" xmlns:p1510="http://schemas.microsoft.com/office/powerpoint/2015/10/main"/>
+</file>
+
 <file path=ppt/notesMasters/notesMaster1.xml><?xml version="1.0" encoding="utf-8"?>
 <p:notesMaster xmlns:a="http://schemas.openxmlformats.org/drawingml/2006/main" xmlns:r="http://schemas.openxmlformats.org/officeDocument/2006/relationships" xmlns:p="http://schemas.openxmlformats.org/presentationml/2006/main">
   <p:cSld>
@@ -270,7 +279,7 @@
           <a:p>
             <a:fld id="{3C31BDEC-C855-4A20-BFC3-C78B82093698}" type="datetimeFigureOut">
               <a:rPr lang="en-US" smtClean="0"/>
-              <a:t>10/11/2017</a:t>
+              <a:t>10/12/2017</a:t>
             </a:fld>
             <a:endParaRPr lang="en-US"/>
           </a:p>
@@ -1293,6 +1302,234 @@
           <a:p>
             <a:r>
               <a:rPr lang="en-US" dirty="0"/>
+              <a:t>Write proc for insert and select of images</a:t>
+            </a:r>
+          </a:p>
+          <a:p>
+            <a:r>
+              <a:rPr lang="en-US" dirty="0"/>
+              <a:t>Create new test for insert, don’t fill stub</a:t>
+            </a:r>
+          </a:p>
+          <a:p>
+            <a:r>
+              <a:rPr lang="en-US" dirty="0"/>
+              <a:t>Create new test for select and edit</a:t>
+            </a:r>
+          </a:p>
+          <a:p>
+            <a:r>
+              <a:rPr lang="en-US" dirty="0"/>
+              <a:t>Run tests, get caught naming issues, as well as one procedure works, one fails. We get the failure in the test we didn’t edit.</a:t>
+            </a:r>
+          </a:p>
+          <a:p>
+            <a:r>
+              <a:rPr lang="en-US" dirty="0"/>
+              <a:t>Correct issues in both procedures</a:t>
+            </a:r>
+          </a:p>
+          <a:p>
+            <a:endParaRPr lang="en-US" dirty="0"/>
+          </a:p>
+        </p:txBody>
+      </p:sp>
+      <p:sp>
+        <p:nvSpPr>
+          <p:cNvPr id="4" name="Slide Number Placeholder 3"/>
+          <p:cNvSpPr>
+            <a:spLocks noGrp="1"/>
+          </p:cNvSpPr>
+          <p:nvPr>
+            <p:ph type="sldNum" sz="quarter" idx="10"/>
+          </p:nvPr>
+        </p:nvSpPr>
+        <p:spPr/>
+        <p:txBody>
+          <a:bodyPr/>
+          <a:lstStyle/>
+          <a:p>
+            <a:fld id="{737EB954-88EE-45B2-878D-41C5C083E9B9}" type="slidenum">
+              <a:rPr lang="en-US" smtClean="0"/>
+              <a:t>29</a:t>
+            </a:fld>
+            <a:endParaRPr lang="en-US"/>
+          </a:p>
+        </p:txBody>
+      </p:sp>
+    </p:spTree>
+    <p:extLst>
+      <p:ext uri="{BB962C8B-B14F-4D97-AF65-F5344CB8AC3E}">
+        <p14:creationId xmlns:p14="http://schemas.microsoft.com/office/powerpoint/2010/main" val="3706438335"/>
+      </p:ext>
+    </p:extLst>
+  </p:cSld>
+  <p:clrMapOvr>
+    <a:masterClrMapping/>
+  </p:clrMapOvr>
+</p:notes>
+</file>
+
+<file path=ppt/notesSlides/notesSlide16.xml><?xml version="1.0" encoding="utf-8"?>
+<p:notes xmlns:a="http://schemas.openxmlformats.org/drawingml/2006/main" xmlns:r="http://schemas.openxmlformats.org/officeDocument/2006/relationships" xmlns:p="http://schemas.openxmlformats.org/presentationml/2006/main">
+  <p:cSld>
+    <p:spTree>
+      <p:nvGrpSpPr>
+        <p:cNvPr id="1" name=""/>
+        <p:cNvGrpSpPr/>
+        <p:nvPr/>
+      </p:nvGrpSpPr>
+      <p:grpSpPr>
+        <a:xfrm>
+          <a:off x="0" y="0"/>
+          <a:ext cx="0" cy="0"/>
+          <a:chOff x="0" y="0"/>
+          <a:chExt cx="0" cy="0"/>
+        </a:xfrm>
+      </p:grpSpPr>
+      <p:sp>
+        <p:nvSpPr>
+          <p:cNvPr id="2" name="Slide Image Placeholder 1"/>
+          <p:cNvSpPr>
+            <a:spLocks noGrp="1" noRot="1" noChangeAspect="1"/>
+          </p:cNvSpPr>
+          <p:nvPr>
+            <p:ph type="sldImg"/>
+          </p:nvPr>
+        </p:nvSpPr>
+        <p:spPr/>
+      </p:sp>
+      <p:sp>
+        <p:nvSpPr>
+          <p:cNvPr id="3" name="Notes Placeholder 2"/>
+          <p:cNvSpPr>
+            <a:spLocks noGrp="1"/>
+          </p:cNvSpPr>
+          <p:nvPr>
+            <p:ph type="body" idx="1"/>
+          </p:nvPr>
+        </p:nvSpPr>
+        <p:spPr/>
+        <p:txBody>
+          <a:bodyPr/>
+          <a:lstStyle/>
+          <a:p>
+            <a:r>
+              <a:rPr lang="en-US" dirty="0"/>
+              <a:t>Write proc for insert and select of images</a:t>
+            </a:r>
+          </a:p>
+          <a:p>
+            <a:r>
+              <a:rPr lang="en-US" dirty="0"/>
+              <a:t>Create new test for insert, don’t fill stub</a:t>
+            </a:r>
+          </a:p>
+          <a:p>
+            <a:r>
+              <a:rPr lang="en-US" dirty="0"/>
+              <a:t>Create new test for select and edit</a:t>
+            </a:r>
+          </a:p>
+          <a:p>
+            <a:r>
+              <a:rPr lang="en-US" dirty="0"/>
+              <a:t>Run tests, get caught naming issues, as well as one procedure works, one fails. We get the failure in the test we didn’t edit.</a:t>
+            </a:r>
+          </a:p>
+          <a:p>
+            <a:r>
+              <a:rPr lang="en-US" dirty="0"/>
+              <a:t>Correct issues in both procedures</a:t>
+            </a:r>
+          </a:p>
+          <a:p>
+            <a:endParaRPr lang="en-US" dirty="0"/>
+          </a:p>
+        </p:txBody>
+      </p:sp>
+      <p:sp>
+        <p:nvSpPr>
+          <p:cNvPr id="4" name="Slide Number Placeholder 3"/>
+          <p:cNvSpPr>
+            <a:spLocks noGrp="1"/>
+          </p:cNvSpPr>
+          <p:nvPr>
+            <p:ph type="sldNum" sz="quarter" idx="10"/>
+          </p:nvPr>
+        </p:nvSpPr>
+        <p:spPr/>
+        <p:txBody>
+          <a:bodyPr/>
+          <a:lstStyle/>
+          <a:p>
+            <a:fld id="{737EB954-88EE-45B2-878D-41C5C083E9B9}" type="slidenum">
+              <a:rPr lang="en-US" smtClean="0"/>
+              <a:t>31</a:t>
+            </a:fld>
+            <a:endParaRPr lang="en-US"/>
+          </a:p>
+        </p:txBody>
+      </p:sp>
+    </p:spTree>
+    <p:extLst>
+      <p:ext uri="{BB962C8B-B14F-4D97-AF65-F5344CB8AC3E}">
+        <p14:creationId xmlns:p14="http://schemas.microsoft.com/office/powerpoint/2010/main" val="2182061461"/>
+      </p:ext>
+    </p:extLst>
+  </p:cSld>
+  <p:clrMapOvr>
+    <a:masterClrMapping/>
+  </p:clrMapOvr>
+</p:notes>
+</file>
+
+<file path=ppt/notesSlides/notesSlide17.xml><?xml version="1.0" encoding="utf-8"?>
+<p:notes xmlns:a="http://schemas.openxmlformats.org/drawingml/2006/main" xmlns:r="http://schemas.openxmlformats.org/officeDocument/2006/relationships" xmlns:p="http://schemas.openxmlformats.org/presentationml/2006/main">
+  <p:cSld>
+    <p:spTree>
+      <p:nvGrpSpPr>
+        <p:cNvPr id="1" name=""/>
+        <p:cNvGrpSpPr/>
+        <p:nvPr/>
+      </p:nvGrpSpPr>
+      <p:grpSpPr>
+        <a:xfrm>
+          <a:off x="0" y="0"/>
+          <a:ext cx="0" cy="0"/>
+          <a:chOff x="0" y="0"/>
+          <a:chExt cx="0" cy="0"/>
+        </a:xfrm>
+      </p:grpSpPr>
+      <p:sp>
+        <p:nvSpPr>
+          <p:cNvPr id="2" name="Slide Image Placeholder 1"/>
+          <p:cNvSpPr>
+            <a:spLocks noGrp="1" noRot="1" noChangeAspect="1"/>
+          </p:cNvSpPr>
+          <p:nvPr>
+            <p:ph type="sldImg"/>
+          </p:nvPr>
+        </p:nvSpPr>
+        <p:spPr/>
+      </p:sp>
+      <p:sp>
+        <p:nvSpPr>
+          <p:cNvPr id="3" name="Notes Placeholder 2"/>
+          <p:cNvSpPr>
+            <a:spLocks noGrp="1"/>
+          </p:cNvSpPr>
+          <p:nvPr>
+            <p:ph type="body" idx="1"/>
+          </p:nvPr>
+        </p:nvSpPr>
+        <p:spPr/>
+        <p:txBody>
+          <a:bodyPr/>
+          <a:lstStyle/>
+          <a:p>
+            <a:r>
+              <a:rPr lang="en-US" dirty="0"/>
               <a:t>CD pipeline</a:t>
             </a:r>
             <a:r>
@@ -1348,7 +1585,7 @@
           <a:p>
             <a:fld id="{737EB954-88EE-45B2-878D-41C5C083E9B9}" type="slidenum">
               <a:rPr lang="en-US" smtClean="0"/>
-              <a:t>32</a:t>
+              <a:t>37</a:t>
             </a:fld>
             <a:endParaRPr lang="en-US"/>
           </a:p>
@@ -2277,7 +2514,7 @@
               <a:pPr>
                 <a:defRPr/>
               </a:pPr>
-              <a:t>10/11/2017</a:t>
+              <a:t>10/12/2017</a:t>
             </a:fld>
             <a:endParaRPr lang="en-US"/>
           </a:p>
@@ -2439,7 +2676,7 @@
               <a:pPr>
                 <a:defRPr/>
               </a:pPr>
-              <a:t>10/11/2017</a:t>
+              <a:t>10/12/2017</a:t>
             </a:fld>
             <a:endParaRPr lang="en-US"/>
           </a:p>
@@ -2611,7 +2848,7 @@
               <a:pPr>
                 <a:defRPr/>
               </a:pPr>
-              <a:t>10/11/2017</a:t>
+              <a:t>10/12/2017</a:t>
             </a:fld>
             <a:endParaRPr lang="en-US"/>
           </a:p>
@@ -3042,7 +3279,7 @@
               <a:pPr>
                 <a:defRPr/>
               </a:pPr>
-              <a:t>10/11/2017</a:t>
+              <a:t>10/12/2017</a:t>
             </a:fld>
             <a:endParaRPr lang="en-US"/>
           </a:p>
@@ -3216,7 +3453,7 @@
               <a:pPr>
                 <a:defRPr/>
               </a:pPr>
-              <a:t>10/11/2017</a:t>
+              <a:t>10/12/2017</a:t>
             </a:fld>
             <a:endParaRPr lang="en-US"/>
           </a:p>
@@ -3455,7 +3692,7 @@
               <a:pPr>
                 <a:defRPr/>
               </a:pPr>
-              <a:t>10/11/2017</a:t>
+              <a:t>10/12/2017</a:t>
             </a:fld>
             <a:endParaRPr lang="en-US"/>
           </a:p>
@@ -3734,7 +3971,7 @@
               <a:pPr>
                 <a:defRPr/>
               </a:pPr>
-              <a:t>10/11/2017</a:t>
+              <a:t>10/12/2017</a:t>
             </a:fld>
             <a:endParaRPr lang="en-US"/>
           </a:p>
@@ -4152,7 +4389,7 @@
               <a:pPr>
                 <a:defRPr/>
               </a:pPr>
-              <a:t>10/11/2017</a:t>
+              <a:t>10/12/2017</a:t>
             </a:fld>
             <a:endParaRPr lang="en-US"/>
           </a:p>
@@ -4263,7 +4500,7 @@
               <a:pPr>
                 <a:defRPr/>
               </a:pPr>
-              <a:t>10/11/2017</a:t>
+              <a:t>10/12/2017</a:t>
             </a:fld>
             <a:endParaRPr lang="en-US"/>
           </a:p>
@@ -4352,7 +4589,7 @@
               <a:pPr>
                 <a:defRPr/>
               </a:pPr>
-              <a:t>10/11/2017</a:t>
+              <a:t>10/12/2017</a:t>
             </a:fld>
             <a:endParaRPr lang="en-US"/>
           </a:p>
@@ -4526,7 +4763,7 @@
               <a:pPr>
                 <a:defRPr/>
               </a:pPr>
-              <a:t>10/11/2017</a:t>
+              <a:t>10/12/2017</a:t>
             </a:fld>
             <a:endParaRPr lang="en-US"/>
           </a:p>
@@ -4795,7 +5032,7 @@
               <a:pPr>
                 <a:defRPr/>
               </a:pPr>
-              <a:t>10/11/2017</a:t>
+              <a:t>10/12/2017</a:t>
             </a:fld>
             <a:endParaRPr lang="en-US"/>
           </a:p>
@@ -5047,7 +5284,7 @@
               <a:pPr>
                 <a:defRPr/>
               </a:pPr>
-              <a:t>10/11/2017</a:t>
+              <a:t>10/12/2017</a:t>
             </a:fld>
             <a:endParaRPr lang="en-US"/>
           </a:p>
@@ -5209,7 +5446,7 @@
               <a:pPr>
                 <a:defRPr/>
               </a:pPr>
-              <a:t>10/11/2017</a:t>
+              <a:t>10/12/2017</a:t>
             </a:fld>
             <a:endParaRPr lang="en-US"/>
           </a:p>
@@ -5381,7 +5618,7 @@
               <a:pPr>
                 <a:defRPr/>
               </a:pPr>
-              <a:t>10/11/2017</a:t>
+              <a:t>10/12/2017</a:t>
             </a:fld>
             <a:endParaRPr lang="en-US"/>
           </a:p>
@@ -5620,7 +5857,7 @@
               <a:pPr>
                 <a:defRPr/>
               </a:pPr>
-              <a:t>10/11/2017</a:t>
+              <a:t>10/12/2017</a:t>
             </a:fld>
             <a:endParaRPr lang="en-US"/>
           </a:p>
@@ -5899,7 +6136,7 @@
               <a:pPr>
                 <a:defRPr/>
               </a:pPr>
-              <a:t>10/11/2017</a:t>
+              <a:t>10/12/2017</a:t>
             </a:fld>
             <a:endParaRPr lang="en-US"/>
           </a:p>
@@ -6317,7 +6554,7 @@
               <a:pPr>
                 <a:defRPr/>
               </a:pPr>
-              <a:t>10/11/2017</a:t>
+              <a:t>10/12/2017</a:t>
             </a:fld>
             <a:endParaRPr lang="en-US"/>
           </a:p>
@@ -6428,7 +6665,7 @@
               <a:pPr>
                 <a:defRPr/>
               </a:pPr>
-              <a:t>10/11/2017</a:t>
+              <a:t>10/12/2017</a:t>
             </a:fld>
             <a:endParaRPr lang="en-US"/>
           </a:p>
@@ -6517,7 +6754,7 @@
               <a:pPr>
                 <a:defRPr/>
               </a:pPr>
-              <a:t>10/11/2017</a:t>
+              <a:t>10/12/2017</a:t>
             </a:fld>
             <a:endParaRPr lang="en-US"/>
           </a:p>
@@ -6786,7 +7023,7 @@
               <a:pPr>
                 <a:defRPr/>
               </a:pPr>
-              <a:t>10/11/2017</a:t>
+              <a:t>10/12/2017</a:t>
             </a:fld>
             <a:endParaRPr lang="en-US"/>
           </a:p>
@@ -7038,7 +7275,7 @@
               <a:pPr>
                 <a:defRPr/>
               </a:pPr>
-              <a:t>10/11/2017</a:t>
+              <a:t>10/12/2017</a:t>
             </a:fld>
             <a:endParaRPr lang="en-US"/>
           </a:p>
@@ -7278,7 +7515,7 @@
               <a:pPr>
                 <a:defRPr/>
               </a:pPr>
-              <a:t>10/11/2017</a:t>
+              <a:t>10/12/2017</a:t>
             </a:fld>
             <a:endParaRPr lang="en-US"/>
           </a:p>
@@ -7975,7 +8212,7 @@
               <a:pPr>
                 <a:defRPr/>
               </a:pPr>
-              <a:t>10/11/2017</a:t>
+              <a:t>10/12/2017</a:t>
             </a:fld>
             <a:endParaRPr lang="en-US"/>
           </a:p>
@@ -9507,7 +9744,7 @@
               <a:rPr lang="en-US" dirty="0">
                 <a:hlinkClick r:id="rId4"/>
               </a:rPr>
-              <a:t>Support via Google Groups</a:t>
+              <a:t>Support via Posts</a:t>
             </a:r>
             <a:endParaRPr lang="en-US" dirty="0"/>
           </a:p>
@@ -9568,7 +9805,7 @@
           <a:lstStyle/>
           <a:p>
             <a:r>
-              <a:rPr lang="en-US" dirty="0"/>
+              <a:rPr lang="en-US" sz="3600" dirty="0"/>
               <a:t>Microsoft Unit Testing Framework</a:t>
             </a:r>
           </a:p>
@@ -10329,13 +10566,8 @@
           <a:p>
             <a:r>
               <a:rPr lang="en-US" dirty="0"/>
-              <a:t>Testing </a:t>
-            </a:r>
-            <a:r>
-              <a:rPr lang="en-US" dirty="0" err="1"/>
-              <a:t>CalcuLations</a:t>
-            </a:r>
-            <a:endParaRPr lang="en-US" dirty="0"/>
+              <a:t>Testing Calculations</a:t>
+            </a:r>
           </a:p>
         </p:txBody>
       </p:sp>
@@ -10562,7 +10794,7 @@
           <a:p>
             <a:r>
               <a:rPr lang="en-US" dirty="0"/>
-              <a:t>Having a Test Suite</a:t>
+              <a:t>Checking NULLs</a:t>
             </a:r>
           </a:p>
         </p:txBody>
@@ -10583,28 +10815,31 @@
           <a:lstStyle/>
           <a:p>
             <a:r>
-              <a:rPr lang="en-US" dirty="0"/>
-              <a:t>By continuing to grow your test suite with each change, developers spread the load</a:t>
-            </a:r>
-          </a:p>
-          <a:p>
-            <a:r>
-              <a:rPr lang="en-US" dirty="0"/>
-              <a:t>By having a large suite, we have better code coverage.</a:t>
-            </a:r>
-          </a:p>
-          <a:p>
-            <a:r>
-              <a:rPr lang="en-US" dirty="0"/>
-              <a:t>We can easily regression test.</a:t>
-            </a:r>
+              <a:rPr lang="en-US" sz="2800" dirty="0"/>
+              <a:t>NULL is a special case in databases</a:t>
+            </a:r>
+          </a:p>
+          <a:p>
+            <a:r>
+              <a:rPr lang="en-US" sz="2800" dirty="0"/>
+              <a:t>We often find these where we don't expect it</a:t>
+            </a:r>
+          </a:p>
+          <a:p>
+            <a:r>
+              <a:rPr lang="en-US" sz="2800" dirty="0"/>
+              <a:t>We need to account for NULL with some logic</a:t>
+            </a:r>
+          </a:p>
+          <a:p>
+            <a:endParaRPr lang="en-US" sz="2800" dirty="0"/>
           </a:p>
         </p:txBody>
       </p:sp>
     </p:spTree>
     <p:extLst>
       <p:ext uri="{BB962C8B-B14F-4D97-AF65-F5344CB8AC3E}">
-        <p14:creationId xmlns:p14="http://schemas.microsoft.com/office/powerpoint/2010/main" val="2479422556"/>
+        <p14:creationId xmlns:p14="http://schemas.microsoft.com/office/powerpoint/2010/main" val="4127984162"/>
       </p:ext>
     </p:extLst>
   </p:cSld>
@@ -10633,7 +10868,7 @@
       </p:grpSpPr>
       <p:sp>
         <p:nvSpPr>
-          <p:cNvPr id="2" name="Title 1"/>
+          <p:cNvPr id="4" name="Title 3"/>
           <p:cNvSpPr>
             <a:spLocks noGrp="1"/>
           </p:cNvSpPr>
@@ -10648,19 +10883,19 @@
           <a:p>
             <a:r>
               <a:rPr lang="en-US" dirty="0"/>
-              <a:t>Summary</a:t>
-            </a:r>
-          </a:p>
-        </p:txBody>
-      </p:sp>
-      <p:sp>
-        <p:nvSpPr>
-          <p:cNvPr id="3" name="Content Placeholder 2"/>
-          <p:cNvSpPr>
-            <a:spLocks noGrp="1"/>
-          </p:cNvSpPr>
-          <p:nvPr>
-            <p:ph idx="1"/>
+              <a:t>Checking NULLS</a:t>
+            </a:r>
+          </a:p>
+        </p:txBody>
+      </p:sp>
+      <p:sp>
+        <p:nvSpPr>
+          <p:cNvPr id="5" name="Text Placeholder 4"/>
+          <p:cNvSpPr>
+            <a:spLocks noGrp="1"/>
+          </p:cNvSpPr>
+          <p:nvPr>
+            <p:ph type="body" idx="1"/>
           </p:nvPr>
         </p:nvSpPr>
         <p:spPr/>
@@ -10670,33 +10905,7 @@
           <a:p>
             <a:r>
               <a:rPr lang="en-US" dirty="0"/>
-              <a:t>Testing will improve the quality of your code</a:t>
-            </a:r>
-          </a:p>
-          <a:p>
-            <a:r>
-              <a:rPr lang="en-US" dirty="0"/>
-              <a:t>Testing will lower the cost of code</a:t>
-            </a:r>
-          </a:p>
-          <a:p>
-            <a:r>
-              <a:rPr lang="en-US" dirty="0" err="1"/>
-              <a:t>tSQLt</a:t>
-            </a:r>
-            <a:r>
-              <a:rPr lang="en-US" dirty="0"/>
-              <a:t> is a framework for testing T-SQL code</a:t>
-            </a:r>
-          </a:p>
-          <a:p>
-            <a:r>
-              <a:rPr lang="en-US" dirty="0"/>
-              <a:t>SQL Cop can help you easily test </a:t>
-            </a:r>
-            <a:r>
-              <a:rPr lang="en-US"/>
-              <a:t>for standards</a:t>
+              <a:t>Testing Code</a:t>
             </a:r>
           </a:p>
         </p:txBody>
@@ -10704,7 +10913,7 @@
     </p:spTree>
     <p:extLst>
       <p:ext uri="{BB962C8B-B14F-4D97-AF65-F5344CB8AC3E}">
-        <p14:creationId xmlns:p14="http://schemas.microsoft.com/office/powerpoint/2010/main" val="3709868887"/>
+        <p14:creationId xmlns:p14="http://schemas.microsoft.com/office/powerpoint/2010/main" val="1969308736"/>
       </p:ext>
     </p:extLst>
   </p:cSld>
@@ -11218,6 +11427,459 @@
 </file>
 
 <file path=ppt/slides/slide30.xml><?xml version="1.0" encoding="utf-8"?>
+<p:sld xmlns:a="http://schemas.openxmlformats.org/drawingml/2006/main" xmlns:r="http://schemas.openxmlformats.org/officeDocument/2006/relationships" xmlns:p="http://schemas.openxmlformats.org/presentationml/2006/main">
+  <p:cSld>
+    <p:spTree>
+      <p:nvGrpSpPr>
+        <p:cNvPr id="1" name=""/>
+        <p:cNvGrpSpPr/>
+        <p:nvPr/>
+      </p:nvGrpSpPr>
+      <p:grpSpPr>
+        <a:xfrm>
+          <a:off x="0" y="0"/>
+          <a:ext cx="0" cy="0"/>
+          <a:chOff x="0" y="0"/>
+          <a:chExt cx="0" cy="0"/>
+        </a:xfrm>
+      </p:grpSpPr>
+      <p:sp>
+        <p:nvSpPr>
+          <p:cNvPr id="2" name="Title 1"/>
+          <p:cNvSpPr>
+            <a:spLocks noGrp="1"/>
+          </p:cNvSpPr>
+          <p:nvPr>
+            <p:ph type="title"/>
+          </p:nvPr>
+        </p:nvSpPr>
+        <p:spPr/>
+        <p:txBody>
+          <a:bodyPr/>
+          <a:lstStyle/>
+          <a:p>
+            <a:r>
+              <a:rPr lang="en-US" dirty="0"/>
+              <a:t>0-1-Some</a:t>
+            </a:r>
+          </a:p>
+        </p:txBody>
+      </p:sp>
+      <p:sp>
+        <p:nvSpPr>
+          <p:cNvPr id="3" name="Content Placeholder 2"/>
+          <p:cNvSpPr>
+            <a:spLocks noGrp="1"/>
+          </p:cNvSpPr>
+          <p:nvPr>
+            <p:ph idx="1"/>
+          </p:nvPr>
+        </p:nvSpPr>
+        <p:spPr/>
+        <p:txBody>
+          <a:bodyPr/>
+          <a:lstStyle/>
+          <a:p>
+            <a:r>
+              <a:rPr lang="en-US" sz="2800" dirty="0"/>
+              <a:t>A good test pattern is 0-1-some</a:t>
+            </a:r>
+          </a:p>
+          <a:p>
+            <a:r>
+              <a:rPr lang="en-US" sz="2800" dirty="0"/>
+              <a:t>Test times when no data exists (0 rows)</a:t>
+            </a:r>
+          </a:p>
+          <a:p>
+            <a:r>
+              <a:rPr lang="en-US" sz="2800" dirty="0"/>
+              <a:t>Test when 1 row exists</a:t>
+            </a:r>
+          </a:p>
+          <a:p>
+            <a:r>
+              <a:rPr lang="en-US" sz="2800" dirty="0"/>
+              <a:t>Test when more than 1 row exists</a:t>
+            </a:r>
+          </a:p>
+          <a:p>
+            <a:endParaRPr lang="en-US" sz="2800" dirty="0"/>
+          </a:p>
+        </p:txBody>
+      </p:sp>
+    </p:spTree>
+    <p:extLst>
+      <p:ext uri="{BB962C8B-B14F-4D97-AF65-F5344CB8AC3E}">
+        <p14:creationId xmlns:p14="http://schemas.microsoft.com/office/powerpoint/2010/main" val="3005142086"/>
+      </p:ext>
+    </p:extLst>
+  </p:cSld>
+  <p:clrMapOvr>
+    <a:masterClrMapping/>
+  </p:clrMapOvr>
+</p:sld>
+</file>
+
+<file path=ppt/slides/slide31.xml><?xml version="1.0" encoding="utf-8"?>
+<p:sld xmlns:a="http://schemas.openxmlformats.org/drawingml/2006/main" xmlns:r="http://schemas.openxmlformats.org/officeDocument/2006/relationships" xmlns:p="http://schemas.openxmlformats.org/presentationml/2006/main">
+  <p:cSld>
+    <p:spTree>
+      <p:nvGrpSpPr>
+        <p:cNvPr id="1" name=""/>
+        <p:cNvGrpSpPr/>
+        <p:nvPr/>
+      </p:nvGrpSpPr>
+      <p:grpSpPr>
+        <a:xfrm>
+          <a:off x="0" y="0"/>
+          <a:ext cx="0" cy="0"/>
+          <a:chOff x="0" y="0"/>
+          <a:chExt cx="0" cy="0"/>
+        </a:xfrm>
+      </p:grpSpPr>
+      <p:sp>
+        <p:nvSpPr>
+          <p:cNvPr id="4" name="Title 3"/>
+          <p:cNvSpPr>
+            <a:spLocks noGrp="1"/>
+          </p:cNvSpPr>
+          <p:nvPr>
+            <p:ph type="title"/>
+          </p:nvPr>
+        </p:nvSpPr>
+        <p:spPr/>
+        <p:txBody>
+          <a:bodyPr/>
+          <a:lstStyle/>
+          <a:p>
+            <a:r>
+              <a:rPr lang="en-US" dirty="0"/>
+              <a:t>0-1-Some test pattern</a:t>
+            </a:r>
+          </a:p>
+        </p:txBody>
+      </p:sp>
+      <p:sp>
+        <p:nvSpPr>
+          <p:cNvPr id="5" name="Text Placeholder 4"/>
+          <p:cNvSpPr>
+            <a:spLocks noGrp="1"/>
+          </p:cNvSpPr>
+          <p:nvPr>
+            <p:ph type="body" idx="1"/>
+          </p:nvPr>
+        </p:nvSpPr>
+        <p:spPr/>
+        <p:txBody>
+          <a:bodyPr/>
+          <a:lstStyle/>
+          <a:p>
+            <a:r>
+              <a:rPr lang="en-US" dirty="0"/>
+              <a:t>Testing Code</a:t>
+            </a:r>
+          </a:p>
+        </p:txBody>
+      </p:sp>
+    </p:spTree>
+    <p:extLst>
+      <p:ext uri="{BB962C8B-B14F-4D97-AF65-F5344CB8AC3E}">
+        <p14:creationId xmlns:p14="http://schemas.microsoft.com/office/powerpoint/2010/main" val="4163745074"/>
+      </p:ext>
+    </p:extLst>
+  </p:cSld>
+  <p:clrMapOvr>
+    <a:masterClrMapping/>
+  </p:clrMapOvr>
+</p:sld>
+</file>
+
+<file path=ppt/slides/slide32.xml><?xml version="1.0" encoding="utf-8"?>
+<p:sld xmlns:a="http://schemas.openxmlformats.org/drawingml/2006/main" xmlns:r="http://schemas.openxmlformats.org/officeDocument/2006/relationships" xmlns:p="http://schemas.openxmlformats.org/presentationml/2006/main">
+  <p:cSld>
+    <p:spTree>
+      <p:nvGrpSpPr>
+        <p:cNvPr id="1" name=""/>
+        <p:cNvGrpSpPr/>
+        <p:nvPr/>
+      </p:nvGrpSpPr>
+      <p:grpSpPr>
+        <a:xfrm>
+          <a:off x="0" y="0"/>
+          <a:ext cx="0" cy="0"/>
+          <a:chOff x="0" y="0"/>
+          <a:chExt cx="0" cy="0"/>
+        </a:xfrm>
+      </p:grpSpPr>
+      <p:sp>
+        <p:nvSpPr>
+          <p:cNvPr id="2" name="Title 1"/>
+          <p:cNvSpPr>
+            <a:spLocks noGrp="1"/>
+          </p:cNvSpPr>
+          <p:nvPr>
+            <p:ph type="title"/>
+          </p:nvPr>
+        </p:nvSpPr>
+        <p:spPr/>
+        <p:txBody>
+          <a:bodyPr/>
+          <a:lstStyle/>
+          <a:p>
+            <a:r>
+              <a:rPr lang="en-US" dirty="0"/>
+              <a:t>Having a Test Suite</a:t>
+            </a:r>
+          </a:p>
+        </p:txBody>
+      </p:sp>
+      <p:sp>
+        <p:nvSpPr>
+          <p:cNvPr id="3" name="Content Placeholder 2"/>
+          <p:cNvSpPr>
+            <a:spLocks noGrp="1"/>
+          </p:cNvSpPr>
+          <p:nvPr>
+            <p:ph idx="1"/>
+          </p:nvPr>
+        </p:nvSpPr>
+        <p:spPr/>
+        <p:txBody>
+          <a:bodyPr/>
+          <a:lstStyle/>
+          <a:p>
+            <a:r>
+              <a:rPr lang="en-US" dirty="0"/>
+              <a:t>By continuing to grow your test suite with each change, developers spread the load</a:t>
+            </a:r>
+          </a:p>
+          <a:p>
+            <a:r>
+              <a:rPr lang="en-US" dirty="0"/>
+              <a:t>By having a large suite, we have better code coverage.</a:t>
+            </a:r>
+          </a:p>
+          <a:p>
+            <a:r>
+              <a:rPr lang="en-US" dirty="0"/>
+              <a:t>We can easily regression test.</a:t>
+            </a:r>
+          </a:p>
+          <a:p>
+            <a:pPr marL="0" indent="0">
+              <a:buNone/>
+            </a:pPr>
+            <a:endParaRPr lang="en-US" dirty="0"/>
+          </a:p>
+        </p:txBody>
+      </p:sp>
+    </p:spTree>
+    <p:extLst>
+      <p:ext uri="{BB962C8B-B14F-4D97-AF65-F5344CB8AC3E}">
+        <p14:creationId xmlns:p14="http://schemas.microsoft.com/office/powerpoint/2010/main" val="2479422556"/>
+      </p:ext>
+    </p:extLst>
+  </p:cSld>
+  <p:clrMapOvr>
+    <a:masterClrMapping/>
+  </p:clrMapOvr>
+</p:sld>
+</file>
+
+<file path=ppt/slides/slide33.xml><?xml version="1.0" encoding="utf-8"?>
+<p:sld xmlns:a="http://schemas.openxmlformats.org/drawingml/2006/main" xmlns:r="http://schemas.openxmlformats.org/officeDocument/2006/relationships" xmlns:p="http://schemas.openxmlformats.org/presentationml/2006/main">
+  <p:cSld>
+    <p:spTree>
+      <p:nvGrpSpPr>
+        <p:cNvPr id="1" name=""/>
+        <p:cNvGrpSpPr/>
+        <p:nvPr/>
+      </p:nvGrpSpPr>
+      <p:grpSpPr>
+        <a:xfrm>
+          <a:off x="0" y="0"/>
+          <a:ext cx="0" cy="0"/>
+          <a:chOff x="0" y="0"/>
+          <a:chExt cx="0" cy="0"/>
+        </a:xfrm>
+      </p:grpSpPr>
+      <p:sp>
+        <p:nvSpPr>
+          <p:cNvPr id="2" name="Title 1"/>
+          <p:cNvSpPr>
+            <a:spLocks noGrp="1"/>
+          </p:cNvSpPr>
+          <p:nvPr>
+            <p:ph type="title"/>
+          </p:nvPr>
+        </p:nvSpPr>
+        <p:spPr/>
+        <p:txBody>
+          <a:bodyPr/>
+          <a:lstStyle/>
+          <a:p>
+            <a:r>
+              <a:rPr lang="en-US" dirty="0"/>
+              <a:t>Start With One Test</a:t>
+            </a:r>
+          </a:p>
+        </p:txBody>
+      </p:sp>
+      <p:sp>
+        <p:nvSpPr>
+          <p:cNvPr id="3" name="Content Placeholder 2"/>
+          <p:cNvSpPr>
+            <a:spLocks noGrp="1"/>
+          </p:cNvSpPr>
+          <p:nvPr>
+            <p:ph idx="1"/>
+          </p:nvPr>
+        </p:nvSpPr>
+        <p:spPr/>
+        <p:txBody>
+          <a:bodyPr/>
+          <a:lstStyle/>
+          <a:p>
+            <a:r>
+              <a:rPr lang="en-US" dirty="0"/>
+              <a:t>Developers are not responsible for testing existing code</a:t>
+            </a:r>
+          </a:p>
+          <a:p>
+            <a:r>
+              <a:rPr lang="en-US" dirty="0"/>
+              <a:t>Developers are responsible for testing their new code</a:t>
+            </a:r>
+          </a:p>
+          <a:p>
+            <a:r>
+              <a:rPr lang="en-US" dirty="0"/>
+              <a:t>One test a day for new code will build a suite</a:t>
+            </a:r>
+          </a:p>
+          <a:p>
+            <a:pPr marL="0" indent="0">
+              <a:buNone/>
+            </a:pPr>
+            <a:endParaRPr lang="en-US" dirty="0"/>
+          </a:p>
+        </p:txBody>
+      </p:sp>
+    </p:spTree>
+    <p:extLst>
+      <p:ext uri="{BB962C8B-B14F-4D97-AF65-F5344CB8AC3E}">
+        <p14:creationId xmlns:p14="http://schemas.microsoft.com/office/powerpoint/2010/main" val="4024472392"/>
+      </p:ext>
+    </p:extLst>
+  </p:cSld>
+  <p:clrMapOvr>
+    <a:masterClrMapping/>
+  </p:clrMapOvr>
+</p:sld>
+</file>
+
+<file path=ppt/slides/slide34.xml><?xml version="1.0" encoding="utf-8"?>
+<p:sld xmlns:a="http://schemas.openxmlformats.org/drawingml/2006/main" xmlns:r="http://schemas.openxmlformats.org/officeDocument/2006/relationships" xmlns:p="http://schemas.openxmlformats.org/presentationml/2006/main">
+  <p:cSld>
+    <p:spTree>
+      <p:nvGrpSpPr>
+        <p:cNvPr id="1" name=""/>
+        <p:cNvGrpSpPr/>
+        <p:nvPr/>
+      </p:nvGrpSpPr>
+      <p:grpSpPr>
+        <a:xfrm>
+          <a:off x="0" y="0"/>
+          <a:ext cx="0" cy="0"/>
+          <a:chOff x="0" y="0"/>
+          <a:chExt cx="0" cy="0"/>
+        </a:xfrm>
+      </p:grpSpPr>
+      <p:sp>
+        <p:nvSpPr>
+          <p:cNvPr id="2" name="Title 1"/>
+          <p:cNvSpPr>
+            <a:spLocks noGrp="1"/>
+          </p:cNvSpPr>
+          <p:nvPr>
+            <p:ph type="title"/>
+          </p:nvPr>
+        </p:nvSpPr>
+        <p:spPr/>
+        <p:txBody>
+          <a:bodyPr/>
+          <a:lstStyle/>
+          <a:p>
+            <a:r>
+              <a:rPr lang="en-US" dirty="0"/>
+              <a:t>Summary</a:t>
+            </a:r>
+          </a:p>
+        </p:txBody>
+      </p:sp>
+      <p:sp>
+        <p:nvSpPr>
+          <p:cNvPr id="3" name="Content Placeholder 2"/>
+          <p:cNvSpPr>
+            <a:spLocks noGrp="1"/>
+          </p:cNvSpPr>
+          <p:nvPr>
+            <p:ph idx="1"/>
+          </p:nvPr>
+        </p:nvSpPr>
+        <p:spPr/>
+        <p:txBody>
+          <a:bodyPr/>
+          <a:lstStyle/>
+          <a:p>
+            <a:r>
+              <a:rPr lang="en-US" dirty="0"/>
+              <a:t>Testing will improve the quality of your code</a:t>
+            </a:r>
+          </a:p>
+          <a:p>
+            <a:r>
+              <a:rPr lang="en-US" dirty="0"/>
+              <a:t>Testing will lower the cost of code</a:t>
+            </a:r>
+          </a:p>
+          <a:p>
+            <a:r>
+              <a:rPr lang="en-US" dirty="0" err="1"/>
+              <a:t>tSQLt</a:t>
+            </a:r>
+            <a:r>
+              <a:rPr lang="en-US" dirty="0"/>
+              <a:t> is a framework for testing T-SQL code</a:t>
+            </a:r>
+          </a:p>
+          <a:p>
+            <a:r>
+              <a:rPr lang="en-US" dirty="0"/>
+              <a:t>SQL Cop can help you easily test </a:t>
+            </a:r>
+            <a:r>
+              <a:rPr lang="en-US"/>
+              <a:t>for standards</a:t>
+            </a:r>
+          </a:p>
+        </p:txBody>
+      </p:sp>
+    </p:spTree>
+    <p:extLst>
+      <p:ext uri="{BB962C8B-B14F-4D97-AF65-F5344CB8AC3E}">
+        <p14:creationId xmlns:p14="http://schemas.microsoft.com/office/powerpoint/2010/main" val="3709868887"/>
+      </p:ext>
+    </p:extLst>
+  </p:cSld>
+  <p:clrMapOvr>
+    <a:masterClrMapping/>
+  </p:clrMapOvr>
+</p:sld>
+</file>
+
+<file path=ppt/slides/slide35.xml><?xml version="1.0" encoding="utf-8"?>
 <p:sld xmlns:a="http://schemas.openxmlformats.org/drawingml/2006/main" xmlns:r="http://schemas.openxmlformats.org/officeDocument/2006/relationships" xmlns:p="http://schemas.openxmlformats.org/presentationml/2006/main">
   <p:cSld>
     <p:spTree>
@@ -11810,7 +12472,7 @@
 </p:sld>
 </file>
 
-<file path=ppt/slides/slide31.xml><?xml version="1.0" encoding="utf-8"?>
+<file path=ppt/slides/slide36.xml><?xml version="1.0" encoding="utf-8"?>
 <p:sld xmlns:a="http://schemas.openxmlformats.org/drawingml/2006/main" xmlns:r="http://schemas.openxmlformats.org/officeDocument/2006/relationships" xmlns:p="http://schemas.openxmlformats.org/presentationml/2006/main">
   <p:cSld>
     <p:spTree>
@@ -11908,7 +12570,7 @@
 </p:sld>
 </file>
 
-<file path=ppt/slides/slide32.xml><?xml version="1.0" encoding="utf-8"?>
+<file path=ppt/slides/slide37.xml><?xml version="1.0" encoding="utf-8"?>
 <p:sld xmlns:a="http://schemas.openxmlformats.org/drawingml/2006/main" xmlns:r="http://schemas.openxmlformats.org/officeDocument/2006/relationships" xmlns:p="http://schemas.openxmlformats.org/presentationml/2006/main">
   <p:cSld>
     <p:spTree>

</xml_diff>

<commit_message>
Final VSLive Anaheim 2017 updates
</commit_message>
<xml_diff>
--- a/UnitTestingTSQL.pptx
+++ b/UnitTestingTSQL.pptx
@@ -279,7 +279,7 @@
           <a:p>
             <a:fld id="{3C31BDEC-C855-4A20-BFC3-C78B82093698}" type="datetimeFigureOut">
               <a:rPr lang="en-US" smtClean="0"/>
-              <a:t>10/12/2017</a:t>
+              <a:t>10/18/2017</a:t>
             </a:fld>
             <a:endParaRPr lang="en-US"/>
           </a:p>
@@ -2514,7 +2514,7 @@
               <a:pPr>
                 <a:defRPr/>
               </a:pPr>
-              <a:t>10/12/2017</a:t>
+              <a:t>10/18/2017</a:t>
             </a:fld>
             <a:endParaRPr lang="en-US"/>
           </a:p>
@@ -2676,7 +2676,7 @@
               <a:pPr>
                 <a:defRPr/>
               </a:pPr>
-              <a:t>10/12/2017</a:t>
+              <a:t>10/18/2017</a:t>
             </a:fld>
             <a:endParaRPr lang="en-US"/>
           </a:p>
@@ -2848,7 +2848,7 @@
               <a:pPr>
                 <a:defRPr/>
               </a:pPr>
-              <a:t>10/12/2017</a:t>
+              <a:t>10/18/2017</a:t>
             </a:fld>
             <a:endParaRPr lang="en-US"/>
           </a:p>
@@ -3279,7 +3279,7 @@
               <a:pPr>
                 <a:defRPr/>
               </a:pPr>
-              <a:t>10/12/2017</a:t>
+              <a:t>10/18/2017</a:t>
             </a:fld>
             <a:endParaRPr lang="en-US"/>
           </a:p>
@@ -3453,7 +3453,7 @@
               <a:pPr>
                 <a:defRPr/>
               </a:pPr>
-              <a:t>10/12/2017</a:t>
+              <a:t>10/18/2017</a:t>
             </a:fld>
             <a:endParaRPr lang="en-US"/>
           </a:p>
@@ -3692,7 +3692,7 @@
               <a:pPr>
                 <a:defRPr/>
               </a:pPr>
-              <a:t>10/12/2017</a:t>
+              <a:t>10/18/2017</a:t>
             </a:fld>
             <a:endParaRPr lang="en-US"/>
           </a:p>
@@ -3971,7 +3971,7 @@
               <a:pPr>
                 <a:defRPr/>
               </a:pPr>
-              <a:t>10/12/2017</a:t>
+              <a:t>10/18/2017</a:t>
             </a:fld>
             <a:endParaRPr lang="en-US"/>
           </a:p>
@@ -4389,7 +4389,7 @@
               <a:pPr>
                 <a:defRPr/>
               </a:pPr>
-              <a:t>10/12/2017</a:t>
+              <a:t>10/18/2017</a:t>
             </a:fld>
             <a:endParaRPr lang="en-US"/>
           </a:p>
@@ -4500,7 +4500,7 @@
               <a:pPr>
                 <a:defRPr/>
               </a:pPr>
-              <a:t>10/12/2017</a:t>
+              <a:t>10/18/2017</a:t>
             </a:fld>
             <a:endParaRPr lang="en-US"/>
           </a:p>
@@ -4589,7 +4589,7 @@
               <a:pPr>
                 <a:defRPr/>
               </a:pPr>
-              <a:t>10/12/2017</a:t>
+              <a:t>10/18/2017</a:t>
             </a:fld>
             <a:endParaRPr lang="en-US"/>
           </a:p>
@@ -4763,7 +4763,7 @@
               <a:pPr>
                 <a:defRPr/>
               </a:pPr>
-              <a:t>10/12/2017</a:t>
+              <a:t>10/18/2017</a:t>
             </a:fld>
             <a:endParaRPr lang="en-US"/>
           </a:p>
@@ -5032,7 +5032,7 @@
               <a:pPr>
                 <a:defRPr/>
               </a:pPr>
-              <a:t>10/12/2017</a:t>
+              <a:t>10/18/2017</a:t>
             </a:fld>
             <a:endParaRPr lang="en-US"/>
           </a:p>
@@ -5284,7 +5284,7 @@
               <a:pPr>
                 <a:defRPr/>
               </a:pPr>
-              <a:t>10/12/2017</a:t>
+              <a:t>10/18/2017</a:t>
             </a:fld>
             <a:endParaRPr lang="en-US"/>
           </a:p>
@@ -5446,7 +5446,7 @@
               <a:pPr>
                 <a:defRPr/>
               </a:pPr>
-              <a:t>10/12/2017</a:t>
+              <a:t>10/18/2017</a:t>
             </a:fld>
             <a:endParaRPr lang="en-US"/>
           </a:p>
@@ -5618,7 +5618,7 @@
               <a:pPr>
                 <a:defRPr/>
               </a:pPr>
-              <a:t>10/12/2017</a:t>
+              <a:t>10/18/2017</a:t>
             </a:fld>
             <a:endParaRPr lang="en-US"/>
           </a:p>
@@ -5857,7 +5857,7 @@
               <a:pPr>
                 <a:defRPr/>
               </a:pPr>
-              <a:t>10/12/2017</a:t>
+              <a:t>10/18/2017</a:t>
             </a:fld>
             <a:endParaRPr lang="en-US"/>
           </a:p>
@@ -6136,7 +6136,7 @@
               <a:pPr>
                 <a:defRPr/>
               </a:pPr>
-              <a:t>10/12/2017</a:t>
+              <a:t>10/18/2017</a:t>
             </a:fld>
             <a:endParaRPr lang="en-US"/>
           </a:p>
@@ -6554,7 +6554,7 @@
               <a:pPr>
                 <a:defRPr/>
               </a:pPr>
-              <a:t>10/12/2017</a:t>
+              <a:t>10/18/2017</a:t>
             </a:fld>
             <a:endParaRPr lang="en-US"/>
           </a:p>
@@ -6665,7 +6665,7 @@
               <a:pPr>
                 <a:defRPr/>
               </a:pPr>
-              <a:t>10/12/2017</a:t>
+              <a:t>10/18/2017</a:t>
             </a:fld>
             <a:endParaRPr lang="en-US"/>
           </a:p>
@@ -6754,7 +6754,7 @@
               <a:pPr>
                 <a:defRPr/>
               </a:pPr>
-              <a:t>10/12/2017</a:t>
+              <a:t>10/18/2017</a:t>
             </a:fld>
             <a:endParaRPr lang="en-US"/>
           </a:p>
@@ -7023,7 +7023,7 @@
               <a:pPr>
                 <a:defRPr/>
               </a:pPr>
-              <a:t>10/12/2017</a:t>
+              <a:t>10/18/2017</a:t>
             </a:fld>
             <a:endParaRPr lang="en-US"/>
           </a:p>
@@ -7275,7 +7275,7 @@
               <a:pPr>
                 <a:defRPr/>
               </a:pPr>
-              <a:t>10/12/2017</a:t>
+              <a:t>10/18/2017</a:t>
             </a:fld>
             <a:endParaRPr lang="en-US"/>
           </a:p>
@@ -7515,7 +7515,7 @@
               <a:pPr>
                 <a:defRPr/>
               </a:pPr>
-              <a:t>10/12/2017</a:t>
+              <a:t>10/18/2017</a:t>
             </a:fld>
             <a:endParaRPr lang="en-US"/>
           </a:p>
@@ -8212,7 +8212,7 @@
               <a:pPr>
                 <a:defRPr/>
               </a:pPr>
-              <a:t>10/12/2017</a:t>
+              <a:t>10/18/2017</a:t>
             </a:fld>
             <a:endParaRPr lang="en-US"/>
           </a:p>
@@ -9120,16 +9120,12 @@
             </a:r>
           </a:p>
           <a:p>
-            <a:pPr marL="819150" lvl="1" indent="-342900">
-              <a:buFont typeface="Arial" panose="020B0604020202020204" pitchFamily="34" charset="0"/>
-              <a:buChar char="•"/>
+            <a:pPr marL="476250" lvl="1" indent="0">
+              <a:buNone/>
             </a:pPr>
-            <a:r>
-              <a:rPr lang="en-US" sz="2400" dirty="0">
-                <a:cs typeface="Arial" panose="020B0604020202020204" pitchFamily="34" charset="0"/>
-              </a:rPr>
-              <a:t> </a:t>
-            </a:r>
+            <a:endParaRPr lang="en-US" sz="2400" dirty="0">
+              <a:cs typeface="Arial" panose="020B0604020202020204" pitchFamily="34" charset="0"/>
+            </a:endParaRPr>
           </a:p>
           <a:p>
             <a:pPr>
@@ -9528,7 +9524,7 @@
           <a:p>
             <a:r>
               <a:rPr lang="en-US" sz="2000" dirty="0"/>
-              <a:t>Some are base on other unit testing frameworks, like Junit</a:t>
+              <a:t>Some are based on other unit testing frameworks, like Junit</a:t>
             </a:r>
           </a:p>
           <a:p>
@@ -10517,6 +10513,12 @@
               <a:t>Tests help ensure that the correct formula is used</a:t>
             </a:r>
           </a:p>
+          <a:p>
+            <a:r>
+              <a:rPr lang="en-US" sz="2800" dirty="0"/>
+              <a:t>Test to be sure the correct data is used</a:t>
+            </a:r>
+          </a:p>
         </p:txBody>
       </p:sp>
     </p:spTree>
@@ -10670,6 +10672,17 @@
               <a:rPr lang="en-US" sz="2800" dirty="0"/>
               <a:t>These can result in missing boundary conditions</a:t>
             </a:r>
+          </a:p>
+          <a:p>
+            <a:r>
+              <a:rPr lang="en-US" sz="2800" dirty="0"/>
+              <a:t>Tests can help ensure all boundaries </a:t>
+            </a:r>
+            <a:r>
+              <a:rPr lang="en-US" sz="2800"/>
+              <a:t>are implemented</a:t>
+            </a:r>
+            <a:endParaRPr lang="en-US" sz="2800" dirty="0"/>
           </a:p>
         </p:txBody>
       </p:sp>

</xml_diff>